<commit_message>
- Update document. - Update slide. - Update short document.
</commit_message>
<xml_diff>
--- a/ smart-buy/Slides/Smart Buy.pptx
+++ b/ smart-buy/Slides/Smart Buy.pptx
@@ -130,7 +130,7 @@
   </p:defaultTextStyle>
   <p:extLst>
     <p:ext uri="{EFAFB233-063F-42B5-8137-9DF3F51BA10A}">
-      <p15:sldGuideLst xmlns:p15="http://schemas.microsoft.com/office/powerpoint/2012/main" xmlns=""/>
+      <p15:sldGuideLst xmlns="" xmlns:p15="http://schemas.microsoft.com/office/powerpoint/2012/main"/>
     </p:ext>
   </p:extLst>
 </p:presentation>
@@ -5295,6 +5295,13 @@
         </dgm:presLayoutVars>
       </dgm:prSet>
       <dgm:spPr/>
+      <dgm:t>
+        <a:bodyPr/>
+        <a:lstStyle/>
+        <a:p>
+          <a:endParaRPr lang="en-GB"/>
+        </a:p>
+      </dgm:t>
     </dgm:pt>
     <dgm:pt modelId="{54299FCB-FCA7-4B04-83F7-F009EE7F6E48}" type="pres">
       <dgm:prSet presAssocID="{7D8D5BFA-1CB1-45D7-98B0-D383872E7D2B}" presName="composite" presStyleCnt="0"/>
@@ -5336,10 +5343,24 @@
     <dgm:pt modelId="{D0BF7A67-8420-4D4D-8BE3-5D6439E20DDB}" type="pres">
       <dgm:prSet presAssocID="{12FBE855-85D8-40A0-8B00-0CC7B06D6929}" presName="sibTrans" presStyleLbl="sibTrans2D1" presStyleIdx="0" presStyleCnt="2"/>
       <dgm:spPr/>
+      <dgm:t>
+        <a:bodyPr/>
+        <a:lstStyle/>
+        <a:p>
+          <a:endParaRPr lang="en-GB"/>
+        </a:p>
+      </dgm:t>
     </dgm:pt>
     <dgm:pt modelId="{CF5F9BE5-234E-44DB-8A8D-FAE4BD4CF1F9}" type="pres">
       <dgm:prSet presAssocID="{12FBE855-85D8-40A0-8B00-0CC7B06D6929}" presName="connTx" presStyleLbl="sibTrans2D1" presStyleIdx="0" presStyleCnt="2"/>
       <dgm:spPr/>
+      <dgm:t>
+        <a:bodyPr/>
+        <a:lstStyle/>
+        <a:p>
+          <a:endParaRPr lang="en-GB"/>
+        </a:p>
+      </dgm:t>
     </dgm:pt>
     <dgm:pt modelId="{56B006A5-CC1F-4428-8E48-5CD8A21473A9}" type="pres">
       <dgm:prSet presAssocID="{F0420458-9C91-45A5-855D-858C35132CE3}" presName="composite" presStyleCnt="0"/>
@@ -5381,10 +5402,24 @@
     <dgm:pt modelId="{D502E3EC-61B5-4BD1-8CD0-CD98ACA241A7}" type="pres">
       <dgm:prSet presAssocID="{5DA2A5C7-CF8E-4E64-8B00-CB66161199F2}" presName="sibTrans" presStyleLbl="sibTrans2D1" presStyleIdx="1" presStyleCnt="2"/>
       <dgm:spPr/>
+      <dgm:t>
+        <a:bodyPr/>
+        <a:lstStyle/>
+        <a:p>
+          <a:endParaRPr lang="en-GB"/>
+        </a:p>
+      </dgm:t>
     </dgm:pt>
     <dgm:pt modelId="{FBAC9E5F-3566-4C89-A98C-DC716EF5F2ED}" type="pres">
       <dgm:prSet presAssocID="{5DA2A5C7-CF8E-4E64-8B00-CB66161199F2}" presName="connTx" presStyleLbl="sibTrans2D1" presStyleIdx="1" presStyleCnt="2"/>
       <dgm:spPr/>
+      <dgm:t>
+        <a:bodyPr/>
+        <a:lstStyle/>
+        <a:p>
+          <a:endParaRPr lang="en-GB"/>
+        </a:p>
+      </dgm:t>
     </dgm:pt>
     <dgm:pt modelId="{A532881D-B094-4E7A-BF6E-2772B5CEDBCF}" type="pres">
       <dgm:prSet presAssocID="{2BEB8688-5594-4A03-BE50-D1FF7D21CD62}" presName="composite" presStyleCnt="0"/>
@@ -5425,17 +5460,17 @@
     </dgm:pt>
   </dgm:ptLst>
   <dgm:cxnLst>
-    <dgm:cxn modelId="{82E9F778-89E6-4410-A26E-1B51FAB2FC65}" srcId="{E954D45C-BFAC-45E5-AD2A-1CF0507E21E8}" destId="{F0420458-9C91-45A5-855D-858C35132CE3}" srcOrd="1" destOrd="0" parTransId="{A83F1D0E-9FA2-433E-A271-B6CBA2FB9AF8}" sibTransId="{5DA2A5C7-CF8E-4E64-8B00-CB66161199F2}"/>
-    <dgm:cxn modelId="{DC411FED-DBBB-49BF-A913-710372885067}" srcId="{E954D45C-BFAC-45E5-AD2A-1CF0507E21E8}" destId="{7D8D5BFA-1CB1-45D7-98B0-D383872E7D2B}" srcOrd="0" destOrd="0" parTransId="{B9114965-3B0B-4BB7-9FD9-DB438DC4CB03}" sibTransId="{12FBE855-85D8-40A0-8B00-0CC7B06D6929}"/>
-    <dgm:cxn modelId="{90668E00-F8CE-4763-AFEC-A19FDAB2725B}" type="presOf" srcId="{F0420458-9C91-45A5-855D-858C35132CE3}" destId="{E65AE26C-C7C3-47F3-B3E8-7DF6636223EB}" srcOrd="0" destOrd="0" presId="urn:microsoft.com/office/officeart/2005/8/layout/hProcess10"/>
-    <dgm:cxn modelId="{DEEE4162-1078-4345-BD37-66B73D77B252}" srcId="{E954D45C-BFAC-45E5-AD2A-1CF0507E21E8}" destId="{2BEB8688-5594-4A03-BE50-D1FF7D21CD62}" srcOrd="2" destOrd="0" parTransId="{7EC34235-5E28-4D03-B53F-052966CF8CCE}" sibTransId="{4BD9ACC0-71FD-4EFE-A971-1DBE90752A04}"/>
-    <dgm:cxn modelId="{7C80DEF5-FACF-4239-86F9-2D5B4CA0E06F}" type="presOf" srcId="{5DA2A5C7-CF8E-4E64-8B00-CB66161199F2}" destId="{FBAC9E5F-3566-4C89-A98C-DC716EF5F2ED}" srcOrd="1" destOrd="0" presId="urn:microsoft.com/office/officeart/2005/8/layout/hProcess10"/>
-    <dgm:cxn modelId="{12867D23-941E-4F4C-9026-3CCEFD1BEF3C}" type="presOf" srcId="{5DA2A5C7-CF8E-4E64-8B00-CB66161199F2}" destId="{D502E3EC-61B5-4BD1-8CD0-CD98ACA241A7}" srcOrd="0" destOrd="0" presId="urn:microsoft.com/office/officeart/2005/8/layout/hProcess10"/>
-    <dgm:cxn modelId="{F6C111C5-D808-4A00-B7E1-E568B74D62A3}" type="presOf" srcId="{12FBE855-85D8-40A0-8B00-0CC7B06D6929}" destId="{D0BF7A67-8420-4D4D-8BE3-5D6439E20DDB}" srcOrd="0" destOrd="0" presId="urn:microsoft.com/office/officeart/2005/8/layout/hProcess10"/>
-    <dgm:cxn modelId="{4EFE9A9D-3AFA-46E6-8DCC-EFDEE76EB6D2}" type="presOf" srcId="{7D8D5BFA-1CB1-45D7-98B0-D383872E7D2B}" destId="{2D6711A0-775D-4EF7-ADE9-52C1DBCAC128}" srcOrd="0" destOrd="0" presId="urn:microsoft.com/office/officeart/2005/8/layout/hProcess10"/>
-    <dgm:cxn modelId="{1E9EF46D-DA0C-42E8-9ADF-EB209A88DDFD}" type="presOf" srcId="{12FBE855-85D8-40A0-8B00-0CC7B06D6929}" destId="{CF5F9BE5-234E-44DB-8A8D-FAE4BD4CF1F9}" srcOrd="1" destOrd="0" presId="urn:microsoft.com/office/officeart/2005/8/layout/hProcess10"/>
     <dgm:cxn modelId="{89EFC945-C001-4D9B-8B52-BEDA5D04F8FF}" type="presOf" srcId="{2BEB8688-5594-4A03-BE50-D1FF7D21CD62}" destId="{710611F9-6C1A-4787-A7CF-DB4A30C258E0}" srcOrd="0" destOrd="0" presId="urn:microsoft.com/office/officeart/2005/8/layout/hProcess10"/>
     <dgm:cxn modelId="{573088B0-A55B-4916-BBD2-8E918AE97D12}" type="presOf" srcId="{E954D45C-BFAC-45E5-AD2A-1CF0507E21E8}" destId="{D5CC9D54-DCD1-4132-90EF-7BCC563A5F7D}" srcOrd="0" destOrd="0" presId="urn:microsoft.com/office/officeart/2005/8/layout/hProcess10"/>
+    <dgm:cxn modelId="{DEEE4162-1078-4345-BD37-66B73D77B252}" srcId="{E954D45C-BFAC-45E5-AD2A-1CF0507E21E8}" destId="{2BEB8688-5594-4A03-BE50-D1FF7D21CD62}" srcOrd="2" destOrd="0" parTransId="{7EC34235-5E28-4D03-B53F-052966CF8CCE}" sibTransId="{4BD9ACC0-71FD-4EFE-A971-1DBE90752A04}"/>
+    <dgm:cxn modelId="{90668E00-F8CE-4763-AFEC-A19FDAB2725B}" type="presOf" srcId="{F0420458-9C91-45A5-855D-858C35132CE3}" destId="{E65AE26C-C7C3-47F3-B3E8-7DF6636223EB}" srcOrd="0" destOrd="0" presId="urn:microsoft.com/office/officeart/2005/8/layout/hProcess10"/>
+    <dgm:cxn modelId="{12867D23-941E-4F4C-9026-3CCEFD1BEF3C}" type="presOf" srcId="{5DA2A5C7-CF8E-4E64-8B00-CB66161199F2}" destId="{D502E3EC-61B5-4BD1-8CD0-CD98ACA241A7}" srcOrd="0" destOrd="0" presId="urn:microsoft.com/office/officeart/2005/8/layout/hProcess10"/>
+    <dgm:cxn modelId="{DC411FED-DBBB-49BF-A913-710372885067}" srcId="{E954D45C-BFAC-45E5-AD2A-1CF0507E21E8}" destId="{7D8D5BFA-1CB1-45D7-98B0-D383872E7D2B}" srcOrd="0" destOrd="0" parTransId="{B9114965-3B0B-4BB7-9FD9-DB438DC4CB03}" sibTransId="{12FBE855-85D8-40A0-8B00-0CC7B06D6929}"/>
+    <dgm:cxn modelId="{7C80DEF5-FACF-4239-86F9-2D5B4CA0E06F}" type="presOf" srcId="{5DA2A5C7-CF8E-4E64-8B00-CB66161199F2}" destId="{FBAC9E5F-3566-4C89-A98C-DC716EF5F2ED}" srcOrd="1" destOrd="0" presId="urn:microsoft.com/office/officeart/2005/8/layout/hProcess10"/>
+    <dgm:cxn modelId="{1E9EF46D-DA0C-42E8-9ADF-EB209A88DDFD}" type="presOf" srcId="{12FBE855-85D8-40A0-8B00-0CC7B06D6929}" destId="{CF5F9BE5-234E-44DB-8A8D-FAE4BD4CF1F9}" srcOrd="1" destOrd="0" presId="urn:microsoft.com/office/officeart/2005/8/layout/hProcess10"/>
+    <dgm:cxn modelId="{4EFE9A9D-3AFA-46E6-8DCC-EFDEE76EB6D2}" type="presOf" srcId="{7D8D5BFA-1CB1-45D7-98B0-D383872E7D2B}" destId="{2D6711A0-775D-4EF7-ADE9-52C1DBCAC128}" srcOrd="0" destOrd="0" presId="urn:microsoft.com/office/officeart/2005/8/layout/hProcess10"/>
+    <dgm:cxn modelId="{82E9F778-89E6-4410-A26E-1B51FAB2FC65}" srcId="{E954D45C-BFAC-45E5-AD2A-1CF0507E21E8}" destId="{F0420458-9C91-45A5-855D-858C35132CE3}" srcOrd="1" destOrd="0" parTransId="{A83F1D0E-9FA2-433E-A271-B6CBA2FB9AF8}" sibTransId="{5DA2A5C7-CF8E-4E64-8B00-CB66161199F2}"/>
+    <dgm:cxn modelId="{F6C111C5-D808-4A00-B7E1-E568B74D62A3}" type="presOf" srcId="{12FBE855-85D8-40A0-8B00-0CC7B06D6929}" destId="{D0BF7A67-8420-4D4D-8BE3-5D6439E20DDB}" srcOrd="0" destOrd="0" presId="urn:microsoft.com/office/officeart/2005/8/layout/hProcess10"/>
     <dgm:cxn modelId="{7CB71D5A-310C-4787-9E99-2482B677F60F}" type="presParOf" srcId="{D5CC9D54-DCD1-4132-90EF-7BCC563A5F7D}" destId="{54299FCB-FCA7-4B04-83F7-F009EE7F6E48}" srcOrd="0" destOrd="0" presId="urn:microsoft.com/office/officeart/2005/8/layout/hProcess10"/>
     <dgm:cxn modelId="{54BE8CF6-9FB9-4FF3-9E05-1746BC4D8B6D}" type="presParOf" srcId="{54299FCB-FCA7-4B04-83F7-F009EE7F6E48}" destId="{13A32406-3E38-4FE5-AC82-5B375F270D7B}" srcOrd="0" destOrd="0" presId="urn:microsoft.com/office/officeart/2005/8/layout/hProcess10"/>
     <dgm:cxn modelId="{B213F08D-00D9-4D66-88A9-21FFB1B5A462}" type="presParOf" srcId="{54299FCB-FCA7-4B04-83F7-F009EE7F6E48}" destId="{2D6711A0-775D-4EF7-ADE9-52C1DBCAC128}" srcOrd="1" destOrd="0" presId="urn:microsoft.com/office/officeart/2005/8/layout/hProcess10"/>
@@ -16579,7 +16614,7 @@
           <a:p>
             <a:fld id="{03828354-E0C5-4131-9B49-1997E3EE3A7D}" type="datetimeFigureOut">
               <a:rPr lang="en-US" smtClean="0"/>
-              <a:t>4/17/2014</a:t>
+              <a:t>4/18/2014</a:t>
             </a:fld>
             <a:endParaRPr lang="en-US"/>
           </a:p>
@@ -16830,7 +16865,7 @@
           <a:p>
             <a:fld id="{03828354-E0C5-4131-9B49-1997E3EE3A7D}" type="datetimeFigureOut">
               <a:rPr lang="en-US" smtClean="0"/>
-              <a:t>4/17/2014</a:t>
+              <a:t>4/18/2014</a:t>
             </a:fld>
             <a:endParaRPr lang="en-US"/>
           </a:p>
@@ -17144,7 +17179,7 @@
           <a:p>
             <a:fld id="{03828354-E0C5-4131-9B49-1997E3EE3A7D}" type="datetimeFigureOut">
               <a:rPr lang="en-US" smtClean="0"/>
-              <a:t>4/17/2014</a:t>
+              <a:t>4/18/2014</a:t>
             </a:fld>
             <a:endParaRPr lang="en-US"/>
           </a:p>
@@ -17485,7 +17520,7 @@
           <a:p>
             <a:fld id="{03828354-E0C5-4131-9B49-1997E3EE3A7D}" type="datetimeFigureOut">
               <a:rPr lang="en-US" smtClean="0"/>
-              <a:t>4/17/2014</a:t>
+              <a:t>4/18/2014</a:t>
             </a:fld>
             <a:endParaRPr lang="en-US"/>
           </a:p>
@@ -17799,7 +17834,7 @@
           <a:p>
             <a:fld id="{03828354-E0C5-4131-9B49-1997E3EE3A7D}" type="datetimeFigureOut">
               <a:rPr lang="en-US" smtClean="0"/>
-              <a:t>4/17/2014</a:t>
+              <a:t>4/18/2014</a:t>
             </a:fld>
             <a:endParaRPr lang="en-US"/>
           </a:p>
@@ -18192,7 +18227,7 @@
           <a:p>
             <a:fld id="{03828354-E0C5-4131-9B49-1997E3EE3A7D}" type="datetimeFigureOut">
               <a:rPr lang="en-US" smtClean="0"/>
-              <a:t>4/17/2014</a:t>
+              <a:t>4/18/2014</a:t>
             </a:fld>
             <a:endParaRPr lang="en-US"/>
           </a:p>
@@ -18362,7 +18397,7 @@
           <a:p>
             <a:fld id="{03828354-E0C5-4131-9B49-1997E3EE3A7D}" type="datetimeFigureOut">
               <a:rPr lang="en-US" smtClean="0"/>
-              <a:t>4/17/2014</a:t>
+              <a:t>4/18/2014</a:t>
             </a:fld>
             <a:endParaRPr lang="en-US"/>
           </a:p>
@@ -18542,7 +18577,7 @@
           <a:p>
             <a:fld id="{03828354-E0C5-4131-9B49-1997E3EE3A7D}" type="datetimeFigureOut">
               <a:rPr lang="en-US" smtClean="0"/>
-              <a:t>4/17/2014</a:t>
+              <a:t>4/18/2014</a:t>
             </a:fld>
             <a:endParaRPr lang="en-US"/>
           </a:p>
@@ -18752,7 +18787,7 @@
           <a:p>
             <a:fld id="{03828354-E0C5-4131-9B49-1997E3EE3A7D}" type="datetimeFigureOut">
               <a:rPr lang="en-US" smtClean="0"/>
-              <a:t>4/17/2014</a:t>
+              <a:t>4/18/2014</a:t>
             </a:fld>
             <a:endParaRPr lang="en-US"/>
           </a:p>
@@ -18999,7 +19034,7 @@
           <a:p>
             <a:fld id="{03828354-E0C5-4131-9B49-1997E3EE3A7D}" type="datetimeFigureOut">
               <a:rPr lang="en-US" smtClean="0"/>
-              <a:t>4/17/2014</a:t>
+              <a:t>4/18/2014</a:t>
             </a:fld>
             <a:endParaRPr lang="en-US"/>
           </a:p>
@@ -19231,7 +19266,7 @@
           <a:p>
             <a:fld id="{03828354-E0C5-4131-9B49-1997E3EE3A7D}" type="datetimeFigureOut">
               <a:rPr lang="en-US" smtClean="0"/>
-              <a:t>4/17/2014</a:t>
+              <a:t>4/18/2014</a:t>
             </a:fld>
             <a:endParaRPr lang="en-US"/>
           </a:p>
@@ -19605,7 +19640,7 @@
           <a:p>
             <a:fld id="{03828354-E0C5-4131-9B49-1997E3EE3A7D}" type="datetimeFigureOut">
               <a:rPr lang="en-US" smtClean="0"/>
-              <a:t>4/17/2014</a:t>
+              <a:t>4/18/2014</a:t>
             </a:fld>
             <a:endParaRPr lang="en-US"/>
           </a:p>
@@ -19728,7 +19763,7 @@
           <a:p>
             <a:fld id="{03828354-E0C5-4131-9B49-1997E3EE3A7D}" type="datetimeFigureOut">
               <a:rPr lang="en-US" smtClean="0"/>
-              <a:t>4/17/2014</a:t>
+              <a:t>4/18/2014</a:t>
             </a:fld>
             <a:endParaRPr lang="en-US"/>
           </a:p>
@@ -19823,7 +19858,7 @@
           <a:p>
             <a:fld id="{03828354-E0C5-4131-9B49-1997E3EE3A7D}" type="datetimeFigureOut">
               <a:rPr lang="en-US" smtClean="0"/>
-              <a:t>4/17/2014</a:t>
+              <a:t>4/18/2014</a:t>
             </a:fld>
             <a:endParaRPr lang="en-US"/>
           </a:p>
@@ -20078,7 +20113,7 @@
           <a:p>
             <a:fld id="{03828354-E0C5-4131-9B49-1997E3EE3A7D}" type="datetimeFigureOut">
               <a:rPr lang="en-US" smtClean="0"/>
-              <a:t>4/17/2014</a:t>
+              <a:t>4/18/2014</a:t>
             </a:fld>
             <a:endParaRPr lang="en-US"/>
           </a:p>
@@ -20341,7 +20376,7 @@
           <a:p>
             <a:fld id="{03828354-E0C5-4131-9B49-1997E3EE3A7D}" type="datetimeFigureOut">
               <a:rPr lang="en-US" smtClean="0"/>
-              <a:t>4/17/2014</a:t>
+              <a:t>4/18/2014</a:t>
             </a:fld>
             <a:endParaRPr lang="en-US"/>
           </a:p>
@@ -21084,7 +21119,7 @@
           <a:p>
             <a:fld id="{03828354-E0C5-4131-9B49-1997E3EE3A7D}" type="datetimeFigureOut">
               <a:rPr lang="en-US" smtClean="0"/>
-              <a:t>4/17/2014</a:t>
+              <a:t>4/18/2014</a:t>
             </a:fld>
             <a:endParaRPr lang="en-US"/>
           </a:p>
@@ -21935,14 +21970,7 @@
                 <a:latin typeface="Arial" panose="020B0604020202020204" pitchFamily="34" charset="0"/>
                 <a:cs typeface="Arial" panose="020B0604020202020204" pitchFamily="34" charset="0"/>
               </a:rPr>
-              <a:t>Search </a:t>
-            </a:r>
-            <a:r>
-              <a:rPr lang="en-US" dirty="0" smtClean="0">
-                <a:latin typeface="Arial" panose="020B0604020202020204" pitchFamily="34" charset="0"/>
-                <a:cs typeface="Arial" panose="020B0604020202020204" pitchFamily="34" charset="0"/>
-              </a:rPr>
-              <a:t>product</a:t>
+              <a:t>Search product</a:t>
             </a:r>
             <a:endParaRPr lang="en-US" dirty="0">
               <a:latin typeface="Arial" panose="020B0604020202020204" pitchFamily="34" charset="0"/>
@@ -24103,24 +24131,72 @@
           <a:p>
             <a:r>
               <a:rPr lang="en-US" dirty="0" smtClean="0"/>
+              <a:t>Duplicate</a:t>
+            </a:r>
+            <a:endParaRPr lang="en-US" dirty="0" smtClean="0"/>
+          </a:p>
+          <a:p>
+            <a:r>
+              <a:rPr lang="en-US" dirty="0" smtClean="0"/>
+              <a:t>Error</a:t>
+            </a:r>
+            <a:endParaRPr lang="en-US" dirty="0" smtClean="0"/>
+          </a:p>
+          <a:p>
+            <a:r>
+              <a:rPr lang="en-US" dirty="0" smtClean="0"/>
               <a:t>Correct</a:t>
             </a:r>
           </a:p>
           <a:p>
-            <a:r>
-              <a:rPr lang="en-US" dirty="0" smtClean="0"/>
-              <a:t>Error.</a:t>
-            </a:r>
+            <a:endParaRPr lang="en-US" dirty="0"/>
           </a:p>
           <a:p>
             <a:r>
               <a:rPr lang="en-US" dirty="0" smtClean="0"/>
-              <a:t>Duplicate.</a:t>
+              <a:t>Merge: make two or more names refer to one product.</a:t>
+            </a:r>
+            <a:endParaRPr lang="en-US" dirty="0"/>
+          </a:p>
+          <a:p>
+            <a:r>
+              <a:rPr lang="en-US" dirty="0" smtClean="0"/>
+              <a:t>Split: different names mean different products.</a:t>
             </a:r>
             <a:endParaRPr lang="en-US" dirty="0"/>
           </a:p>
         </p:txBody>
       </p:sp>
+      <p:pic>
+        <p:nvPicPr>
+          <p:cNvPr id="4" name="Picture 3"/>
+          <p:cNvPicPr>
+            <a:picLocks noChangeAspect="1"/>
+          </p:cNvPicPr>
+          <p:nvPr/>
+        </p:nvPicPr>
+        <p:blipFill>
+          <a:blip r:embed="rId2">
+            <a:extLst>
+              <a:ext uri="{28A0092B-C50C-407E-A947-70E740481C1C}">
+                <a14:useLocalDpi xmlns:a14="http://schemas.microsoft.com/office/drawing/2010/main" val="0"/>
+              </a:ext>
+            </a:extLst>
+          </a:blip>
+          <a:stretch>
+            <a:fillRect/>
+          </a:stretch>
+        </p:blipFill>
+        <p:spPr>
+          <a:xfrm>
+            <a:off x="2209934" y="1832485"/>
+            <a:ext cx="7334250" cy="1666875"/>
+          </a:xfrm>
+          <a:prstGeom prst="rect">
+            <a:avLst/>
+          </a:prstGeom>
+        </p:spPr>
+      </p:pic>
     </p:spTree>
     <p:extLst>
       <p:ext uri="{BB962C8B-B14F-4D97-AF65-F5344CB8AC3E}">
@@ -24175,11 +24251,7 @@
           <a:p>
             <a:r>
               <a:rPr lang="en-US" dirty="0" smtClean="0"/>
-              <a:t>Import Excel </a:t>
-            </a:r>
-            <a:r>
-              <a:rPr lang="en-US" dirty="0" smtClean="0"/>
-              <a:t>Flow</a:t>
+              <a:t>Import Excel Flow</a:t>
             </a:r>
             <a:endParaRPr lang="en-US" dirty="0"/>
           </a:p>
@@ -27750,13 +27822,13 @@
   <p:clrMapOvr>
     <a:masterClrMapping/>
   </p:clrMapOvr>
-  <mc:AlternateContent xmlns:mc="http://schemas.openxmlformats.org/markup-compatibility/2006">
-    <mc:Choice xmlns:p14="http://schemas.microsoft.com/office/powerpoint/2010/main" Requires="p14">
+  <mc:AlternateContent xmlns:mc="http://schemas.openxmlformats.org/markup-compatibility/2006" xmlns:p14="http://schemas.microsoft.com/office/powerpoint/2010/main">
+    <mc:Choice Requires="p14">
       <p:transition spd="slow" p14:dur="1400">
         <p14:doors dir="vert"/>
       </p:transition>
     </mc:Choice>
-    <mc:Fallback>
+    <mc:Fallback xmlns="">
       <p:transition spd="slow">
         <p:fade/>
       </p:transition>
@@ -27858,13 +27930,13 @@
   <p:clrMapOvr>
     <a:masterClrMapping/>
   </p:clrMapOvr>
-  <mc:AlternateContent xmlns:mc="http://schemas.openxmlformats.org/markup-compatibility/2006">
-    <mc:Choice xmlns:p14="http://schemas.microsoft.com/office/powerpoint/2010/main" Requires="p14">
+  <mc:AlternateContent xmlns:mc="http://schemas.openxmlformats.org/markup-compatibility/2006" xmlns:p14="http://schemas.microsoft.com/office/powerpoint/2010/main">
+    <mc:Choice Requires="p14">
       <p:transition spd="slow" p14:dur="1600">
         <p14:gallery dir="l"/>
       </p:transition>
     </mc:Choice>
-    <mc:Fallback>
+    <mc:Fallback xmlns="">
       <p:transition spd="slow">
         <p:fade/>
       </p:transition>
@@ -27959,13 +28031,13 @@
   <p:clrMapOvr>
     <a:masterClrMapping/>
   </p:clrMapOvr>
-  <mc:AlternateContent xmlns:mc="http://schemas.openxmlformats.org/markup-compatibility/2006">
-    <mc:Choice xmlns:p14="http://schemas.microsoft.com/office/powerpoint/2010/main" Requires="p14">
+  <mc:AlternateContent xmlns:mc="http://schemas.openxmlformats.org/markup-compatibility/2006" xmlns:p14="http://schemas.microsoft.com/office/powerpoint/2010/main">
+    <mc:Choice Requires="p14">
       <p:transition spd="slow" p14:dur="1600">
         <p14:gallery dir="l"/>
       </p:transition>
     </mc:Choice>
-    <mc:Fallback>
+    <mc:Fallback xmlns="">
       <p:transition spd="slow">
         <p:fade/>
       </p:transition>
@@ -28134,22 +28206,28 @@
           <a:lstStyle/>
           <a:p>
             <a:r>
-              <a:rPr lang="en-US" dirty="0" smtClean="0"/>
-              <a:t>Step 1:</a:t>
+              <a:rPr lang="en-US" dirty="0"/>
+              <a:t>Step 1: Import Excel.</a:t>
             </a:r>
           </a:p>
           <a:p>
             <a:r>
-              <a:rPr lang="en-US" dirty="0" smtClean="0"/>
-              <a:t>Step 2:</a:t>
+              <a:rPr lang="en-US" dirty="0"/>
+              <a:t>Step 2: Process error products &amp; duplicate products.</a:t>
             </a:r>
           </a:p>
           <a:p>
             <a:r>
-              <a:rPr lang="en-US" smtClean="0"/>
-              <a:t>Step 3:</a:t>
+              <a:rPr lang="en-US" dirty="0"/>
+              <a:t>Step 3: Save correct products to database.</a:t>
             </a:r>
-            <a:endParaRPr lang="en-US"/>
+          </a:p>
+          <a:p>
+            <a:r>
+              <a:rPr lang="en-US" dirty="0"/>
+              <a:t>Step 4: Process duplicate products with database.</a:t>
+            </a:r>
+            <a:endParaRPr lang="en-US" dirty="0"/>
           </a:p>
         </p:txBody>
       </p:sp>
@@ -32608,8 +32686,8 @@
         </p:blipFill>
         <p:spPr>
           <a:xfrm>
-            <a:off x="1846175" y="1395064"/>
-            <a:ext cx="7656398" cy="5072062"/>
+            <a:off x="1846175" y="1395063"/>
+            <a:ext cx="7812982" cy="5175793"/>
           </a:xfrm>
           <a:prstGeom prst="rect">
             <a:avLst/>
@@ -33048,13 +33126,13 @@
   <p:clrMapOvr>
     <a:masterClrMapping/>
   </p:clrMapOvr>
-  <mc:AlternateContent xmlns:mc="http://schemas.openxmlformats.org/markup-compatibility/2006">
-    <mc:Choice xmlns:p14="http://schemas.microsoft.com/office/powerpoint/2010/main" Requires="p14">
+  <mc:AlternateContent xmlns:mc="http://schemas.openxmlformats.org/markup-compatibility/2006" xmlns:p14="http://schemas.microsoft.com/office/powerpoint/2010/main">
+    <mc:Choice Requires="p14">
       <p:transition spd="slow" p14:dur="3900">
         <p14:glitter pattern="hexagon"/>
       </p:transition>
     </mc:Choice>
-    <mc:Fallback>
+    <mc:Fallback xmlns="">
       <p:transition spd="slow">
         <p:fade/>
       </p:transition>
@@ -33853,7 +33931,7 @@
   <a:extraClrSchemeLst/>
   <a:extLst>
     <a:ext uri="{05A4C25C-085E-4340-85A3-A5531E510DB2}">
-      <thm15:themeFamily xmlns:thm15="http://schemas.microsoft.com/office/thememl/2012/main" xmlns="" name="Facet" id="{C0C680CD-088A-49FC-A102-D699147F32B2}" vid="{CFBC31BA-B70F-4F30-BCAA-4F3011E16C4D}"/>
+      <thm15:themeFamily xmlns="" xmlns:thm15="http://schemas.microsoft.com/office/thememl/2012/main" name="Facet" id="{C0C680CD-088A-49FC-A102-D699147F32B2}" vid="{CFBC31BA-B70F-4F30-BCAA-4F3011E16C4D}"/>
     </a:ext>
   </a:extLst>
 </a:theme>

</xml_diff>

<commit_message>
- Document + Slide.
</commit_message>
<xml_diff>
--- a/ smart-buy/Slides/Smart Buy.pptx
+++ b/ smart-buy/Slides/Smart Buy.pptx
@@ -9,27 +9,30 @@
     <p:sldId id="257" r:id="rId3"/>
     <p:sldId id="258" r:id="rId4"/>
     <p:sldId id="259" r:id="rId5"/>
-    <p:sldId id="271" r:id="rId6"/>
-    <p:sldId id="272" r:id="rId7"/>
-    <p:sldId id="269" r:id="rId8"/>
-    <p:sldId id="285" r:id="rId9"/>
-    <p:sldId id="284" r:id="rId10"/>
-    <p:sldId id="274" r:id="rId11"/>
-    <p:sldId id="265" r:id="rId12"/>
-    <p:sldId id="266" r:id="rId13"/>
-    <p:sldId id="275" r:id="rId14"/>
-    <p:sldId id="276" r:id="rId15"/>
-    <p:sldId id="267" r:id="rId16"/>
-    <p:sldId id="278" r:id="rId17"/>
-    <p:sldId id="277" r:id="rId18"/>
-    <p:sldId id="282" r:id="rId19"/>
-    <p:sldId id="283" r:id="rId20"/>
-    <p:sldId id="281" r:id="rId21"/>
-    <p:sldId id="279" r:id="rId22"/>
-    <p:sldId id="261" r:id="rId23"/>
-    <p:sldId id="268" r:id="rId24"/>
-    <p:sldId id="270" r:id="rId25"/>
-    <p:sldId id="264" r:id="rId26"/>
+    <p:sldId id="286" r:id="rId6"/>
+    <p:sldId id="287" r:id="rId7"/>
+    <p:sldId id="288" r:id="rId8"/>
+    <p:sldId id="289" r:id="rId9"/>
+    <p:sldId id="272" r:id="rId10"/>
+    <p:sldId id="269" r:id="rId11"/>
+    <p:sldId id="285" r:id="rId12"/>
+    <p:sldId id="284" r:id="rId13"/>
+    <p:sldId id="274" r:id="rId14"/>
+    <p:sldId id="265" r:id="rId15"/>
+    <p:sldId id="266" r:id="rId16"/>
+    <p:sldId id="275" r:id="rId17"/>
+    <p:sldId id="276" r:id="rId18"/>
+    <p:sldId id="267" r:id="rId19"/>
+    <p:sldId id="278" r:id="rId20"/>
+    <p:sldId id="277" r:id="rId21"/>
+    <p:sldId id="282" r:id="rId22"/>
+    <p:sldId id="283" r:id="rId23"/>
+    <p:sldId id="281" r:id="rId24"/>
+    <p:sldId id="279" r:id="rId25"/>
+    <p:sldId id="261" r:id="rId26"/>
+    <p:sldId id="268" r:id="rId27"/>
+    <p:sldId id="270" r:id="rId28"/>
+    <p:sldId id="264" r:id="rId29"/>
   </p:sldIdLst>
   <p:sldSz cx="12192000" cy="6858000"/>
   <p:notesSz cx="6858000" cy="9144000"/>
@@ -25522,6 +25525,1227 @@
           <a:p>
             <a:r>
               <a:rPr lang="en-US" dirty="0" smtClean="0"/>
+              <a:t>Our Solution</a:t>
+            </a:r>
+            <a:endParaRPr lang="en-GB" dirty="0"/>
+          </a:p>
+        </p:txBody>
+      </p:sp>
+      <p:pic>
+        <p:nvPicPr>
+          <p:cNvPr id="8" name="Content Placeholder 7"/>
+          <p:cNvPicPr>
+            <a:picLocks noGrp="1" noChangeAspect="1"/>
+          </p:cNvPicPr>
+          <p:nvPr>
+            <p:ph idx="1"/>
+          </p:nvPr>
+        </p:nvPicPr>
+        <p:blipFill>
+          <a:blip r:embed="rId2">
+            <a:extLst>
+              <a:ext uri="{28A0092B-C50C-407E-A947-70E740481C1C}">
+                <a14:useLocalDpi xmlns:a14="http://schemas.microsoft.com/office/drawing/2010/main" val="0"/>
+              </a:ext>
+            </a:extLst>
+          </a:blip>
+          <a:stretch>
+            <a:fillRect/>
+          </a:stretch>
+        </p:blipFill>
+        <p:spPr>
+          <a:xfrm>
+            <a:off x="829487" y="2354594"/>
+            <a:ext cx="1627200" cy="1627200"/>
+          </a:xfrm>
+        </p:spPr>
+      </p:pic>
+      <p:pic>
+        <p:nvPicPr>
+          <p:cNvPr id="9" name="Picture 8"/>
+          <p:cNvPicPr>
+            <a:picLocks noChangeAspect="1"/>
+          </p:cNvPicPr>
+          <p:nvPr/>
+        </p:nvPicPr>
+        <p:blipFill>
+          <a:blip r:embed="rId3" cstate="print">
+            <a:extLst>
+              <a:ext uri="{28A0092B-C50C-407E-A947-70E740481C1C}">
+                <a14:useLocalDpi xmlns:a14="http://schemas.microsoft.com/office/drawing/2010/main" val="0"/>
+              </a:ext>
+            </a:extLst>
+          </a:blip>
+          <a:stretch>
+            <a:fillRect/>
+          </a:stretch>
+        </p:blipFill>
+        <p:spPr>
+          <a:xfrm>
+            <a:off x="5104326" y="2354594"/>
+            <a:ext cx="1446895" cy="1627200"/>
+          </a:xfrm>
+          <a:prstGeom prst="rect">
+            <a:avLst/>
+          </a:prstGeom>
+        </p:spPr>
+      </p:pic>
+      <p:pic>
+        <p:nvPicPr>
+          <p:cNvPr id="10" name="Picture 9"/>
+          <p:cNvPicPr>
+            <a:picLocks noChangeAspect="1"/>
+          </p:cNvPicPr>
+          <p:nvPr/>
+        </p:nvPicPr>
+        <p:blipFill>
+          <a:blip r:embed="rId4">
+            <a:extLst>
+              <a:ext uri="{28A0092B-C50C-407E-A947-70E740481C1C}">
+                <a14:useLocalDpi xmlns:a14="http://schemas.microsoft.com/office/drawing/2010/main" val="0"/>
+              </a:ext>
+            </a:extLst>
+          </a:blip>
+          <a:stretch>
+            <a:fillRect/>
+          </a:stretch>
+        </p:blipFill>
+        <p:spPr>
+          <a:xfrm>
+            <a:off x="9062905" y="2406101"/>
+            <a:ext cx="1627200" cy="1627200"/>
+          </a:xfrm>
+          <a:prstGeom prst="rect">
+            <a:avLst/>
+          </a:prstGeom>
+        </p:spPr>
+      </p:pic>
+      <p:sp>
+        <p:nvSpPr>
+          <p:cNvPr id="11" name="Right Arrow 10"/>
+          <p:cNvSpPr/>
+          <p:nvPr/>
+        </p:nvSpPr>
+        <p:spPr>
+          <a:xfrm>
+            <a:off x="2588654" y="2665927"/>
+            <a:ext cx="2511380" cy="1171977"/>
+          </a:xfrm>
+          <a:prstGeom prst="rightArrow">
+            <a:avLst/>
+          </a:prstGeom>
+        </p:spPr>
+        <p:style>
+          <a:lnRef idx="2">
+            <a:schemeClr val="accent1">
+              <a:shade val="50000"/>
+            </a:schemeClr>
+          </a:lnRef>
+          <a:fillRef idx="1">
+            <a:schemeClr val="accent1"/>
+          </a:fillRef>
+          <a:effectRef idx="0">
+            <a:schemeClr val="accent1"/>
+          </a:effectRef>
+          <a:fontRef idx="minor">
+            <a:schemeClr val="lt1"/>
+          </a:fontRef>
+        </p:style>
+        <p:txBody>
+          <a:bodyPr rtlCol="0" anchor="ctr"/>
+          <a:lstStyle/>
+          <a:p>
+            <a:pPr algn="ctr"/>
+            <a:r>
+              <a:rPr lang="en-US" dirty="0" smtClean="0"/>
+              <a:t>Track</a:t>
+            </a:r>
+            <a:endParaRPr lang="en-GB" dirty="0"/>
+          </a:p>
+        </p:txBody>
+      </p:sp>
+      <p:sp>
+        <p:nvSpPr>
+          <p:cNvPr id="12" name="Right Arrow 11"/>
+          <p:cNvSpPr/>
+          <p:nvPr/>
+        </p:nvSpPr>
+        <p:spPr>
+          <a:xfrm>
+            <a:off x="6550105" y="2664304"/>
+            <a:ext cx="2512800" cy="1173600"/>
+          </a:xfrm>
+          <a:prstGeom prst="rightArrow">
+            <a:avLst/>
+          </a:prstGeom>
+        </p:spPr>
+        <p:style>
+          <a:lnRef idx="2">
+            <a:schemeClr val="accent1">
+              <a:shade val="50000"/>
+            </a:schemeClr>
+          </a:lnRef>
+          <a:fillRef idx="1">
+            <a:schemeClr val="accent1"/>
+          </a:fillRef>
+          <a:effectRef idx="0">
+            <a:schemeClr val="accent1"/>
+          </a:effectRef>
+          <a:fontRef idx="minor">
+            <a:schemeClr val="lt1"/>
+          </a:fontRef>
+        </p:style>
+        <p:txBody>
+          <a:bodyPr rtlCol="0" anchor="ctr"/>
+          <a:lstStyle/>
+          <a:p>
+            <a:pPr algn="ctr"/>
+            <a:r>
+              <a:rPr lang="en-US" dirty="0" smtClean="0"/>
+              <a:t>Give</a:t>
+            </a:r>
+            <a:endParaRPr lang="en-GB" dirty="0"/>
+          </a:p>
+        </p:txBody>
+      </p:sp>
+      <p:sp>
+        <p:nvSpPr>
+          <p:cNvPr id="13" name="TextBox 12"/>
+          <p:cNvSpPr txBox="1"/>
+          <p:nvPr/>
+        </p:nvSpPr>
+        <p:spPr>
+          <a:xfrm>
+            <a:off x="1068945" y="4108359"/>
+            <a:ext cx="912429" cy="369332"/>
+          </a:xfrm>
+          <a:prstGeom prst="rect">
+            <a:avLst/>
+          </a:prstGeom>
+          <a:noFill/>
+        </p:spPr>
+        <p:txBody>
+          <a:bodyPr wrap="none" rtlCol="0">
+            <a:spAutoFit/>
+          </a:bodyPr>
+          <a:lstStyle/>
+          <a:p>
+            <a:r>
+              <a:rPr lang="en-US" dirty="0" smtClean="0"/>
+              <a:t>System</a:t>
+            </a:r>
+            <a:endParaRPr lang="en-GB" dirty="0"/>
+          </a:p>
+        </p:txBody>
+      </p:sp>
+      <p:sp>
+        <p:nvSpPr>
+          <p:cNvPr id="14" name="TextBox 13"/>
+          <p:cNvSpPr txBox="1"/>
+          <p:nvPr/>
+        </p:nvSpPr>
+        <p:spPr>
+          <a:xfrm>
+            <a:off x="5478767" y="4108359"/>
+            <a:ext cx="698012" cy="369332"/>
+          </a:xfrm>
+          <a:prstGeom prst="rect">
+            <a:avLst/>
+          </a:prstGeom>
+          <a:noFill/>
+        </p:spPr>
+        <p:txBody>
+          <a:bodyPr wrap="none" rtlCol="0">
+            <a:spAutoFit/>
+          </a:bodyPr>
+          <a:lstStyle/>
+          <a:p>
+            <a:r>
+              <a:rPr lang="en-US" dirty="0" smtClean="0"/>
+              <a:t>Price</a:t>
+            </a:r>
+            <a:endParaRPr lang="en-GB" dirty="0"/>
+          </a:p>
+        </p:txBody>
+      </p:sp>
+      <p:sp>
+        <p:nvSpPr>
+          <p:cNvPr id="15" name="TextBox 14"/>
+          <p:cNvSpPr txBox="1"/>
+          <p:nvPr/>
+        </p:nvSpPr>
+        <p:spPr>
+          <a:xfrm>
+            <a:off x="9236746" y="4108359"/>
+            <a:ext cx="1279517" cy="369332"/>
+          </a:xfrm>
+          <a:prstGeom prst="rect">
+            <a:avLst/>
+          </a:prstGeom>
+          <a:noFill/>
+        </p:spPr>
+        <p:txBody>
+          <a:bodyPr wrap="none" rtlCol="0">
+            <a:spAutoFit/>
+          </a:bodyPr>
+          <a:lstStyle/>
+          <a:p>
+            <a:r>
+              <a:rPr lang="en-US" dirty="0" smtClean="0"/>
+              <a:t>Suggestion</a:t>
+            </a:r>
+            <a:endParaRPr lang="en-GB" dirty="0"/>
+          </a:p>
+        </p:txBody>
+      </p:sp>
+    </p:spTree>
+    <p:extLst>
+      <p:ext uri="{BB962C8B-B14F-4D97-AF65-F5344CB8AC3E}">
+        <p14:creationId xmlns:p14="http://schemas.microsoft.com/office/powerpoint/2010/main" val="3140107869"/>
+      </p:ext>
+    </p:extLst>
+  </p:cSld>
+  <p:clrMapOvr>
+    <a:masterClrMapping/>
+  </p:clrMapOvr>
+  <p:transition spd="slow">
+    <p:wipe dir="r"/>
+  </p:transition>
+  <p:timing>
+    <p:tnLst>
+      <p:par>
+        <p:cTn id="1" dur="indefinite" restart="never" nodeType="tmRoot"/>
+      </p:par>
+    </p:tnLst>
+  </p:timing>
+</p:sld>
+</file>
+
+<file path=ppt/slides/slide11.xml><?xml version="1.0" encoding="utf-8"?>
+<p:sld xmlns:a="http://schemas.openxmlformats.org/drawingml/2006/main" xmlns:r="http://schemas.openxmlformats.org/officeDocument/2006/relationships" xmlns:p="http://schemas.openxmlformats.org/presentationml/2006/main">
+  <p:cSld>
+    <p:spTree>
+      <p:nvGrpSpPr>
+        <p:cNvPr id="1" name=""/>
+        <p:cNvGrpSpPr/>
+        <p:nvPr/>
+      </p:nvGrpSpPr>
+      <p:grpSpPr>
+        <a:xfrm>
+          <a:off x="0" y="0"/>
+          <a:ext cx="0" cy="0"/>
+          <a:chOff x="0" y="0"/>
+          <a:chExt cx="0" cy="0"/>
+        </a:xfrm>
+      </p:grpSpPr>
+      <p:sp>
+        <p:nvSpPr>
+          <p:cNvPr id="2" name="Title 1"/>
+          <p:cNvSpPr>
+            <a:spLocks noGrp="1"/>
+          </p:cNvSpPr>
+          <p:nvPr>
+            <p:ph type="title"/>
+          </p:nvPr>
+        </p:nvSpPr>
+        <p:spPr/>
+        <p:txBody>
+          <a:bodyPr/>
+          <a:lstStyle/>
+          <a:p>
+            <a:r>
+              <a:rPr lang="en-US" dirty="0" smtClean="0"/>
+              <a:t>Features</a:t>
+            </a:r>
+            <a:endParaRPr lang="en-GB" dirty="0"/>
+          </a:p>
+        </p:txBody>
+      </p:sp>
+      <p:graphicFrame>
+        <p:nvGraphicFramePr>
+          <p:cNvPr id="4" name="Content Placeholder 3"/>
+          <p:cNvGraphicFramePr>
+            <a:graphicFrameLocks noGrp="1"/>
+          </p:cNvGraphicFramePr>
+          <p:nvPr>
+            <p:ph idx="1"/>
+            <p:extLst>
+              <p:ext uri="{D42A27DB-BD31-4B8C-83A1-F6EECF244321}">
+                <p14:modId xmlns:p14="http://schemas.microsoft.com/office/powerpoint/2010/main" val="1990236922"/>
+              </p:ext>
+            </p:extLst>
+          </p:nvPr>
+        </p:nvGraphicFramePr>
+        <p:xfrm>
+          <a:off x="458922" y="1787101"/>
+          <a:ext cx="9689630" cy="4613699"/>
+        </p:xfrm>
+        <a:graphic>
+          <a:graphicData uri="http://schemas.openxmlformats.org/drawingml/2006/diagram">
+            <dgm:relIds xmlns:dgm="http://schemas.openxmlformats.org/drawingml/2006/diagram" xmlns:r="http://schemas.openxmlformats.org/officeDocument/2006/relationships" r:dm="rId2" r:lo="rId3" r:qs="rId4" r:cs="rId5"/>
+          </a:graphicData>
+        </a:graphic>
+      </p:graphicFrame>
+    </p:spTree>
+    <p:extLst>
+      <p:ext uri="{BB962C8B-B14F-4D97-AF65-F5344CB8AC3E}">
+        <p14:creationId xmlns:p14="http://schemas.microsoft.com/office/powerpoint/2010/main" val="2669957109"/>
+      </p:ext>
+    </p:extLst>
+  </p:cSld>
+  <p:clrMapOvr>
+    <a:masterClrMapping/>
+  </p:clrMapOvr>
+  <mc:AlternateContent xmlns:mc="http://schemas.openxmlformats.org/markup-compatibility/2006">
+    <mc:Choice xmlns:p14="http://schemas.microsoft.com/office/powerpoint/2010/main" Requires="p14">
+      <p:transition spd="slow" p14:dur="1500">
+        <p:split orient="vert"/>
+      </p:transition>
+    </mc:Choice>
+    <mc:Fallback>
+      <p:transition spd="slow">
+        <p:split orient="vert"/>
+      </p:transition>
+    </mc:Fallback>
+  </mc:AlternateContent>
+  <p:timing>
+    <p:tnLst>
+      <p:par>
+        <p:cTn id="1" dur="indefinite" restart="never" nodeType="tmRoot"/>
+      </p:par>
+    </p:tnLst>
+  </p:timing>
+</p:sld>
+</file>
+
+<file path=ppt/slides/slide12.xml><?xml version="1.0" encoding="utf-8"?>
+<p:sld xmlns:a="http://schemas.openxmlformats.org/drawingml/2006/main" xmlns:r="http://schemas.openxmlformats.org/officeDocument/2006/relationships" xmlns:p="http://schemas.openxmlformats.org/presentationml/2006/main">
+  <p:cSld>
+    <p:spTree>
+      <p:nvGrpSpPr>
+        <p:cNvPr id="1" name=""/>
+        <p:cNvGrpSpPr/>
+        <p:nvPr/>
+      </p:nvGrpSpPr>
+      <p:grpSpPr>
+        <a:xfrm>
+          <a:off x="0" y="0"/>
+          <a:ext cx="0" cy="0"/>
+          <a:chOff x="0" y="0"/>
+          <a:chExt cx="0" cy="0"/>
+        </a:xfrm>
+      </p:grpSpPr>
+      <p:sp>
+        <p:nvSpPr>
+          <p:cNvPr id="2" name="Title 1"/>
+          <p:cNvSpPr>
+            <a:spLocks noGrp="1"/>
+          </p:cNvSpPr>
+          <p:nvPr>
+            <p:ph type="title"/>
+          </p:nvPr>
+        </p:nvSpPr>
+        <p:spPr/>
+        <p:txBody>
+          <a:bodyPr/>
+          <a:lstStyle/>
+          <a:p>
+            <a:r>
+              <a:rPr lang="en-US" dirty="0" smtClean="0"/>
+              <a:t>Demonstration Story</a:t>
+            </a:r>
+            <a:endParaRPr lang="en-GB" dirty="0"/>
+          </a:p>
+        </p:txBody>
+      </p:sp>
+      <p:pic>
+        <p:nvPicPr>
+          <p:cNvPr id="4" name="Picture 3"/>
+          <p:cNvPicPr>
+            <a:picLocks noChangeAspect="1"/>
+          </p:cNvPicPr>
+          <p:nvPr/>
+        </p:nvPicPr>
+        <p:blipFill>
+          <a:blip r:embed="rId2" cstate="print">
+            <a:extLst>
+              <a:ext uri="{28A0092B-C50C-407E-A947-70E740481C1C}">
+                <a14:useLocalDpi xmlns:a14="http://schemas.microsoft.com/office/drawing/2010/main" val="0"/>
+              </a:ext>
+            </a:extLst>
+          </a:blip>
+          <a:stretch>
+            <a:fillRect/>
+          </a:stretch>
+        </p:blipFill>
+        <p:spPr>
+          <a:xfrm>
+            <a:off x="352469" y="1945559"/>
+            <a:ext cx="1545167" cy="1627200"/>
+          </a:xfrm>
+          <a:prstGeom prst="rect">
+            <a:avLst/>
+          </a:prstGeom>
+        </p:spPr>
+      </p:pic>
+      <p:pic>
+        <p:nvPicPr>
+          <p:cNvPr id="5" name="Picture 4"/>
+          <p:cNvPicPr>
+            <a:picLocks noChangeAspect="1"/>
+          </p:cNvPicPr>
+          <p:nvPr/>
+        </p:nvPicPr>
+        <p:blipFill>
+          <a:blip r:embed="rId3">
+            <a:extLst>
+              <a:ext uri="{28A0092B-C50C-407E-A947-70E740481C1C}">
+                <a14:useLocalDpi xmlns:a14="http://schemas.microsoft.com/office/drawing/2010/main" val="0"/>
+              </a:ext>
+            </a:extLst>
+          </a:blip>
+          <a:stretch>
+            <a:fillRect/>
+          </a:stretch>
+        </p:blipFill>
+        <p:spPr>
+          <a:xfrm>
+            <a:off x="3760034" y="1945559"/>
+            <a:ext cx="1627200" cy="1627200"/>
+          </a:xfrm>
+          <a:prstGeom prst="rect">
+            <a:avLst/>
+          </a:prstGeom>
+        </p:spPr>
+      </p:pic>
+      <p:pic>
+        <p:nvPicPr>
+          <p:cNvPr id="6" name="Picture 5"/>
+          <p:cNvPicPr>
+            <a:picLocks noChangeAspect="1"/>
+          </p:cNvPicPr>
+          <p:nvPr/>
+        </p:nvPicPr>
+        <p:blipFill>
+          <a:blip r:embed="rId4" cstate="print">
+            <a:extLst>
+              <a:ext uri="{28A0092B-C50C-407E-A947-70E740481C1C}">
+                <a14:useLocalDpi xmlns:a14="http://schemas.microsoft.com/office/drawing/2010/main" val="0"/>
+              </a:ext>
+            </a:extLst>
+          </a:blip>
+          <a:stretch>
+            <a:fillRect/>
+          </a:stretch>
+        </p:blipFill>
+        <p:spPr>
+          <a:xfrm>
+            <a:off x="3760034" y="4901652"/>
+            <a:ext cx="1627200" cy="1627200"/>
+          </a:xfrm>
+          <a:prstGeom prst="rect">
+            <a:avLst/>
+          </a:prstGeom>
+        </p:spPr>
+      </p:pic>
+      <p:cxnSp>
+        <p:nvCxnSpPr>
+          <p:cNvPr id="8" name="Straight Arrow Connector 7"/>
+          <p:cNvCxnSpPr>
+            <a:stCxn id="4" idx="3"/>
+            <a:endCxn id="5" idx="1"/>
+          </p:cNvCxnSpPr>
+          <p:nvPr/>
+        </p:nvCxnSpPr>
+        <p:spPr>
+          <a:xfrm>
+            <a:off x="1897636" y="2759159"/>
+            <a:ext cx="1862398" cy="0"/>
+          </a:xfrm>
+          <a:prstGeom prst="straightConnector1">
+            <a:avLst/>
+          </a:prstGeom>
+          <a:ln w="38100">
+            <a:tailEnd type="arrow"/>
+          </a:ln>
+        </p:spPr>
+        <p:style>
+          <a:lnRef idx="1">
+            <a:schemeClr val="accent1"/>
+          </a:lnRef>
+          <a:fillRef idx="0">
+            <a:schemeClr val="accent1"/>
+          </a:fillRef>
+          <a:effectRef idx="0">
+            <a:schemeClr val="accent1"/>
+          </a:effectRef>
+          <a:fontRef idx="minor">
+            <a:schemeClr val="tx1"/>
+          </a:fontRef>
+        </p:style>
+      </p:cxnSp>
+      <p:pic>
+        <p:nvPicPr>
+          <p:cNvPr id="9" name="Picture 8"/>
+          <p:cNvPicPr>
+            <a:picLocks noChangeAspect="1"/>
+          </p:cNvPicPr>
+          <p:nvPr/>
+        </p:nvPicPr>
+        <p:blipFill>
+          <a:blip r:embed="rId5">
+            <a:extLst>
+              <a:ext uri="{28A0092B-C50C-407E-A947-70E740481C1C}">
+                <a14:useLocalDpi xmlns:a14="http://schemas.microsoft.com/office/drawing/2010/main" val="0"/>
+              </a:ext>
+            </a:extLst>
+          </a:blip>
+          <a:stretch>
+            <a:fillRect/>
+          </a:stretch>
+        </p:blipFill>
+        <p:spPr>
+          <a:xfrm>
+            <a:off x="7300090" y="4901652"/>
+            <a:ext cx="1627200" cy="1627200"/>
+          </a:xfrm>
+          <a:prstGeom prst="rect">
+            <a:avLst/>
+          </a:prstGeom>
+        </p:spPr>
+      </p:pic>
+      <p:pic>
+        <p:nvPicPr>
+          <p:cNvPr id="10" name="Picture 9"/>
+          <p:cNvPicPr>
+            <a:picLocks noChangeAspect="1"/>
+          </p:cNvPicPr>
+          <p:nvPr/>
+        </p:nvPicPr>
+        <p:blipFill>
+          <a:blip r:embed="rId6">
+            <a:extLst>
+              <a:ext uri="{28A0092B-C50C-407E-A947-70E740481C1C}">
+                <a14:useLocalDpi xmlns:a14="http://schemas.microsoft.com/office/drawing/2010/main" val="0"/>
+              </a:ext>
+            </a:extLst>
+          </a:blip>
+          <a:stretch>
+            <a:fillRect/>
+          </a:stretch>
+        </p:blipFill>
+        <p:spPr>
+          <a:xfrm>
+            <a:off x="7300090" y="1945559"/>
+            <a:ext cx="1627200" cy="1627200"/>
+          </a:xfrm>
+          <a:prstGeom prst="rect">
+            <a:avLst/>
+          </a:prstGeom>
+        </p:spPr>
+      </p:pic>
+      <p:cxnSp>
+        <p:nvCxnSpPr>
+          <p:cNvPr id="16" name="Straight Arrow Connector 15"/>
+          <p:cNvCxnSpPr>
+            <a:stCxn id="5" idx="2"/>
+            <a:endCxn id="6" idx="0"/>
+          </p:cNvCxnSpPr>
+          <p:nvPr/>
+        </p:nvCxnSpPr>
+        <p:spPr>
+          <a:xfrm>
+            <a:off x="4573634" y="3572759"/>
+            <a:ext cx="0" cy="1328893"/>
+          </a:xfrm>
+          <a:prstGeom prst="straightConnector1">
+            <a:avLst/>
+          </a:prstGeom>
+          <a:ln w="38100">
+            <a:tailEnd type="arrow"/>
+          </a:ln>
+        </p:spPr>
+        <p:style>
+          <a:lnRef idx="1">
+            <a:schemeClr val="accent1"/>
+          </a:lnRef>
+          <a:fillRef idx="0">
+            <a:schemeClr val="accent1"/>
+          </a:fillRef>
+          <a:effectRef idx="0">
+            <a:schemeClr val="accent1"/>
+          </a:effectRef>
+          <a:fontRef idx="minor">
+            <a:schemeClr val="tx1"/>
+          </a:fontRef>
+        </p:style>
+      </p:cxnSp>
+      <p:cxnSp>
+        <p:nvCxnSpPr>
+          <p:cNvPr id="18" name="Straight Arrow Connector 17"/>
+          <p:cNvCxnSpPr>
+            <a:stCxn id="6" idx="3"/>
+            <a:endCxn id="9" idx="1"/>
+          </p:cNvCxnSpPr>
+          <p:nvPr/>
+        </p:nvCxnSpPr>
+        <p:spPr>
+          <a:xfrm>
+            <a:off x="5387234" y="5715252"/>
+            <a:ext cx="1912856" cy="0"/>
+          </a:xfrm>
+          <a:prstGeom prst="straightConnector1">
+            <a:avLst/>
+          </a:prstGeom>
+          <a:ln w="38100">
+            <a:tailEnd type="arrow"/>
+          </a:ln>
+        </p:spPr>
+        <p:style>
+          <a:lnRef idx="1">
+            <a:schemeClr val="accent1"/>
+          </a:lnRef>
+          <a:fillRef idx="0">
+            <a:schemeClr val="accent1"/>
+          </a:fillRef>
+          <a:effectRef idx="0">
+            <a:schemeClr val="accent1"/>
+          </a:effectRef>
+          <a:fontRef idx="minor">
+            <a:schemeClr val="tx1"/>
+          </a:fontRef>
+        </p:style>
+      </p:cxnSp>
+      <p:cxnSp>
+        <p:nvCxnSpPr>
+          <p:cNvPr id="20" name="Straight Arrow Connector 19"/>
+          <p:cNvCxnSpPr>
+            <a:stCxn id="9" idx="0"/>
+            <a:endCxn id="10" idx="2"/>
+          </p:cNvCxnSpPr>
+          <p:nvPr/>
+        </p:nvCxnSpPr>
+        <p:spPr>
+          <a:xfrm flipV="1">
+            <a:off x="8113690" y="3572759"/>
+            <a:ext cx="0" cy="1328893"/>
+          </a:xfrm>
+          <a:prstGeom prst="straightConnector1">
+            <a:avLst/>
+          </a:prstGeom>
+          <a:ln w="38100">
+            <a:tailEnd type="arrow"/>
+          </a:ln>
+        </p:spPr>
+        <p:style>
+          <a:lnRef idx="1">
+            <a:schemeClr val="accent1"/>
+          </a:lnRef>
+          <a:fillRef idx="0">
+            <a:schemeClr val="accent1"/>
+          </a:fillRef>
+          <a:effectRef idx="0">
+            <a:schemeClr val="accent1"/>
+          </a:effectRef>
+          <a:fontRef idx="minor">
+            <a:schemeClr val="tx1"/>
+          </a:fontRef>
+        </p:style>
+      </p:cxnSp>
+    </p:spTree>
+    <p:extLst>
+      <p:ext uri="{BB962C8B-B14F-4D97-AF65-F5344CB8AC3E}">
+        <p14:creationId xmlns:p14="http://schemas.microsoft.com/office/powerpoint/2010/main" val="1836446923"/>
+      </p:ext>
+    </p:extLst>
+  </p:cSld>
+  <p:clrMapOvr>
+    <a:masterClrMapping/>
+  </p:clrMapOvr>
+  <mc:AlternateContent xmlns:mc="http://schemas.openxmlformats.org/markup-compatibility/2006" xmlns:p14="http://schemas.microsoft.com/office/powerpoint/2010/main">
+    <mc:Choice Requires="p14">
+      <p:transition spd="slow" p14:dur="1600">
+        <p:blinds dir="vert"/>
+      </p:transition>
+    </mc:Choice>
+    <mc:Fallback xmlns="">
+      <p:transition spd="slow">
+        <p:blinds dir="vert"/>
+      </p:transition>
+    </mc:Fallback>
+  </mc:AlternateContent>
+  <p:timing>
+    <p:tnLst>
+      <p:par>
+        <p:cTn id="1" dur="indefinite" restart="never" nodeType="tmRoot">
+          <p:childTnLst>
+            <p:seq concurrent="1" nextAc="seek">
+              <p:cTn id="2" dur="indefinite" nodeType="mainSeq">
+                <p:childTnLst>
+                  <p:par>
+                    <p:cTn id="3" fill="hold">
+                      <p:stCondLst>
+                        <p:cond delay="indefinite"/>
+                      </p:stCondLst>
+                      <p:childTnLst>
+                        <p:par>
+                          <p:cTn id="4" fill="hold">
+                            <p:stCondLst>
+                              <p:cond delay="0"/>
+                            </p:stCondLst>
+                            <p:childTnLst>
+                              <p:par>
+                                <p:cTn id="5" presetID="14" presetClass="entr" presetSubtype="10" fill="hold" nodeType="clickEffect">
+                                  <p:stCondLst>
+                                    <p:cond delay="0"/>
+                                  </p:stCondLst>
+                                  <p:childTnLst>
+                                    <p:set>
+                                      <p:cBhvr>
+                                        <p:cTn id="6" dur="1" fill="hold">
+                                          <p:stCondLst>
+                                            <p:cond delay="0"/>
+                                          </p:stCondLst>
+                                        </p:cTn>
+                                        <p:tgtEl>
+                                          <p:spTgt spid="4"/>
+                                        </p:tgtEl>
+                                        <p:attrNameLst>
+                                          <p:attrName>style.visibility</p:attrName>
+                                        </p:attrNameLst>
+                                      </p:cBhvr>
+                                      <p:to>
+                                        <p:strVal val="visible"/>
+                                      </p:to>
+                                    </p:set>
+                                    <p:animEffect transition="in" filter="randombar(horizontal)">
+                                      <p:cBhvr>
+                                        <p:cTn id="7" dur="500"/>
+                                        <p:tgtEl>
+                                          <p:spTgt spid="4"/>
+                                        </p:tgtEl>
+                                      </p:cBhvr>
+                                    </p:animEffect>
+                                  </p:childTnLst>
+                                </p:cTn>
+                              </p:par>
+                            </p:childTnLst>
+                          </p:cTn>
+                        </p:par>
+                      </p:childTnLst>
+                    </p:cTn>
+                  </p:par>
+                  <p:par>
+                    <p:cTn id="8" fill="hold">
+                      <p:stCondLst>
+                        <p:cond delay="indefinite"/>
+                      </p:stCondLst>
+                      <p:childTnLst>
+                        <p:par>
+                          <p:cTn id="9" fill="hold">
+                            <p:stCondLst>
+                              <p:cond delay="0"/>
+                            </p:stCondLst>
+                            <p:childTnLst>
+                              <p:par>
+                                <p:cTn id="10" presetID="14" presetClass="entr" presetSubtype="10" fill="hold" nodeType="clickEffect">
+                                  <p:stCondLst>
+                                    <p:cond delay="0"/>
+                                  </p:stCondLst>
+                                  <p:childTnLst>
+                                    <p:set>
+                                      <p:cBhvr>
+                                        <p:cTn id="11" dur="1" fill="hold">
+                                          <p:stCondLst>
+                                            <p:cond delay="0"/>
+                                          </p:stCondLst>
+                                        </p:cTn>
+                                        <p:tgtEl>
+                                          <p:spTgt spid="8"/>
+                                        </p:tgtEl>
+                                        <p:attrNameLst>
+                                          <p:attrName>style.visibility</p:attrName>
+                                        </p:attrNameLst>
+                                      </p:cBhvr>
+                                      <p:to>
+                                        <p:strVal val="visible"/>
+                                      </p:to>
+                                    </p:set>
+                                    <p:animEffect transition="in" filter="randombar(horizontal)">
+                                      <p:cBhvr>
+                                        <p:cTn id="12" dur="500"/>
+                                        <p:tgtEl>
+                                          <p:spTgt spid="8"/>
+                                        </p:tgtEl>
+                                      </p:cBhvr>
+                                    </p:animEffect>
+                                  </p:childTnLst>
+                                </p:cTn>
+                              </p:par>
+                              <p:par>
+                                <p:cTn id="13" presetID="14" presetClass="entr" presetSubtype="10" fill="hold" nodeType="withEffect">
+                                  <p:stCondLst>
+                                    <p:cond delay="0"/>
+                                  </p:stCondLst>
+                                  <p:childTnLst>
+                                    <p:set>
+                                      <p:cBhvr>
+                                        <p:cTn id="14" dur="1" fill="hold">
+                                          <p:stCondLst>
+                                            <p:cond delay="0"/>
+                                          </p:stCondLst>
+                                        </p:cTn>
+                                        <p:tgtEl>
+                                          <p:spTgt spid="5"/>
+                                        </p:tgtEl>
+                                        <p:attrNameLst>
+                                          <p:attrName>style.visibility</p:attrName>
+                                        </p:attrNameLst>
+                                      </p:cBhvr>
+                                      <p:to>
+                                        <p:strVal val="visible"/>
+                                      </p:to>
+                                    </p:set>
+                                    <p:animEffect transition="in" filter="randombar(horizontal)">
+                                      <p:cBhvr>
+                                        <p:cTn id="15" dur="500"/>
+                                        <p:tgtEl>
+                                          <p:spTgt spid="5"/>
+                                        </p:tgtEl>
+                                      </p:cBhvr>
+                                    </p:animEffect>
+                                  </p:childTnLst>
+                                </p:cTn>
+                              </p:par>
+                            </p:childTnLst>
+                          </p:cTn>
+                        </p:par>
+                      </p:childTnLst>
+                    </p:cTn>
+                  </p:par>
+                  <p:par>
+                    <p:cTn id="16" fill="hold">
+                      <p:stCondLst>
+                        <p:cond delay="indefinite"/>
+                      </p:stCondLst>
+                      <p:childTnLst>
+                        <p:par>
+                          <p:cTn id="17" fill="hold">
+                            <p:stCondLst>
+                              <p:cond delay="0"/>
+                            </p:stCondLst>
+                            <p:childTnLst>
+                              <p:par>
+                                <p:cTn id="18" presetID="14" presetClass="entr" presetSubtype="10" fill="hold" nodeType="clickEffect">
+                                  <p:stCondLst>
+                                    <p:cond delay="0"/>
+                                  </p:stCondLst>
+                                  <p:childTnLst>
+                                    <p:set>
+                                      <p:cBhvr>
+                                        <p:cTn id="19" dur="1" fill="hold">
+                                          <p:stCondLst>
+                                            <p:cond delay="0"/>
+                                          </p:stCondLst>
+                                        </p:cTn>
+                                        <p:tgtEl>
+                                          <p:spTgt spid="16"/>
+                                        </p:tgtEl>
+                                        <p:attrNameLst>
+                                          <p:attrName>style.visibility</p:attrName>
+                                        </p:attrNameLst>
+                                      </p:cBhvr>
+                                      <p:to>
+                                        <p:strVal val="visible"/>
+                                      </p:to>
+                                    </p:set>
+                                    <p:animEffect transition="in" filter="randombar(horizontal)">
+                                      <p:cBhvr>
+                                        <p:cTn id="20" dur="500"/>
+                                        <p:tgtEl>
+                                          <p:spTgt spid="16"/>
+                                        </p:tgtEl>
+                                      </p:cBhvr>
+                                    </p:animEffect>
+                                  </p:childTnLst>
+                                </p:cTn>
+                              </p:par>
+                              <p:par>
+                                <p:cTn id="21" presetID="14" presetClass="entr" presetSubtype="10" fill="hold" nodeType="withEffect">
+                                  <p:stCondLst>
+                                    <p:cond delay="0"/>
+                                  </p:stCondLst>
+                                  <p:childTnLst>
+                                    <p:set>
+                                      <p:cBhvr>
+                                        <p:cTn id="22" dur="1" fill="hold">
+                                          <p:stCondLst>
+                                            <p:cond delay="0"/>
+                                          </p:stCondLst>
+                                        </p:cTn>
+                                        <p:tgtEl>
+                                          <p:spTgt spid="6"/>
+                                        </p:tgtEl>
+                                        <p:attrNameLst>
+                                          <p:attrName>style.visibility</p:attrName>
+                                        </p:attrNameLst>
+                                      </p:cBhvr>
+                                      <p:to>
+                                        <p:strVal val="visible"/>
+                                      </p:to>
+                                    </p:set>
+                                    <p:animEffect transition="in" filter="randombar(horizontal)">
+                                      <p:cBhvr>
+                                        <p:cTn id="23" dur="500"/>
+                                        <p:tgtEl>
+                                          <p:spTgt spid="6"/>
+                                        </p:tgtEl>
+                                      </p:cBhvr>
+                                    </p:animEffect>
+                                  </p:childTnLst>
+                                </p:cTn>
+                              </p:par>
+                            </p:childTnLst>
+                          </p:cTn>
+                        </p:par>
+                      </p:childTnLst>
+                    </p:cTn>
+                  </p:par>
+                  <p:par>
+                    <p:cTn id="24" fill="hold">
+                      <p:stCondLst>
+                        <p:cond delay="indefinite"/>
+                      </p:stCondLst>
+                      <p:childTnLst>
+                        <p:par>
+                          <p:cTn id="25" fill="hold">
+                            <p:stCondLst>
+                              <p:cond delay="0"/>
+                            </p:stCondLst>
+                            <p:childTnLst>
+                              <p:par>
+                                <p:cTn id="26" presetID="14" presetClass="entr" presetSubtype="10" fill="hold" nodeType="clickEffect">
+                                  <p:stCondLst>
+                                    <p:cond delay="0"/>
+                                  </p:stCondLst>
+                                  <p:childTnLst>
+                                    <p:set>
+                                      <p:cBhvr>
+                                        <p:cTn id="27" dur="1" fill="hold">
+                                          <p:stCondLst>
+                                            <p:cond delay="0"/>
+                                          </p:stCondLst>
+                                        </p:cTn>
+                                        <p:tgtEl>
+                                          <p:spTgt spid="18"/>
+                                        </p:tgtEl>
+                                        <p:attrNameLst>
+                                          <p:attrName>style.visibility</p:attrName>
+                                        </p:attrNameLst>
+                                      </p:cBhvr>
+                                      <p:to>
+                                        <p:strVal val="visible"/>
+                                      </p:to>
+                                    </p:set>
+                                    <p:animEffect transition="in" filter="randombar(horizontal)">
+                                      <p:cBhvr>
+                                        <p:cTn id="28" dur="500"/>
+                                        <p:tgtEl>
+                                          <p:spTgt spid="18"/>
+                                        </p:tgtEl>
+                                      </p:cBhvr>
+                                    </p:animEffect>
+                                  </p:childTnLst>
+                                </p:cTn>
+                              </p:par>
+                              <p:par>
+                                <p:cTn id="29" presetID="14" presetClass="entr" presetSubtype="10" fill="hold" nodeType="withEffect">
+                                  <p:stCondLst>
+                                    <p:cond delay="0"/>
+                                  </p:stCondLst>
+                                  <p:childTnLst>
+                                    <p:set>
+                                      <p:cBhvr>
+                                        <p:cTn id="30" dur="1" fill="hold">
+                                          <p:stCondLst>
+                                            <p:cond delay="0"/>
+                                          </p:stCondLst>
+                                        </p:cTn>
+                                        <p:tgtEl>
+                                          <p:spTgt spid="9"/>
+                                        </p:tgtEl>
+                                        <p:attrNameLst>
+                                          <p:attrName>style.visibility</p:attrName>
+                                        </p:attrNameLst>
+                                      </p:cBhvr>
+                                      <p:to>
+                                        <p:strVal val="visible"/>
+                                      </p:to>
+                                    </p:set>
+                                    <p:animEffect transition="in" filter="randombar(horizontal)">
+                                      <p:cBhvr>
+                                        <p:cTn id="31" dur="500"/>
+                                        <p:tgtEl>
+                                          <p:spTgt spid="9"/>
+                                        </p:tgtEl>
+                                      </p:cBhvr>
+                                    </p:animEffect>
+                                  </p:childTnLst>
+                                </p:cTn>
+                              </p:par>
+                            </p:childTnLst>
+                          </p:cTn>
+                        </p:par>
+                      </p:childTnLst>
+                    </p:cTn>
+                  </p:par>
+                  <p:par>
+                    <p:cTn id="32" fill="hold">
+                      <p:stCondLst>
+                        <p:cond delay="indefinite"/>
+                      </p:stCondLst>
+                      <p:childTnLst>
+                        <p:par>
+                          <p:cTn id="33" fill="hold">
+                            <p:stCondLst>
+                              <p:cond delay="0"/>
+                            </p:stCondLst>
+                            <p:childTnLst>
+                              <p:par>
+                                <p:cTn id="34" presetID="14" presetClass="entr" presetSubtype="10" fill="hold" nodeType="clickEffect">
+                                  <p:stCondLst>
+                                    <p:cond delay="0"/>
+                                  </p:stCondLst>
+                                  <p:childTnLst>
+                                    <p:set>
+                                      <p:cBhvr>
+                                        <p:cTn id="35" dur="1" fill="hold">
+                                          <p:stCondLst>
+                                            <p:cond delay="0"/>
+                                          </p:stCondLst>
+                                        </p:cTn>
+                                        <p:tgtEl>
+                                          <p:spTgt spid="20"/>
+                                        </p:tgtEl>
+                                        <p:attrNameLst>
+                                          <p:attrName>style.visibility</p:attrName>
+                                        </p:attrNameLst>
+                                      </p:cBhvr>
+                                      <p:to>
+                                        <p:strVal val="visible"/>
+                                      </p:to>
+                                    </p:set>
+                                    <p:animEffect transition="in" filter="randombar(horizontal)">
+                                      <p:cBhvr>
+                                        <p:cTn id="36" dur="500"/>
+                                        <p:tgtEl>
+                                          <p:spTgt spid="20"/>
+                                        </p:tgtEl>
+                                      </p:cBhvr>
+                                    </p:animEffect>
+                                  </p:childTnLst>
+                                </p:cTn>
+                              </p:par>
+                              <p:par>
+                                <p:cTn id="37" presetID="14" presetClass="entr" presetSubtype="10" fill="hold" nodeType="withEffect">
+                                  <p:stCondLst>
+                                    <p:cond delay="0"/>
+                                  </p:stCondLst>
+                                  <p:childTnLst>
+                                    <p:set>
+                                      <p:cBhvr>
+                                        <p:cTn id="38" dur="1" fill="hold">
+                                          <p:stCondLst>
+                                            <p:cond delay="0"/>
+                                          </p:stCondLst>
+                                        </p:cTn>
+                                        <p:tgtEl>
+                                          <p:spTgt spid="10"/>
+                                        </p:tgtEl>
+                                        <p:attrNameLst>
+                                          <p:attrName>style.visibility</p:attrName>
+                                        </p:attrNameLst>
+                                      </p:cBhvr>
+                                      <p:to>
+                                        <p:strVal val="visible"/>
+                                      </p:to>
+                                    </p:set>
+                                    <p:animEffect transition="in" filter="randombar(horizontal)">
+                                      <p:cBhvr>
+                                        <p:cTn id="39" dur="500"/>
+                                        <p:tgtEl>
+                                          <p:spTgt spid="10"/>
+                                        </p:tgtEl>
+                                      </p:cBhvr>
+                                    </p:animEffect>
+                                  </p:childTnLst>
+                                </p:cTn>
+                              </p:par>
+                            </p:childTnLst>
+                          </p:cTn>
+                        </p:par>
+                      </p:childTnLst>
+                    </p:cTn>
+                  </p:par>
+                </p:childTnLst>
+              </p:cTn>
+              <p:prevCondLst>
+                <p:cond evt="onPrev" delay="0">
+                  <p:tgtEl>
+                    <p:sldTgt/>
+                  </p:tgtEl>
+                </p:cond>
+              </p:prevCondLst>
+              <p:nextCondLst>
+                <p:cond evt="onNext" delay="0">
+                  <p:tgtEl>
+                    <p:sldTgt/>
+                  </p:tgtEl>
+                </p:cond>
+              </p:nextCondLst>
+            </p:seq>
+          </p:childTnLst>
+        </p:cTn>
+      </p:par>
+    </p:tnLst>
+  </p:timing>
+</p:sld>
+</file>
+
+<file path=ppt/slides/slide13.xml><?xml version="1.0" encoding="utf-8"?>
+<p:sld xmlns:a="http://schemas.openxmlformats.org/drawingml/2006/main" xmlns:r="http://schemas.openxmlformats.org/officeDocument/2006/relationships" xmlns:p="http://schemas.openxmlformats.org/presentationml/2006/main">
+  <p:cSld>
+    <p:spTree>
+      <p:nvGrpSpPr>
+        <p:cNvPr id="1" name=""/>
+        <p:cNvGrpSpPr/>
+        <p:nvPr/>
+      </p:nvGrpSpPr>
+      <p:grpSpPr>
+        <a:xfrm>
+          <a:off x="0" y="0"/>
+          <a:ext cx="0" cy="0"/>
+          <a:chOff x="0" y="0"/>
+          <a:chExt cx="0" cy="0"/>
+        </a:xfrm>
+      </p:grpSpPr>
+      <p:sp>
+        <p:nvSpPr>
+          <p:cNvPr id="2" name="Title 1"/>
+          <p:cNvSpPr>
+            <a:spLocks noGrp="1"/>
+          </p:cNvSpPr>
+          <p:nvPr>
+            <p:ph type="title"/>
+          </p:nvPr>
+        </p:nvSpPr>
+        <p:spPr/>
+        <p:txBody>
+          <a:bodyPr/>
+          <a:lstStyle/>
+          <a:p>
+            <a:r>
+              <a:rPr lang="en-US" dirty="0" smtClean="0"/>
               <a:t>Story Board</a:t>
             </a:r>
             <a:endParaRPr lang="en-US" dirty="0"/>
@@ -25583,7 +26807,7 @@
 </p:sld>
 </file>
 
-<file path=ppt/slides/slide11.xml><?xml version="1.0" encoding="utf-8"?>
+<file path=ppt/slides/slide14.xml><?xml version="1.0" encoding="utf-8"?>
 <p:sld xmlns:a="http://schemas.openxmlformats.org/drawingml/2006/main" xmlns:r="http://schemas.openxmlformats.org/officeDocument/2006/relationships" xmlns:p="http://schemas.openxmlformats.org/presentationml/2006/main">
   <p:cSld>
     <p:spTree>
@@ -26303,7 +27527,7 @@
 </p:sld>
 </file>
 
-<file path=ppt/slides/slide12.xml><?xml version="1.0" encoding="utf-8"?>
+<file path=ppt/slides/slide15.xml><?xml version="1.0" encoding="utf-8"?>
 <p:sld xmlns:a="http://schemas.openxmlformats.org/drawingml/2006/main" xmlns:r="http://schemas.openxmlformats.org/officeDocument/2006/relationships" xmlns:p="http://schemas.openxmlformats.org/presentationml/2006/main">
   <p:cSld>
     <p:spTree>
@@ -26812,7 +28036,7 @@
 </p:sld>
 </file>
 
-<file path=ppt/slides/slide13.xml><?xml version="1.0" encoding="utf-8"?>
+<file path=ppt/slides/slide16.xml><?xml version="1.0" encoding="utf-8"?>
 <p:sld xmlns:a="http://schemas.openxmlformats.org/drawingml/2006/main" xmlns:r="http://schemas.openxmlformats.org/officeDocument/2006/relationships" xmlns:p="http://schemas.openxmlformats.org/presentationml/2006/main">
   <p:cSld>
     <p:spTree>
@@ -29580,7 +30804,7 @@
 </p:sld>
 </file>
 
-<file path=ppt/slides/slide14.xml><?xml version="1.0" encoding="utf-8"?>
+<file path=ppt/slides/slide17.xml><?xml version="1.0" encoding="utf-8"?>
 <p:sld xmlns:a="http://schemas.openxmlformats.org/drawingml/2006/main" xmlns:r="http://schemas.openxmlformats.org/officeDocument/2006/relationships" xmlns:p="http://schemas.openxmlformats.org/presentationml/2006/main">
   <p:cSld>
     <p:spTree>
@@ -30238,7 +31462,7 @@
 </p:sld>
 </file>
 
-<file path=ppt/slides/slide15.xml><?xml version="1.0" encoding="utf-8"?>
+<file path=ppt/slides/slide18.xml><?xml version="1.0" encoding="utf-8"?>
 <p:sld xmlns:a="http://schemas.openxmlformats.org/drawingml/2006/main" xmlns:r="http://schemas.openxmlformats.org/officeDocument/2006/relationships" xmlns:p="http://schemas.openxmlformats.org/presentationml/2006/main">
   <p:cSld>
     <p:spTree>
@@ -30953,7 +32177,7 @@
 </p:sld>
 </file>
 
-<file path=ppt/slides/slide16.xml><?xml version="1.0" encoding="utf-8"?>
+<file path=ppt/slides/slide19.xml><?xml version="1.0" encoding="utf-8"?>
 <p:sld xmlns:a="http://schemas.openxmlformats.org/drawingml/2006/main" xmlns:r="http://schemas.openxmlformats.org/officeDocument/2006/relationships" xmlns:p="http://schemas.openxmlformats.org/presentationml/2006/main">
   <p:cSld>
     <p:spTree>
@@ -31126,7 +32350,104 @@
 </p:sld>
 </file>
 
-<file path=ppt/slides/slide17.xml><?xml version="1.0" encoding="utf-8"?>
+<file path=ppt/slides/slide2.xml><?xml version="1.0" encoding="utf-8"?>
+<p:sld xmlns:a="http://schemas.openxmlformats.org/drawingml/2006/main" xmlns:r="http://schemas.openxmlformats.org/officeDocument/2006/relationships" xmlns:p="http://schemas.openxmlformats.org/presentationml/2006/main">
+  <p:cSld>
+    <p:spTree>
+      <p:nvGrpSpPr>
+        <p:cNvPr id="1" name=""/>
+        <p:cNvGrpSpPr/>
+        <p:nvPr/>
+      </p:nvGrpSpPr>
+      <p:grpSpPr>
+        <a:xfrm>
+          <a:off x="0" y="0"/>
+          <a:ext cx="0" cy="0"/>
+          <a:chOff x="0" y="0"/>
+          <a:chExt cx="0" cy="0"/>
+        </a:xfrm>
+      </p:grpSpPr>
+      <p:sp>
+        <p:nvSpPr>
+          <p:cNvPr id="2" name="Title 1"/>
+          <p:cNvSpPr>
+            <a:spLocks noGrp="1"/>
+          </p:cNvSpPr>
+          <p:nvPr>
+            <p:ph type="title"/>
+          </p:nvPr>
+        </p:nvSpPr>
+        <p:spPr/>
+        <p:txBody>
+          <a:bodyPr/>
+          <a:lstStyle/>
+          <a:p>
+            <a:r>
+              <a:rPr lang="en-US" dirty="0" smtClean="0"/>
+              <a:t>Team member</a:t>
+            </a:r>
+            <a:endParaRPr lang="en-US" dirty="0"/>
+          </a:p>
+        </p:txBody>
+      </p:sp>
+      <p:graphicFrame>
+        <p:nvGraphicFramePr>
+          <p:cNvPr id="4" name="Content Placeholder 3"/>
+          <p:cNvGraphicFramePr>
+            <a:graphicFrameLocks noGrp="1"/>
+          </p:cNvGraphicFramePr>
+          <p:nvPr>
+            <p:ph idx="1"/>
+            <p:extLst>
+              <p:ext uri="{D42A27DB-BD31-4B8C-83A1-F6EECF244321}">
+                <p14:modId xmlns:p14="http://schemas.microsoft.com/office/powerpoint/2010/main" val="2509856044"/>
+              </p:ext>
+            </p:extLst>
+          </p:nvPr>
+        </p:nvGraphicFramePr>
+        <p:xfrm>
+          <a:off x="677863" y="2160588"/>
+          <a:ext cx="8596312" cy="3881437"/>
+        </p:xfrm>
+        <a:graphic>
+          <a:graphicData uri="http://schemas.openxmlformats.org/drawingml/2006/diagram">
+            <dgm:relIds xmlns:dgm="http://schemas.openxmlformats.org/drawingml/2006/diagram" xmlns:r="http://schemas.openxmlformats.org/officeDocument/2006/relationships" r:dm="rId2" r:lo="rId3" r:qs="rId4" r:cs="rId5"/>
+          </a:graphicData>
+        </a:graphic>
+      </p:graphicFrame>
+    </p:spTree>
+    <p:extLst>
+      <p:ext uri="{BB962C8B-B14F-4D97-AF65-F5344CB8AC3E}">
+        <p14:creationId xmlns:p14="http://schemas.microsoft.com/office/powerpoint/2010/main" val="2871386238"/>
+      </p:ext>
+    </p:extLst>
+  </p:cSld>
+  <p:clrMapOvr>
+    <a:masterClrMapping/>
+  </p:clrMapOvr>
+  <mc:AlternateContent xmlns:mc="http://schemas.openxmlformats.org/markup-compatibility/2006" xmlns:p14="http://schemas.microsoft.com/office/powerpoint/2010/main">
+    <mc:Choice Requires="p14">
+      <p:transition spd="med" p14:dur="700">
+        <p:fade/>
+      </p:transition>
+    </mc:Choice>
+    <mc:Fallback xmlns="">
+      <p:transition spd="med">
+        <p:fade/>
+      </p:transition>
+    </mc:Fallback>
+  </mc:AlternateContent>
+  <p:timing>
+    <p:tnLst>
+      <p:par>
+        <p:cTn id="1" dur="indefinite" restart="never" nodeType="tmRoot"/>
+      </p:par>
+    </p:tnLst>
+  </p:timing>
+</p:sld>
+</file>
+
+<file path=ppt/slides/slide20.xml><?xml version="1.0" encoding="utf-8"?>
 <p:sld xmlns:a="http://schemas.openxmlformats.org/drawingml/2006/main" xmlns:r="http://schemas.openxmlformats.org/officeDocument/2006/relationships" xmlns:p="http://schemas.openxmlformats.org/presentationml/2006/main">
   <p:cSld>
     <p:spTree>
@@ -34753,7 +36074,7 @@
 </p:sld>
 </file>
 
-<file path=ppt/slides/slide18.xml><?xml version="1.0" encoding="utf-8"?>
+<file path=ppt/slides/slide21.xml><?xml version="1.0" encoding="utf-8"?>
 <p:sld xmlns:a="http://schemas.openxmlformats.org/drawingml/2006/main" xmlns:r="http://schemas.openxmlformats.org/officeDocument/2006/relationships" xmlns:p="http://schemas.openxmlformats.org/presentationml/2006/main">
   <p:cSld>
     <p:spTree>
@@ -34861,7 +36182,7 @@
 </p:sld>
 </file>
 
-<file path=ppt/slides/slide19.xml><?xml version="1.0" encoding="utf-8"?>
+<file path=ppt/slides/slide22.xml><?xml version="1.0" encoding="utf-8"?>
 <p:sld xmlns:a="http://schemas.openxmlformats.org/drawingml/2006/main" xmlns:r="http://schemas.openxmlformats.org/officeDocument/2006/relationships" xmlns:p="http://schemas.openxmlformats.org/presentationml/2006/main">
   <p:cSld>
     <p:spTree>
@@ -34962,104 +36283,7 @@
 </p:sld>
 </file>
 
-<file path=ppt/slides/slide2.xml><?xml version="1.0" encoding="utf-8"?>
-<p:sld xmlns:a="http://schemas.openxmlformats.org/drawingml/2006/main" xmlns:r="http://schemas.openxmlformats.org/officeDocument/2006/relationships" xmlns:p="http://schemas.openxmlformats.org/presentationml/2006/main">
-  <p:cSld>
-    <p:spTree>
-      <p:nvGrpSpPr>
-        <p:cNvPr id="1" name=""/>
-        <p:cNvGrpSpPr/>
-        <p:nvPr/>
-      </p:nvGrpSpPr>
-      <p:grpSpPr>
-        <a:xfrm>
-          <a:off x="0" y="0"/>
-          <a:ext cx="0" cy="0"/>
-          <a:chOff x="0" y="0"/>
-          <a:chExt cx="0" cy="0"/>
-        </a:xfrm>
-      </p:grpSpPr>
-      <p:sp>
-        <p:nvSpPr>
-          <p:cNvPr id="2" name="Title 1"/>
-          <p:cNvSpPr>
-            <a:spLocks noGrp="1"/>
-          </p:cNvSpPr>
-          <p:nvPr>
-            <p:ph type="title"/>
-          </p:nvPr>
-        </p:nvSpPr>
-        <p:spPr/>
-        <p:txBody>
-          <a:bodyPr/>
-          <a:lstStyle/>
-          <a:p>
-            <a:r>
-              <a:rPr lang="en-US" dirty="0" smtClean="0"/>
-              <a:t>Team member</a:t>
-            </a:r>
-            <a:endParaRPr lang="en-US" dirty="0"/>
-          </a:p>
-        </p:txBody>
-      </p:sp>
-      <p:graphicFrame>
-        <p:nvGraphicFramePr>
-          <p:cNvPr id="4" name="Content Placeholder 3"/>
-          <p:cNvGraphicFramePr>
-            <a:graphicFrameLocks noGrp="1"/>
-          </p:cNvGraphicFramePr>
-          <p:nvPr>
-            <p:ph idx="1"/>
-            <p:extLst>
-              <p:ext uri="{D42A27DB-BD31-4B8C-83A1-F6EECF244321}">
-                <p14:modId xmlns:p14="http://schemas.microsoft.com/office/powerpoint/2010/main" val="2509856044"/>
-              </p:ext>
-            </p:extLst>
-          </p:nvPr>
-        </p:nvGraphicFramePr>
-        <p:xfrm>
-          <a:off x="677863" y="2160588"/>
-          <a:ext cx="8596312" cy="3881437"/>
-        </p:xfrm>
-        <a:graphic>
-          <a:graphicData uri="http://schemas.openxmlformats.org/drawingml/2006/diagram">
-            <dgm:relIds xmlns:dgm="http://schemas.openxmlformats.org/drawingml/2006/diagram" xmlns:r="http://schemas.openxmlformats.org/officeDocument/2006/relationships" r:dm="rId2" r:lo="rId3" r:qs="rId4" r:cs="rId5"/>
-          </a:graphicData>
-        </a:graphic>
-      </p:graphicFrame>
-    </p:spTree>
-    <p:extLst>
-      <p:ext uri="{BB962C8B-B14F-4D97-AF65-F5344CB8AC3E}">
-        <p14:creationId xmlns:p14="http://schemas.microsoft.com/office/powerpoint/2010/main" val="2871386238"/>
-      </p:ext>
-    </p:extLst>
-  </p:cSld>
-  <p:clrMapOvr>
-    <a:masterClrMapping/>
-  </p:clrMapOvr>
-  <mc:AlternateContent xmlns:mc="http://schemas.openxmlformats.org/markup-compatibility/2006" xmlns:p14="http://schemas.microsoft.com/office/powerpoint/2010/main">
-    <mc:Choice Requires="p14">
-      <p:transition spd="med" p14:dur="700">
-        <p:fade/>
-      </p:transition>
-    </mc:Choice>
-    <mc:Fallback xmlns="">
-      <p:transition spd="med">
-        <p:fade/>
-      </p:transition>
-    </mc:Fallback>
-  </mc:AlternateContent>
-  <p:timing>
-    <p:tnLst>
-      <p:par>
-        <p:cTn id="1" dur="indefinite" restart="never" nodeType="tmRoot"/>
-      </p:par>
-    </p:tnLst>
-  </p:timing>
-</p:sld>
-</file>
-
-<file path=ppt/slides/slide20.xml><?xml version="1.0" encoding="utf-8"?>
+<file path=ppt/slides/slide23.xml><?xml version="1.0" encoding="utf-8"?>
 <p:sld xmlns:a="http://schemas.openxmlformats.org/drawingml/2006/main" xmlns:r="http://schemas.openxmlformats.org/officeDocument/2006/relationships" xmlns:p="http://schemas.openxmlformats.org/presentationml/2006/main">
   <p:cSld>
     <p:spTree>
@@ -35162,7 +36386,7 @@
 </p:sld>
 </file>
 
-<file path=ppt/slides/slide21.xml><?xml version="1.0" encoding="utf-8"?>
+<file path=ppt/slides/slide24.xml><?xml version="1.0" encoding="utf-8"?>
 <p:sld xmlns:a="http://schemas.openxmlformats.org/drawingml/2006/main" xmlns:r="http://schemas.openxmlformats.org/officeDocument/2006/relationships" xmlns:p="http://schemas.openxmlformats.org/presentationml/2006/main">
   <p:cSld>
     <p:spTree>
@@ -35403,7 +36627,7 @@
 </p:sld>
 </file>
 
-<file path=ppt/slides/slide22.xml><?xml version="1.0" encoding="utf-8"?>
+<file path=ppt/slides/slide25.xml><?xml version="1.0" encoding="utf-8"?>
 <p:sld xmlns:a="http://schemas.openxmlformats.org/drawingml/2006/main" xmlns:r="http://schemas.openxmlformats.org/officeDocument/2006/relationships" xmlns:p="http://schemas.openxmlformats.org/presentationml/2006/main">
   <p:cSld>
     <p:spTree>
@@ -38479,7 +39703,7 @@
 </p:sld>
 </file>
 
-<file path=ppt/slides/slide23.xml><?xml version="1.0" encoding="utf-8"?>
+<file path=ppt/slides/slide26.xml><?xml version="1.0" encoding="utf-8"?>
 <p:sld xmlns:a="http://schemas.openxmlformats.org/drawingml/2006/main" xmlns:r="http://schemas.openxmlformats.org/officeDocument/2006/relationships" xmlns:p="http://schemas.openxmlformats.org/presentationml/2006/main">
   <p:cSld>
     <p:spTree>
@@ -38822,7 +40046,7 @@
 </p:sld>
 </file>
 
-<file path=ppt/slides/slide24.xml><?xml version="1.0" encoding="utf-8"?>
+<file path=ppt/slides/slide27.xml><?xml version="1.0" encoding="utf-8"?>
 <p:sld xmlns:a="http://schemas.openxmlformats.org/drawingml/2006/main" xmlns:r="http://schemas.openxmlformats.org/officeDocument/2006/relationships" xmlns:p="http://schemas.openxmlformats.org/presentationml/2006/main">
   <p:cSld>
     <p:spTree>
@@ -39148,7 +40372,7 @@
 </p:sld>
 </file>
 
-<file path=ppt/slides/slide25.xml><?xml version="1.0" encoding="utf-8"?>
+<file path=ppt/slides/slide28.xml><?xml version="1.0" encoding="utf-8"?>
 <p:sld xmlns:a="http://schemas.openxmlformats.org/drawingml/2006/main" xmlns:r="http://schemas.openxmlformats.org/officeDocument/2006/relationships" xmlns:p="http://schemas.openxmlformats.org/presentationml/2006/main">
   <p:cSld>
     <p:spTree>
@@ -39479,19 +40703,22 @@
           <a:lstStyle/>
           <a:p>
             <a:r>
-              <a:rPr lang="en-US" dirty="0"/>
+              <a:rPr lang="en-US" dirty="0" smtClean="0"/>
               <a:t>Scenario Problem</a:t>
             </a:r>
+            <a:endParaRPr lang="en-GB" dirty="0"/>
           </a:p>
         </p:txBody>
       </p:sp>
       <p:pic>
         <p:nvPicPr>
-          <p:cNvPr id="10" name="Picture 9"/>
+          <p:cNvPr id="4" name="Content Placeholder 3"/>
           <p:cNvPicPr>
-            <a:picLocks noChangeAspect="1"/>
+            <a:picLocks noGrp="1" noChangeAspect="1"/>
           </p:cNvPicPr>
-          <p:nvPr/>
+          <p:nvPr>
+            <p:ph idx="1"/>
+          </p:nvPr>
         </p:nvPicPr>
         <p:blipFill>
           <a:blip r:embed="rId2">
@@ -39507,24 +40734,86 @@
         </p:blipFill>
         <p:spPr>
           <a:xfrm>
-            <a:off x="1846174" y="1395064"/>
-            <a:ext cx="7812982" cy="5105748"/>
+            <a:off x="2122179" y="1542402"/>
+            <a:ext cx="7434478" cy="4858398"/>
           </a:xfrm>
-          <a:prstGeom prst="rect">
-            <a:avLst/>
-          </a:prstGeom>
         </p:spPr>
       </p:pic>
+    </p:spTree>
+    <p:extLst>
+      <p:ext uri="{BB962C8B-B14F-4D97-AF65-F5344CB8AC3E}">
+        <p14:creationId xmlns:p14="http://schemas.microsoft.com/office/powerpoint/2010/main" val="2296090287"/>
+      </p:ext>
+    </p:extLst>
+  </p:cSld>
+  <p:clrMapOvr>
+    <a:masterClrMapping/>
+  </p:clrMapOvr>
+  <p:transition spd="slow">
+    <p:push dir="u"/>
+  </p:transition>
+  <p:timing>
+    <p:tnLst>
+      <p:par>
+        <p:cTn id="1" dur="indefinite" restart="never" nodeType="tmRoot"/>
+      </p:par>
+    </p:tnLst>
+  </p:timing>
+</p:sld>
+</file>
+
+<file path=ppt/slides/slide6.xml><?xml version="1.0" encoding="utf-8"?>
+<p:sld xmlns:a="http://schemas.openxmlformats.org/drawingml/2006/main" xmlns:r="http://schemas.openxmlformats.org/officeDocument/2006/relationships" xmlns:p="http://schemas.openxmlformats.org/presentationml/2006/main">
+  <p:cSld>
+    <p:spTree>
+      <p:nvGrpSpPr>
+        <p:cNvPr id="1" name=""/>
+        <p:cNvGrpSpPr/>
+        <p:nvPr/>
+      </p:nvGrpSpPr>
+      <p:grpSpPr>
+        <a:xfrm>
+          <a:off x="0" y="0"/>
+          <a:ext cx="0" cy="0"/>
+          <a:chOff x="0" y="0"/>
+          <a:chExt cx="0" cy="0"/>
+        </a:xfrm>
+      </p:grpSpPr>
+      <p:sp>
+        <p:nvSpPr>
+          <p:cNvPr id="2" name="Title 1"/>
+          <p:cNvSpPr>
+            <a:spLocks noGrp="1"/>
+          </p:cNvSpPr>
+          <p:nvPr>
+            <p:ph type="title"/>
+          </p:nvPr>
+        </p:nvSpPr>
+        <p:spPr/>
+        <p:txBody>
+          <a:bodyPr/>
+          <a:lstStyle/>
+          <a:p>
+            <a:r>
+              <a:rPr lang="en-US" dirty="0"/>
+              <a:t>Scenario Problem</a:t>
+            </a:r>
+            <a:endParaRPr lang="en-GB" dirty="0"/>
+          </a:p>
+        </p:txBody>
+      </p:sp>
       <p:pic>
         <p:nvPicPr>
-          <p:cNvPr id="11" name="Picture 10"/>
+          <p:cNvPr id="4" name="Content Placeholder 3"/>
           <p:cNvPicPr>
-            <a:picLocks noChangeAspect="1"/>
+            <a:picLocks noGrp="1" noChangeAspect="1"/>
           </p:cNvPicPr>
-          <p:nvPr/>
+          <p:nvPr>
+            <p:ph idx="1"/>
+          </p:nvPr>
         </p:nvPicPr>
         <p:blipFill>
-          <a:blip r:embed="rId3">
+          <a:blip r:embed="rId2" cstate="print">
             <a:extLst>
               <a:ext uri="{28A0092B-C50C-407E-A947-70E740481C1C}">
                 <a14:useLocalDpi xmlns:a14="http://schemas.microsoft.com/office/drawing/2010/main" val="0"/>
@@ -39537,24 +40826,95 @@
         </p:blipFill>
         <p:spPr>
           <a:xfrm>
-            <a:off x="3627149" y="1395064"/>
-            <a:ext cx="4308922" cy="5105748"/>
+            <a:off x="3286662" y="1413614"/>
+            <a:ext cx="4466419" cy="5292371"/>
           </a:xfrm>
-          <a:prstGeom prst="rect">
-            <a:avLst/>
-          </a:prstGeom>
         </p:spPr>
       </p:pic>
+    </p:spTree>
+    <p:extLst>
+      <p:ext uri="{BB962C8B-B14F-4D97-AF65-F5344CB8AC3E}">
+        <p14:creationId xmlns:p14="http://schemas.microsoft.com/office/powerpoint/2010/main" val="2213442353"/>
+      </p:ext>
+    </p:extLst>
+  </p:cSld>
+  <p:clrMapOvr>
+    <a:masterClrMapping/>
+  </p:clrMapOvr>
+  <mc:AlternateContent xmlns:mc="http://schemas.openxmlformats.org/markup-compatibility/2006">
+    <mc:Choice xmlns:p14="http://schemas.microsoft.com/office/powerpoint/2010/main" Requires="p14">
+      <p:transition spd="slow" p14:dur="800">
+        <p:circle/>
+      </p:transition>
+    </mc:Choice>
+    <mc:Fallback>
+      <p:transition spd="slow">
+        <p:circle/>
+      </p:transition>
+    </mc:Fallback>
+  </mc:AlternateContent>
+  <p:timing>
+    <p:tnLst>
+      <p:par>
+        <p:cTn id="1" dur="indefinite" restart="never" nodeType="tmRoot"/>
+      </p:par>
+    </p:tnLst>
+  </p:timing>
+</p:sld>
+</file>
+
+<file path=ppt/slides/slide7.xml><?xml version="1.0" encoding="utf-8"?>
+<p:sld xmlns:a="http://schemas.openxmlformats.org/drawingml/2006/main" xmlns:r="http://schemas.openxmlformats.org/officeDocument/2006/relationships" xmlns:p="http://schemas.openxmlformats.org/presentationml/2006/main">
+  <p:cSld>
+    <p:spTree>
+      <p:nvGrpSpPr>
+        <p:cNvPr id="1" name=""/>
+        <p:cNvGrpSpPr/>
+        <p:nvPr/>
+      </p:nvGrpSpPr>
+      <p:grpSpPr>
+        <a:xfrm>
+          <a:off x="0" y="0"/>
+          <a:ext cx="0" cy="0"/>
+          <a:chOff x="0" y="0"/>
+          <a:chExt cx="0" cy="0"/>
+        </a:xfrm>
+      </p:grpSpPr>
+      <p:sp>
+        <p:nvSpPr>
+          <p:cNvPr id="2" name="Title 1"/>
+          <p:cNvSpPr>
+            <a:spLocks noGrp="1"/>
+          </p:cNvSpPr>
+          <p:nvPr>
+            <p:ph type="title"/>
+          </p:nvPr>
+        </p:nvSpPr>
+        <p:spPr/>
+        <p:txBody>
+          <a:bodyPr/>
+          <a:lstStyle/>
+          <a:p>
+            <a:r>
+              <a:rPr lang="en-US" dirty="0"/>
+              <a:t>Scenario Problem</a:t>
+            </a:r>
+            <a:endParaRPr lang="en-GB" dirty="0"/>
+          </a:p>
+        </p:txBody>
+      </p:sp>
       <p:pic>
         <p:nvPicPr>
-          <p:cNvPr id="12" name="Picture 11"/>
+          <p:cNvPr id="4" name="Content Placeholder 3"/>
           <p:cNvPicPr>
-            <a:picLocks noChangeAspect="1"/>
+            <a:picLocks noGrp="1" noChangeAspect="1"/>
           </p:cNvPicPr>
-          <p:nvPr/>
+          <p:nvPr>
+            <p:ph idx="1"/>
+          </p:nvPr>
         </p:nvPicPr>
         <p:blipFill>
-          <a:blip r:embed="rId4">
+          <a:blip r:embed="rId2">
             <a:extLst>
               <a:ext uri="{28A0092B-C50C-407E-A947-70E740481C1C}">
                 <a14:useLocalDpi xmlns:a14="http://schemas.microsoft.com/office/drawing/2010/main" val="0"/>
@@ -39567,24 +40927,95 @@
         </p:blipFill>
         <p:spPr>
           <a:xfrm>
-            <a:off x="1846175" y="2130954"/>
-            <a:ext cx="7812982" cy="4369858"/>
+            <a:off x="1171307" y="1387856"/>
+            <a:ext cx="8874213" cy="4963414"/>
           </a:xfrm>
-          <a:prstGeom prst="rect">
-            <a:avLst/>
-          </a:prstGeom>
         </p:spPr>
       </p:pic>
+    </p:spTree>
+    <p:extLst>
+      <p:ext uri="{BB962C8B-B14F-4D97-AF65-F5344CB8AC3E}">
+        <p14:creationId xmlns:p14="http://schemas.microsoft.com/office/powerpoint/2010/main" val="971804611"/>
+      </p:ext>
+    </p:extLst>
+  </p:cSld>
+  <p:clrMapOvr>
+    <a:masterClrMapping/>
+  </p:clrMapOvr>
+  <mc:AlternateContent xmlns:mc="http://schemas.openxmlformats.org/markup-compatibility/2006">
+    <mc:Choice xmlns:p14="http://schemas.microsoft.com/office/powerpoint/2010/main" Requires="p14">
+      <p:transition spd="slow" p14:dur="1500">
+        <p:split orient="vert"/>
+      </p:transition>
+    </mc:Choice>
+    <mc:Fallback>
+      <p:transition spd="slow">
+        <p:split orient="vert"/>
+      </p:transition>
+    </mc:Fallback>
+  </mc:AlternateContent>
+  <p:timing>
+    <p:tnLst>
+      <p:par>
+        <p:cTn id="1" dur="indefinite" restart="never" nodeType="tmRoot"/>
+      </p:par>
+    </p:tnLst>
+  </p:timing>
+</p:sld>
+</file>
+
+<file path=ppt/slides/slide8.xml><?xml version="1.0" encoding="utf-8"?>
+<p:sld xmlns:a="http://schemas.openxmlformats.org/drawingml/2006/main" xmlns:r="http://schemas.openxmlformats.org/officeDocument/2006/relationships" xmlns:p="http://schemas.openxmlformats.org/presentationml/2006/main">
+  <p:cSld>
+    <p:spTree>
+      <p:nvGrpSpPr>
+        <p:cNvPr id="1" name=""/>
+        <p:cNvGrpSpPr/>
+        <p:nvPr/>
+      </p:nvGrpSpPr>
+      <p:grpSpPr>
+        <a:xfrm>
+          <a:off x="0" y="0"/>
+          <a:ext cx="0" cy="0"/>
+          <a:chOff x="0" y="0"/>
+          <a:chExt cx="0" cy="0"/>
+        </a:xfrm>
+      </p:grpSpPr>
+      <p:sp>
+        <p:nvSpPr>
+          <p:cNvPr id="2" name="Title 1"/>
+          <p:cNvSpPr>
+            <a:spLocks noGrp="1"/>
+          </p:cNvSpPr>
+          <p:nvPr>
+            <p:ph type="title"/>
+          </p:nvPr>
+        </p:nvSpPr>
+        <p:spPr/>
+        <p:txBody>
+          <a:bodyPr/>
+          <a:lstStyle/>
+          <a:p>
+            <a:r>
+              <a:rPr lang="en-US" dirty="0"/>
+              <a:t>Scenario Problem</a:t>
+            </a:r>
+            <a:endParaRPr lang="en-GB" dirty="0"/>
+          </a:p>
+        </p:txBody>
+      </p:sp>
       <p:pic>
         <p:nvPicPr>
-          <p:cNvPr id="13" name="Picture 12"/>
+          <p:cNvPr id="4" name="Content Placeholder 3"/>
           <p:cNvPicPr>
-            <a:picLocks noChangeAspect="1"/>
+            <a:picLocks noGrp="1" noChangeAspect="1"/>
           </p:cNvPicPr>
-          <p:nvPr/>
+          <p:nvPr>
+            <p:ph idx="1"/>
+          </p:nvPr>
         </p:nvPicPr>
         <p:blipFill>
-          <a:blip r:embed="rId5">
+          <a:blip r:embed="rId2">
             <a:extLst>
               <a:ext uri="{28A0092B-C50C-407E-A947-70E740481C1C}">
                 <a14:useLocalDpi xmlns:a14="http://schemas.microsoft.com/office/drawing/2010/main" val="0"/>
@@ -39597,375 +41028,35 @@
         </p:blipFill>
         <p:spPr>
           <a:xfrm>
-            <a:off x="1846175" y="1395063"/>
-            <a:ext cx="7812982" cy="5175793"/>
+            <a:off x="1544181" y="1284822"/>
+            <a:ext cx="8024822" cy="5316129"/>
           </a:xfrm>
-          <a:prstGeom prst="rect">
-            <a:avLst/>
-          </a:prstGeom>
         </p:spPr>
       </p:pic>
     </p:spTree>
     <p:extLst>
       <p:ext uri="{BB962C8B-B14F-4D97-AF65-F5344CB8AC3E}">
-        <p14:creationId xmlns:p14="http://schemas.microsoft.com/office/powerpoint/2010/main" val="1752163039"/>
+        <p14:creationId xmlns:p14="http://schemas.microsoft.com/office/powerpoint/2010/main" val="4069591792"/>
       </p:ext>
     </p:extLst>
   </p:cSld>
   <p:clrMapOvr>
     <a:masterClrMapping/>
   </p:clrMapOvr>
+  <p:transition spd="slow">
+    <p:wipe/>
+  </p:transition>
   <p:timing>
     <p:tnLst>
       <p:par>
-        <p:cTn id="1" dur="indefinite" restart="never" nodeType="tmRoot">
-          <p:childTnLst>
-            <p:seq concurrent="1" nextAc="seek">
-              <p:cTn id="2" dur="indefinite" nodeType="mainSeq">
-                <p:childTnLst>
-                  <p:par>
-                    <p:cTn id="3" fill="hold">
-                      <p:stCondLst>
-                        <p:cond delay="indefinite"/>
-                      </p:stCondLst>
-                      <p:childTnLst>
-                        <p:par>
-                          <p:cTn id="4" fill="hold">
-                            <p:stCondLst>
-                              <p:cond delay="0"/>
-                            </p:stCondLst>
-                            <p:childTnLst>
-                              <p:par>
-                                <p:cTn id="5" presetID="14" presetClass="entr" presetSubtype="10" fill="hold" nodeType="clickEffect">
-                                  <p:stCondLst>
-                                    <p:cond delay="0"/>
-                                  </p:stCondLst>
-                                  <p:childTnLst>
-                                    <p:set>
-                                      <p:cBhvr>
-                                        <p:cTn id="6" dur="1" fill="hold">
-                                          <p:stCondLst>
-                                            <p:cond delay="0"/>
-                                          </p:stCondLst>
-                                        </p:cTn>
-                                        <p:tgtEl>
-                                          <p:spTgt spid="10"/>
-                                        </p:tgtEl>
-                                        <p:attrNameLst>
-                                          <p:attrName>style.visibility</p:attrName>
-                                        </p:attrNameLst>
-                                      </p:cBhvr>
-                                      <p:to>
-                                        <p:strVal val="visible"/>
-                                      </p:to>
-                                    </p:set>
-                                    <p:animEffect transition="in" filter="randombar(horizontal)">
-                                      <p:cBhvr>
-                                        <p:cTn id="7" dur="500"/>
-                                        <p:tgtEl>
-                                          <p:spTgt spid="10"/>
-                                        </p:tgtEl>
-                                      </p:cBhvr>
-                                    </p:animEffect>
-                                  </p:childTnLst>
-                                </p:cTn>
-                              </p:par>
-                            </p:childTnLst>
-                          </p:cTn>
-                        </p:par>
-                      </p:childTnLst>
-                    </p:cTn>
-                  </p:par>
-                  <p:par>
-                    <p:cTn id="8" fill="hold">
-                      <p:stCondLst>
-                        <p:cond delay="indefinite"/>
-                      </p:stCondLst>
-                      <p:childTnLst>
-                        <p:par>
-                          <p:cTn id="9" fill="hold">
-                            <p:stCondLst>
-                              <p:cond delay="0"/>
-                            </p:stCondLst>
-                            <p:childTnLst>
-                              <p:par>
-                                <p:cTn id="10" presetID="14" presetClass="entr" presetSubtype="10" fill="hold" nodeType="clickEffect">
-                                  <p:stCondLst>
-                                    <p:cond delay="0"/>
-                                  </p:stCondLst>
-                                  <p:childTnLst>
-                                    <p:set>
-                                      <p:cBhvr>
-                                        <p:cTn id="11" dur="1" fill="hold">
-                                          <p:stCondLst>
-                                            <p:cond delay="0"/>
-                                          </p:stCondLst>
-                                        </p:cTn>
-                                        <p:tgtEl>
-                                          <p:spTgt spid="11"/>
-                                        </p:tgtEl>
-                                        <p:attrNameLst>
-                                          <p:attrName>style.visibility</p:attrName>
-                                        </p:attrNameLst>
-                                      </p:cBhvr>
-                                      <p:to>
-                                        <p:strVal val="visible"/>
-                                      </p:to>
-                                    </p:set>
-                                    <p:animEffect transition="in" filter="randombar(horizontal)">
-                                      <p:cBhvr>
-                                        <p:cTn id="12" dur="500"/>
-                                        <p:tgtEl>
-                                          <p:spTgt spid="11"/>
-                                        </p:tgtEl>
-                                      </p:cBhvr>
-                                    </p:animEffect>
-                                  </p:childTnLst>
-                                </p:cTn>
-                              </p:par>
-                              <p:par>
-                                <p:cTn id="13" presetID="14" presetClass="exit" presetSubtype="10" fill="hold" nodeType="withEffect">
-                                  <p:stCondLst>
-                                    <p:cond delay="0"/>
-                                  </p:stCondLst>
-                                  <p:childTnLst>
-                                    <p:animEffect transition="out" filter="randombar(horizontal)">
-                                      <p:cBhvr>
-                                        <p:cTn id="14" dur="500"/>
-                                        <p:tgtEl>
-                                          <p:spTgt spid="10"/>
-                                        </p:tgtEl>
-                                      </p:cBhvr>
-                                    </p:animEffect>
-                                    <p:set>
-                                      <p:cBhvr>
-                                        <p:cTn id="15" dur="1" fill="hold">
-                                          <p:stCondLst>
-                                            <p:cond delay="499"/>
-                                          </p:stCondLst>
-                                        </p:cTn>
-                                        <p:tgtEl>
-                                          <p:spTgt spid="10"/>
-                                        </p:tgtEl>
-                                        <p:attrNameLst>
-                                          <p:attrName>style.visibility</p:attrName>
-                                        </p:attrNameLst>
-                                      </p:cBhvr>
-                                      <p:to>
-                                        <p:strVal val="hidden"/>
-                                      </p:to>
-                                    </p:set>
-                                  </p:childTnLst>
-                                </p:cTn>
-                              </p:par>
-                            </p:childTnLst>
-                          </p:cTn>
-                        </p:par>
-                      </p:childTnLst>
-                    </p:cTn>
-                  </p:par>
-                  <p:par>
-                    <p:cTn id="16" fill="hold">
-                      <p:stCondLst>
-                        <p:cond delay="indefinite"/>
-                      </p:stCondLst>
-                      <p:childTnLst>
-                        <p:par>
-                          <p:cTn id="17" fill="hold">
-                            <p:stCondLst>
-                              <p:cond delay="0"/>
-                            </p:stCondLst>
-                            <p:childTnLst>
-                              <p:par>
-                                <p:cTn id="18" presetID="14" presetClass="entr" presetSubtype="10" fill="hold" nodeType="clickEffect">
-                                  <p:stCondLst>
-                                    <p:cond delay="0"/>
-                                  </p:stCondLst>
-                                  <p:childTnLst>
-                                    <p:set>
-                                      <p:cBhvr>
-                                        <p:cTn id="19" dur="1" fill="hold">
-                                          <p:stCondLst>
-                                            <p:cond delay="0"/>
-                                          </p:stCondLst>
-                                        </p:cTn>
-                                        <p:tgtEl>
-                                          <p:spTgt spid="12"/>
-                                        </p:tgtEl>
-                                        <p:attrNameLst>
-                                          <p:attrName>style.visibility</p:attrName>
-                                        </p:attrNameLst>
-                                      </p:cBhvr>
-                                      <p:to>
-                                        <p:strVal val="visible"/>
-                                      </p:to>
-                                    </p:set>
-                                    <p:animEffect transition="in" filter="randombar(horizontal)">
-                                      <p:cBhvr>
-                                        <p:cTn id="20" dur="500"/>
-                                        <p:tgtEl>
-                                          <p:spTgt spid="12"/>
-                                        </p:tgtEl>
-                                      </p:cBhvr>
-                                    </p:animEffect>
-                                  </p:childTnLst>
-                                </p:cTn>
-                              </p:par>
-                              <p:par>
-                                <p:cTn id="21" presetID="14" presetClass="exit" presetSubtype="10" fill="hold" nodeType="withEffect">
-                                  <p:stCondLst>
-                                    <p:cond delay="0"/>
-                                  </p:stCondLst>
-                                  <p:childTnLst>
-                                    <p:animEffect transition="out" filter="randombar(horizontal)">
-                                      <p:cBhvr>
-                                        <p:cTn id="22" dur="500"/>
-                                        <p:tgtEl>
-                                          <p:spTgt spid="11"/>
-                                        </p:tgtEl>
-                                      </p:cBhvr>
-                                    </p:animEffect>
-                                    <p:set>
-                                      <p:cBhvr>
-                                        <p:cTn id="23" dur="1" fill="hold">
-                                          <p:stCondLst>
-                                            <p:cond delay="499"/>
-                                          </p:stCondLst>
-                                        </p:cTn>
-                                        <p:tgtEl>
-                                          <p:spTgt spid="11"/>
-                                        </p:tgtEl>
-                                        <p:attrNameLst>
-                                          <p:attrName>style.visibility</p:attrName>
-                                        </p:attrNameLst>
-                                      </p:cBhvr>
-                                      <p:to>
-                                        <p:strVal val="hidden"/>
-                                      </p:to>
-                                    </p:set>
-                                  </p:childTnLst>
-                                </p:cTn>
-                              </p:par>
-                            </p:childTnLst>
-                          </p:cTn>
-                        </p:par>
-                      </p:childTnLst>
-                    </p:cTn>
-                  </p:par>
-                  <p:par>
-                    <p:cTn id="24" fill="hold">
-                      <p:stCondLst>
-                        <p:cond delay="indefinite"/>
-                      </p:stCondLst>
-                      <p:childTnLst>
-                        <p:par>
-                          <p:cTn id="25" fill="hold">
-                            <p:stCondLst>
-                              <p:cond delay="0"/>
-                            </p:stCondLst>
-                            <p:childTnLst>
-                              <p:par>
-                                <p:cTn id="26" presetID="14" presetClass="entr" presetSubtype="10" fill="hold" nodeType="clickEffect">
-                                  <p:stCondLst>
-                                    <p:cond delay="0"/>
-                                  </p:stCondLst>
-                                  <p:childTnLst>
-                                    <p:set>
-                                      <p:cBhvr>
-                                        <p:cTn id="27" dur="1" fill="hold">
-                                          <p:stCondLst>
-                                            <p:cond delay="0"/>
-                                          </p:stCondLst>
-                                        </p:cTn>
-                                        <p:tgtEl>
-                                          <p:spTgt spid="13"/>
-                                        </p:tgtEl>
-                                        <p:attrNameLst>
-                                          <p:attrName>style.visibility</p:attrName>
-                                        </p:attrNameLst>
-                                      </p:cBhvr>
-                                      <p:to>
-                                        <p:strVal val="visible"/>
-                                      </p:to>
-                                    </p:set>
-                                    <p:animEffect transition="in" filter="randombar(horizontal)">
-                                      <p:cBhvr>
-                                        <p:cTn id="28" dur="500"/>
-                                        <p:tgtEl>
-                                          <p:spTgt spid="13"/>
-                                        </p:tgtEl>
-                                      </p:cBhvr>
-                                    </p:animEffect>
-                                  </p:childTnLst>
-                                </p:cTn>
-                              </p:par>
-                              <p:par>
-                                <p:cTn id="29" presetID="14" presetClass="exit" presetSubtype="10" fill="hold" nodeType="withEffect">
-                                  <p:stCondLst>
-                                    <p:cond delay="0"/>
-                                  </p:stCondLst>
-                                  <p:childTnLst>
-                                    <p:animEffect transition="out" filter="randombar(horizontal)">
-                                      <p:cBhvr>
-                                        <p:cTn id="30" dur="500"/>
-                                        <p:tgtEl>
-                                          <p:spTgt spid="12"/>
-                                        </p:tgtEl>
-                                      </p:cBhvr>
-                                    </p:animEffect>
-                                    <p:set>
-                                      <p:cBhvr>
-                                        <p:cTn id="31" dur="1" fill="hold">
-                                          <p:stCondLst>
-                                            <p:cond delay="499"/>
-                                          </p:stCondLst>
-                                        </p:cTn>
-                                        <p:tgtEl>
-                                          <p:spTgt spid="12"/>
-                                        </p:tgtEl>
-                                        <p:attrNameLst>
-                                          <p:attrName>style.visibility</p:attrName>
-                                        </p:attrNameLst>
-                                      </p:cBhvr>
-                                      <p:to>
-                                        <p:strVal val="hidden"/>
-                                      </p:to>
-                                    </p:set>
-                                  </p:childTnLst>
-                                </p:cTn>
-                              </p:par>
-                            </p:childTnLst>
-                          </p:cTn>
-                        </p:par>
-                      </p:childTnLst>
-                    </p:cTn>
-                  </p:par>
-                </p:childTnLst>
-              </p:cTn>
-              <p:prevCondLst>
-                <p:cond evt="onPrev" delay="0">
-                  <p:tgtEl>
-                    <p:sldTgt/>
-                  </p:tgtEl>
-                </p:cond>
-              </p:prevCondLst>
-              <p:nextCondLst>
-                <p:cond evt="onNext" delay="0">
-                  <p:tgtEl>
-                    <p:sldTgt/>
-                  </p:tgtEl>
-                </p:cond>
-              </p:nextCondLst>
-            </p:seq>
-          </p:childTnLst>
-        </p:cTn>
+        <p:cTn id="1" dur="indefinite" restart="never" nodeType="tmRoot"/>
       </p:par>
     </p:tnLst>
   </p:timing>
 </p:sld>
 </file>
 
-<file path=ppt/slides/slide6.xml><?xml version="1.0" encoding="utf-8"?>
+<file path=ppt/slides/slide9.xml><?xml version="1.0" encoding="utf-8"?>
 <p:sld xmlns:a="http://schemas.openxmlformats.org/drawingml/2006/main" xmlns:r="http://schemas.openxmlformats.org/officeDocument/2006/relationships" xmlns:p="http://schemas.openxmlformats.org/presentationml/2006/main">
   <p:cSld>
     <p:spTree>
@@ -40053,1227 +41144,6 @@
     <p:tnLst>
       <p:par>
         <p:cTn id="1" dur="indefinite" restart="never" nodeType="tmRoot"/>
-      </p:par>
-    </p:tnLst>
-  </p:timing>
-</p:sld>
-</file>
-
-<file path=ppt/slides/slide7.xml><?xml version="1.0" encoding="utf-8"?>
-<p:sld xmlns:a="http://schemas.openxmlformats.org/drawingml/2006/main" xmlns:r="http://schemas.openxmlformats.org/officeDocument/2006/relationships" xmlns:p="http://schemas.openxmlformats.org/presentationml/2006/main">
-  <p:cSld>
-    <p:spTree>
-      <p:nvGrpSpPr>
-        <p:cNvPr id="1" name=""/>
-        <p:cNvGrpSpPr/>
-        <p:nvPr/>
-      </p:nvGrpSpPr>
-      <p:grpSpPr>
-        <a:xfrm>
-          <a:off x="0" y="0"/>
-          <a:ext cx="0" cy="0"/>
-          <a:chOff x="0" y="0"/>
-          <a:chExt cx="0" cy="0"/>
-        </a:xfrm>
-      </p:grpSpPr>
-      <p:sp>
-        <p:nvSpPr>
-          <p:cNvPr id="2" name="Title 1"/>
-          <p:cNvSpPr>
-            <a:spLocks noGrp="1"/>
-          </p:cNvSpPr>
-          <p:nvPr>
-            <p:ph type="title"/>
-          </p:nvPr>
-        </p:nvSpPr>
-        <p:spPr/>
-        <p:txBody>
-          <a:bodyPr/>
-          <a:lstStyle/>
-          <a:p>
-            <a:r>
-              <a:rPr lang="en-US" dirty="0" smtClean="0"/>
-              <a:t>Our Solution</a:t>
-            </a:r>
-            <a:endParaRPr lang="en-GB" dirty="0"/>
-          </a:p>
-        </p:txBody>
-      </p:sp>
-      <p:pic>
-        <p:nvPicPr>
-          <p:cNvPr id="8" name="Content Placeholder 7"/>
-          <p:cNvPicPr>
-            <a:picLocks noGrp="1" noChangeAspect="1"/>
-          </p:cNvPicPr>
-          <p:nvPr>
-            <p:ph idx="1"/>
-          </p:nvPr>
-        </p:nvPicPr>
-        <p:blipFill>
-          <a:blip r:embed="rId2">
-            <a:extLst>
-              <a:ext uri="{28A0092B-C50C-407E-A947-70E740481C1C}">
-                <a14:useLocalDpi xmlns:a14="http://schemas.microsoft.com/office/drawing/2010/main" val="0"/>
-              </a:ext>
-            </a:extLst>
-          </a:blip>
-          <a:stretch>
-            <a:fillRect/>
-          </a:stretch>
-        </p:blipFill>
-        <p:spPr>
-          <a:xfrm>
-            <a:off x="829487" y="2354594"/>
-            <a:ext cx="1627200" cy="1627200"/>
-          </a:xfrm>
-        </p:spPr>
-      </p:pic>
-      <p:pic>
-        <p:nvPicPr>
-          <p:cNvPr id="9" name="Picture 8"/>
-          <p:cNvPicPr>
-            <a:picLocks noChangeAspect="1"/>
-          </p:cNvPicPr>
-          <p:nvPr/>
-        </p:nvPicPr>
-        <p:blipFill>
-          <a:blip r:embed="rId3" cstate="print">
-            <a:extLst>
-              <a:ext uri="{28A0092B-C50C-407E-A947-70E740481C1C}">
-                <a14:useLocalDpi xmlns:a14="http://schemas.microsoft.com/office/drawing/2010/main" val="0"/>
-              </a:ext>
-            </a:extLst>
-          </a:blip>
-          <a:stretch>
-            <a:fillRect/>
-          </a:stretch>
-        </p:blipFill>
-        <p:spPr>
-          <a:xfrm>
-            <a:off x="5104326" y="2354594"/>
-            <a:ext cx="1446895" cy="1627200"/>
-          </a:xfrm>
-          <a:prstGeom prst="rect">
-            <a:avLst/>
-          </a:prstGeom>
-        </p:spPr>
-      </p:pic>
-      <p:pic>
-        <p:nvPicPr>
-          <p:cNvPr id="10" name="Picture 9"/>
-          <p:cNvPicPr>
-            <a:picLocks noChangeAspect="1"/>
-          </p:cNvPicPr>
-          <p:nvPr/>
-        </p:nvPicPr>
-        <p:blipFill>
-          <a:blip r:embed="rId4">
-            <a:extLst>
-              <a:ext uri="{28A0092B-C50C-407E-A947-70E740481C1C}">
-                <a14:useLocalDpi xmlns:a14="http://schemas.microsoft.com/office/drawing/2010/main" val="0"/>
-              </a:ext>
-            </a:extLst>
-          </a:blip>
-          <a:stretch>
-            <a:fillRect/>
-          </a:stretch>
-        </p:blipFill>
-        <p:spPr>
-          <a:xfrm>
-            <a:off x="9062905" y="2406101"/>
-            <a:ext cx="1627200" cy="1627200"/>
-          </a:xfrm>
-          <a:prstGeom prst="rect">
-            <a:avLst/>
-          </a:prstGeom>
-        </p:spPr>
-      </p:pic>
-      <p:sp>
-        <p:nvSpPr>
-          <p:cNvPr id="11" name="Right Arrow 10"/>
-          <p:cNvSpPr/>
-          <p:nvPr/>
-        </p:nvSpPr>
-        <p:spPr>
-          <a:xfrm>
-            <a:off x="2588654" y="2665927"/>
-            <a:ext cx="2511380" cy="1171977"/>
-          </a:xfrm>
-          <a:prstGeom prst="rightArrow">
-            <a:avLst/>
-          </a:prstGeom>
-        </p:spPr>
-        <p:style>
-          <a:lnRef idx="2">
-            <a:schemeClr val="accent1">
-              <a:shade val="50000"/>
-            </a:schemeClr>
-          </a:lnRef>
-          <a:fillRef idx="1">
-            <a:schemeClr val="accent1"/>
-          </a:fillRef>
-          <a:effectRef idx="0">
-            <a:schemeClr val="accent1"/>
-          </a:effectRef>
-          <a:fontRef idx="minor">
-            <a:schemeClr val="lt1"/>
-          </a:fontRef>
-        </p:style>
-        <p:txBody>
-          <a:bodyPr rtlCol="0" anchor="ctr"/>
-          <a:lstStyle/>
-          <a:p>
-            <a:pPr algn="ctr"/>
-            <a:r>
-              <a:rPr lang="en-US" dirty="0" smtClean="0"/>
-              <a:t>Track</a:t>
-            </a:r>
-            <a:endParaRPr lang="en-GB" dirty="0"/>
-          </a:p>
-        </p:txBody>
-      </p:sp>
-      <p:sp>
-        <p:nvSpPr>
-          <p:cNvPr id="12" name="Right Arrow 11"/>
-          <p:cNvSpPr/>
-          <p:nvPr/>
-        </p:nvSpPr>
-        <p:spPr>
-          <a:xfrm>
-            <a:off x="6550105" y="2664304"/>
-            <a:ext cx="2512800" cy="1173600"/>
-          </a:xfrm>
-          <a:prstGeom prst="rightArrow">
-            <a:avLst/>
-          </a:prstGeom>
-        </p:spPr>
-        <p:style>
-          <a:lnRef idx="2">
-            <a:schemeClr val="accent1">
-              <a:shade val="50000"/>
-            </a:schemeClr>
-          </a:lnRef>
-          <a:fillRef idx="1">
-            <a:schemeClr val="accent1"/>
-          </a:fillRef>
-          <a:effectRef idx="0">
-            <a:schemeClr val="accent1"/>
-          </a:effectRef>
-          <a:fontRef idx="minor">
-            <a:schemeClr val="lt1"/>
-          </a:fontRef>
-        </p:style>
-        <p:txBody>
-          <a:bodyPr rtlCol="0" anchor="ctr"/>
-          <a:lstStyle/>
-          <a:p>
-            <a:pPr algn="ctr"/>
-            <a:r>
-              <a:rPr lang="en-US" dirty="0" smtClean="0"/>
-              <a:t>Give</a:t>
-            </a:r>
-            <a:endParaRPr lang="en-GB" dirty="0"/>
-          </a:p>
-        </p:txBody>
-      </p:sp>
-      <p:sp>
-        <p:nvSpPr>
-          <p:cNvPr id="13" name="TextBox 12"/>
-          <p:cNvSpPr txBox="1"/>
-          <p:nvPr/>
-        </p:nvSpPr>
-        <p:spPr>
-          <a:xfrm>
-            <a:off x="1068945" y="4108359"/>
-            <a:ext cx="912429" cy="369332"/>
-          </a:xfrm>
-          <a:prstGeom prst="rect">
-            <a:avLst/>
-          </a:prstGeom>
-          <a:noFill/>
-        </p:spPr>
-        <p:txBody>
-          <a:bodyPr wrap="none" rtlCol="0">
-            <a:spAutoFit/>
-          </a:bodyPr>
-          <a:lstStyle/>
-          <a:p>
-            <a:r>
-              <a:rPr lang="en-US" dirty="0" smtClean="0"/>
-              <a:t>System</a:t>
-            </a:r>
-            <a:endParaRPr lang="en-GB" dirty="0"/>
-          </a:p>
-        </p:txBody>
-      </p:sp>
-      <p:sp>
-        <p:nvSpPr>
-          <p:cNvPr id="14" name="TextBox 13"/>
-          <p:cNvSpPr txBox="1"/>
-          <p:nvPr/>
-        </p:nvSpPr>
-        <p:spPr>
-          <a:xfrm>
-            <a:off x="5478767" y="4108359"/>
-            <a:ext cx="698012" cy="369332"/>
-          </a:xfrm>
-          <a:prstGeom prst="rect">
-            <a:avLst/>
-          </a:prstGeom>
-          <a:noFill/>
-        </p:spPr>
-        <p:txBody>
-          <a:bodyPr wrap="none" rtlCol="0">
-            <a:spAutoFit/>
-          </a:bodyPr>
-          <a:lstStyle/>
-          <a:p>
-            <a:r>
-              <a:rPr lang="en-US" dirty="0" smtClean="0"/>
-              <a:t>Price</a:t>
-            </a:r>
-            <a:endParaRPr lang="en-GB" dirty="0"/>
-          </a:p>
-        </p:txBody>
-      </p:sp>
-      <p:sp>
-        <p:nvSpPr>
-          <p:cNvPr id="15" name="TextBox 14"/>
-          <p:cNvSpPr txBox="1"/>
-          <p:nvPr/>
-        </p:nvSpPr>
-        <p:spPr>
-          <a:xfrm>
-            <a:off x="9236746" y="4108359"/>
-            <a:ext cx="1279517" cy="369332"/>
-          </a:xfrm>
-          <a:prstGeom prst="rect">
-            <a:avLst/>
-          </a:prstGeom>
-          <a:noFill/>
-        </p:spPr>
-        <p:txBody>
-          <a:bodyPr wrap="none" rtlCol="0">
-            <a:spAutoFit/>
-          </a:bodyPr>
-          <a:lstStyle/>
-          <a:p>
-            <a:r>
-              <a:rPr lang="en-US" dirty="0" smtClean="0"/>
-              <a:t>Suggestion</a:t>
-            </a:r>
-            <a:endParaRPr lang="en-GB" dirty="0"/>
-          </a:p>
-        </p:txBody>
-      </p:sp>
-    </p:spTree>
-    <p:extLst>
-      <p:ext uri="{BB962C8B-B14F-4D97-AF65-F5344CB8AC3E}">
-        <p14:creationId xmlns:p14="http://schemas.microsoft.com/office/powerpoint/2010/main" val="3140107869"/>
-      </p:ext>
-    </p:extLst>
-  </p:cSld>
-  <p:clrMapOvr>
-    <a:masterClrMapping/>
-  </p:clrMapOvr>
-  <p:transition spd="slow">
-    <p:wipe dir="r"/>
-  </p:transition>
-  <p:timing>
-    <p:tnLst>
-      <p:par>
-        <p:cTn id="1" dur="indefinite" restart="never" nodeType="tmRoot"/>
-      </p:par>
-    </p:tnLst>
-  </p:timing>
-</p:sld>
-</file>
-
-<file path=ppt/slides/slide8.xml><?xml version="1.0" encoding="utf-8"?>
-<p:sld xmlns:a="http://schemas.openxmlformats.org/drawingml/2006/main" xmlns:r="http://schemas.openxmlformats.org/officeDocument/2006/relationships" xmlns:p="http://schemas.openxmlformats.org/presentationml/2006/main">
-  <p:cSld>
-    <p:spTree>
-      <p:nvGrpSpPr>
-        <p:cNvPr id="1" name=""/>
-        <p:cNvGrpSpPr/>
-        <p:nvPr/>
-      </p:nvGrpSpPr>
-      <p:grpSpPr>
-        <a:xfrm>
-          <a:off x="0" y="0"/>
-          <a:ext cx="0" cy="0"/>
-          <a:chOff x="0" y="0"/>
-          <a:chExt cx="0" cy="0"/>
-        </a:xfrm>
-      </p:grpSpPr>
-      <p:sp>
-        <p:nvSpPr>
-          <p:cNvPr id="2" name="Title 1"/>
-          <p:cNvSpPr>
-            <a:spLocks noGrp="1"/>
-          </p:cNvSpPr>
-          <p:nvPr>
-            <p:ph type="title"/>
-          </p:nvPr>
-        </p:nvSpPr>
-        <p:spPr/>
-        <p:txBody>
-          <a:bodyPr/>
-          <a:lstStyle/>
-          <a:p>
-            <a:r>
-              <a:rPr lang="en-US" dirty="0" smtClean="0"/>
-              <a:t>Features</a:t>
-            </a:r>
-            <a:endParaRPr lang="en-GB" dirty="0"/>
-          </a:p>
-        </p:txBody>
-      </p:sp>
-      <p:graphicFrame>
-        <p:nvGraphicFramePr>
-          <p:cNvPr id="4" name="Content Placeholder 3"/>
-          <p:cNvGraphicFramePr>
-            <a:graphicFrameLocks noGrp="1"/>
-          </p:cNvGraphicFramePr>
-          <p:nvPr>
-            <p:ph idx="1"/>
-            <p:extLst>
-              <p:ext uri="{D42A27DB-BD31-4B8C-83A1-F6EECF244321}">
-                <p14:modId xmlns:p14="http://schemas.microsoft.com/office/powerpoint/2010/main" val="1990236922"/>
-              </p:ext>
-            </p:extLst>
-          </p:nvPr>
-        </p:nvGraphicFramePr>
-        <p:xfrm>
-          <a:off x="458922" y="1787101"/>
-          <a:ext cx="9689630" cy="4613699"/>
-        </p:xfrm>
-        <a:graphic>
-          <a:graphicData uri="http://schemas.openxmlformats.org/drawingml/2006/diagram">
-            <dgm:relIds xmlns:dgm="http://schemas.openxmlformats.org/drawingml/2006/diagram" xmlns:r="http://schemas.openxmlformats.org/officeDocument/2006/relationships" r:dm="rId2" r:lo="rId3" r:qs="rId4" r:cs="rId5"/>
-          </a:graphicData>
-        </a:graphic>
-      </p:graphicFrame>
-    </p:spTree>
-    <p:extLst>
-      <p:ext uri="{BB962C8B-B14F-4D97-AF65-F5344CB8AC3E}">
-        <p14:creationId xmlns:p14="http://schemas.microsoft.com/office/powerpoint/2010/main" val="2669957109"/>
-      </p:ext>
-    </p:extLst>
-  </p:cSld>
-  <p:clrMapOvr>
-    <a:masterClrMapping/>
-  </p:clrMapOvr>
-  <mc:AlternateContent xmlns:mc="http://schemas.openxmlformats.org/markup-compatibility/2006">
-    <mc:Choice xmlns:p14="http://schemas.microsoft.com/office/powerpoint/2010/main" Requires="p14">
-      <p:transition spd="slow" p14:dur="1500">
-        <p:split orient="vert"/>
-      </p:transition>
-    </mc:Choice>
-    <mc:Fallback>
-      <p:transition spd="slow">
-        <p:split orient="vert"/>
-      </p:transition>
-    </mc:Fallback>
-  </mc:AlternateContent>
-  <p:timing>
-    <p:tnLst>
-      <p:par>
-        <p:cTn id="1" dur="indefinite" restart="never" nodeType="tmRoot"/>
-      </p:par>
-    </p:tnLst>
-  </p:timing>
-</p:sld>
-</file>
-
-<file path=ppt/slides/slide9.xml><?xml version="1.0" encoding="utf-8"?>
-<p:sld xmlns:a="http://schemas.openxmlformats.org/drawingml/2006/main" xmlns:r="http://schemas.openxmlformats.org/officeDocument/2006/relationships" xmlns:p="http://schemas.openxmlformats.org/presentationml/2006/main">
-  <p:cSld>
-    <p:spTree>
-      <p:nvGrpSpPr>
-        <p:cNvPr id="1" name=""/>
-        <p:cNvGrpSpPr/>
-        <p:nvPr/>
-      </p:nvGrpSpPr>
-      <p:grpSpPr>
-        <a:xfrm>
-          <a:off x="0" y="0"/>
-          <a:ext cx="0" cy="0"/>
-          <a:chOff x="0" y="0"/>
-          <a:chExt cx="0" cy="0"/>
-        </a:xfrm>
-      </p:grpSpPr>
-      <p:sp>
-        <p:nvSpPr>
-          <p:cNvPr id="2" name="Title 1"/>
-          <p:cNvSpPr>
-            <a:spLocks noGrp="1"/>
-          </p:cNvSpPr>
-          <p:nvPr>
-            <p:ph type="title"/>
-          </p:nvPr>
-        </p:nvSpPr>
-        <p:spPr/>
-        <p:txBody>
-          <a:bodyPr/>
-          <a:lstStyle/>
-          <a:p>
-            <a:r>
-              <a:rPr lang="en-US" dirty="0" smtClean="0"/>
-              <a:t>Demonstration Story</a:t>
-            </a:r>
-            <a:endParaRPr lang="en-GB" dirty="0"/>
-          </a:p>
-        </p:txBody>
-      </p:sp>
-      <p:pic>
-        <p:nvPicPr>
-          <p:cNvPr id="4" name="Picture 3"/>
-          <p:cNvPicPr>
-            <a:picLocks noChangeAspect="1"/>
-          </p:cNvPicPr>
-          <p:nvPr/>
-        </p:nvPicPr>
-        <p:blipFill>
-          <a:blip r:embed="rId2" cstate="print">
-            <a:extLst>
-              <a:ext uri="{28A0092B-C50C-407E-A947-70E740481C1C}">
-                <a14:useLocalDpi xmlns:a14="http://schemas.microsoft.com/office/drawing/2010/main" val="0"/>
-              </a:ext>
-            </a:extLst>
-          </a:blip>
-          <a:stretch>
-            <a:fillRect/>
-          </a:stretch>
-        </p:blipFill>
-        <p:spPr>
-          <a:xfrm>
-            <a:off x="352469" y="1945559"/>
-            <a:ext cx="1545167" cy="1627200"/>
-          </a:xfrm>
-          <a:prstGeom prst="rect">
-            <a:avLst/>
-          </a:prstGeom>
-        </p:spPr>
-      </p:pic>
-      <p:pic>
-        <p:nvPicPr>
-          <p:cNvPr id="5" name="Picture 4"/>
-          <p:cNvPicPr>
-            <a:picLocks noChangeAspect="1"/>
-          </p:cNvPicPr>
-          <p:nvPr/>
-        </p:nvPicPr>
-        <p:blipFill>
-          <a:blip r:embed="rId3">
-            <a:extLst>
-              <a:ext uri="{28A0092B-C50C-407E-A947-70E740481C1C}">
-                <a14:useLocalDpi xmlns:a14="http://schemas.microsoft.com/office/drawing/2010/main" val="0"/>
-              </a:ext>
-            </a:extLst>
-          </a:blip>
-          <a:stretch>
-            <a:fillRect/>
-          </a:stretch>
-        </p:blipFill>
-        <p:spPr>
-          <a:xfrm>
-            <a:off x="3760034" y="1945559"/>
-            <a:ext cx="1627200" cy="1627200"/>
-          </a:xfrm>
-          <a:prstGeom prst="rect">
-            <a:avLst/>
-          </a:prstGeom>
-        </p:spPr>
-      </p:pic>
-      <p:pic>
-        <p:nvPicPr>
-          <p:cNvPr id="6" name="Picture 5"/>
-          <p:cNvPicPr>
-            <a:picLocks noChangeAspect="1"/>
-          </p:cNvPicPr>
-          <p:nvPr/>
-        </p:nvPicPr>
-        <p:blipFill>
-          <a:blip r:embed="rId4" cstate="print">
-            <a:extLst>
-              <a:ext uri="{28A0092B-C50C-407E-A947-70E740481C1C}">
-                <a14:useLocalDpi xmlns:a14="http://schemas.microsoft.com/office/drawing/2010/main" val="0"/>
-              </a:ext>
-            </a:extLst>
-          </a:blip>
-          <a:stretch>
-            <a:fillRect/>
-          </a:stretch>
-        </p:blipFill>
-        <p:spPr>
-          <a:xfrm>
-            <a:off x="3760034" y="4901652"/>
-            <a:ext cx="1627200" cy="1627200"/>
-          </a:xfrm>
-          <a:prstGeom prst="rect">
-            <a:avLst/>
-          </a:prstGeom>
-        </p:spPr>
-      </p:pic>
-      <p:cxnSp>
-        <p:nvCxnSpPr>
-          <p:cNvPr id="8" name="Straight Arrow Connector 7"/>
-          <p:cNvCxnSpPr>
-            <a:stCxn id="4" idx="3"/>
-            <a:endCxn id="5" idx="1"/>
-          </p:cNvCxnSpPr>
-          <p:nvPr/>
-        </p:nvCxnSpPr>
-        <p:spPr>
-          <a:xfrm>
-            <a:off x="1897636" y="2759159"/>
-            <a:ext cx="1862398" cy="0"/>
-          </a:xfrm>
-          <a:prstGeom prst="straightConnector1">
-            <a:avLst/>
-          </a:prstGeom>
-          <a:ln w="38100">
-            <a:tailEnd type="arrow"/>
-          </a:ln>
-        </p:spPr>
-        <p:style>
-          <a:lnRef idx="1">
-            <a:schemeClr val="accent1"/>
-          </a:lnRef>
-          <a:fillRef idx="0">
-            <a:schemeClr val="accent1"/>
-          </a:fillRef>
-          <a:effectRef idx="0">
-            <a:schemeClr val="accent1"/>
-          </a:effectRef>
-          <a:fontRef idx="minor">
-            <a:schemeClr val="tx1"/>
-          </a:fontRef>
-        </p:style>
-      </p:cxnSp>
-      <p:pic>
-        <p:nvPicPr>
-          <p:cNvPr id="9" name="Picture 8"/>
-          <p:cNvPicPr>
-            <a:picLocks noChangeAspect="1"/>
-          </p:cNvPicPr>
-          <p:nvPr/>
-        </p:nvPicPr>
-        <p:blipFill>
-          <a:blip r:embed="rId5">
-            <a:extLst>
-              <a:ext uri="{28A0092B-C50C-407E-A947-70E740481C1C}">
-                <a14:useLocalDpi xmlns:a14="http://schemas.microsoft.com/office/drawing/2010/main" val="0"/>
-              </a:ext>
-            </a:extLst>
-          </a:blip>
-          <a:stretch>
-            <a:fillRect/>
-          </a:stretch>
-        </p:blipFill>
-        <p:spPr>
-          <a:xfrm>
-            <a:off x="7300090" y="4901652"/>
-            <a:ext cx="1627200" cy="1627200"/>
-          </a:xfrm>
-          <a:prstGeom prst="rect">
-            <a:avLst/>
-          </a:prstGeom>
-        </p:spPr>
-      </p:pic>
-      <p:pic>
-        <p:nvPicPr>
-          <p:cNvPr id="10" name="Picture 9"/>
-          <p:cNvPicPr>
-            <a:picLocks noChangeAspect="1"/>
-          </p:cNvPicPr>
-          <p:nvPr/>
-        </p:nvPicPr>
-        <p:blipFill>
-          <a:blip r:embed="rId6">
-            <a:extLst>
-              <a:ext uri="{28A0092B-C50C-407E-A947-70E740481C1C}">
-                <a14:useLocalDpi xmlns:a14="http://schemas.microsoft.com/office/drawing/2010/main" val="0"/>
-              </a:ext>
-            </a:extLst>
-          </a:blip>
-          <a:stretch>
-            <a:fillRect/>
-          </a:stretch>
-        </p:blipFill>
-        <p:spPr>
-          <a:xfrm>
-            <a:off x="7300090" y="1945559"/>
-            <a:ext cx="1627200" cy="1627200"/>
-          </a:xfrm>
-          <a:prstGeom prst="rect">
-            <a:avLst/>
-          </a:prstGeom>
-        </p:spPr>
-      </p:pic>
-      <p:cxnSp>
-        <p:nvCxnSpPr>
-          <p:cNvPr id="16" name="Straight Arrow Connector 15"/>
-          <p:cNvCxnSpPr>
-            <a:stCxn id="5" idx="2"/>
-            <a:endCxn id="6" idx="0"/>
-          </p:cNvCxnSpPr>
-          <p:nvPr/>
-        </p:nvCxnSpPr>
-        <p:spPr>
-          <a:xfrm>
-            <a:off x="4573634" y="3572759"/>
-            <a:ext cx="0" cy="1328893"/>
-          </a:xfrm>
-          <a:prstGeom prst="straightConnector1">
-            <a:avLst/>
-          </a:prstGeom>
-          <a:ln w="38100">
-            <a:tailEnd type="arrow"/>
-          </a:ln>
-        </p:spPr>
-        <p:style>
-          <a:lnRef idx="1">
-            <a:schemeClr val="accent1"/>
-          </a:lnRef>
-          <a:fillRef idx="0">
-            <a:schemeClr val="accent1"/>
-          </a:fillRef>
-          <a:effectRef idx="0">
-            <a:schemeClr val="accent1"/>
-          </a:effectRef>
-          <a:fontRef idx="minor">
-            <a:schemeClr val="tx1"/>
-          </a:fontRef>
-        </p:style>
-      </p:cxnSp>
-      <p:cxnSp>
-        <p:nvCxnSpPr>
-          <p:cNvPr id="18" name="Straight Arrow Connector 17"/>
-          <p:cNvCxnSpPr>
-            <a:stCxn id="6" idx="3"/>
-            <a:endCxn id="9" idx="1"/>
-          </p:cNvCxnSpPr>
-          <p:nvPr/>
-        </p:nvCxnSpPr>
-        <p:spPr>
-          <a:xfrm>
-            <a:off x="5387234" y="5715252"/>
-            <a:ext cx="1912856" cy="0"/>
-          </a:xfrm>
-          <a:prstGeom prst="straightConnector1">
-            <a:avLst/>
-          </a:prstGeom>
-          <a:ln w="38100">
-            <a:tailEnd type="arrow"/>
-          </a:ln>
-        </p:spPr>
-        <p:style>
-          <a:lnRef idx="1">
-            <a:schemeClr val="accent1"/>
-          </a:lnRef>
-          <a:fillRef idx="0">
-            <a:schemeClr val="accent1"/>
-          </a:fillRef>
-          <a:effectRef idx="0">
-            <a:schemeClr val="accent1"/>
-          </a:effectRef>
-          <a:fontRef idx="minor">
-            <a:schemeClr val="tx1"/>
-          </a:fontRef>
-        </p:style>
-      </p:cxnSp>
-      <p:cxnSp>
-        <p:nvCxnSpPr>
-          <p:cNvPr id="20" name="Straight Arrow Connector 19"/>
-          <p:cNvCxnSpPr>
-            <a:stCxn id="9" idx="0"/>
-            <a:endCxn id="10" idx="2"/>
-          </p:cNvCxnSpPr>
-          <p:nvPr/>
-        </p:nvCxnSpPr>
-        <p:spPr>
-          <a:xfrm flipV="1">
-            <a:off x="8113690" y="3572759"/>
-            <a:ext cx="0" cy="1328893"/>
-          </a:xfrm>
-          <a:prstGeom prst="straightConnector1">
-            <a:avLst/>
-          </a:prstGeom>
-          <a:ln w="38100">
-            <a:tailEnd type="arrow"/>
-          </a:ln>
-        </p:spPr>
-        <p:style>
-          <a:lnRef idx="1">
-            <a:schemeClr val="accent1"/>
-          </a:lnRef>
-          <a:fillRef idx="0">
-            <a:schemeClr val="accent1"/>
-          </a:fillRef>
-          <a:effectRef idx="0">
-            <a:schemeClr val="accent1"/>
-          </a:effectRef>
-          <a:fontRef idx="minor">
-            <a:schemeClr val="tx1"/>
-          </a:fontRef>
-        </p:style>
-      </p:cxnSp>
-    </p:spTree>
-    <p:extLst>
-      <p:ext uri="{BB962C8B-B14F-4D97-AF65-F5344CB8AC3E}">
-        <p14:creationId xmlns:p14="http://schemas.microsoft.com/office/powerpoint/2010/main" val="1836446923"/>
-      </p:ext>
-    </p:extLst>
-  </p:cSld>
-  <p:clrMapOvr>
-    <a:masterClrMapping/>
-  </p:clrMapOvr>
-  <mc:AlternateContent xmlns:mc="http://schemas.openxmlformats.org/markup-compatibility/2006" xmlns:p14="http://schemas.microsoft.com/office/powerpoint/2010/main">
-    <mc:Choice Requires="p14">
-      <p:transition spd="slow" p14:dur="1600">
-        <p:blinds dir="vert"/>
-      </p:transition>
-    </mc:Choice>
-    <mc:Fallback xmlns="">
-      <p:transition spd="slow">
-        <p:blinds dir="vert"/>
-      </p:transition>
-    </mc:Fallback>
-  </mc:AlternateContent>
-  <p:timing>
-    <p:tnLst>
-      <p:par>
-        <p:cTn id="1" dur="indefinite" restart="never" nodeType="tmRoot">
-          <p:childTnLst>
-            <p:seq concurrent="1" nextAc="seek">
-              <p:cTn id="2" dur="indefinite" nodeType="mainSeq">
-                <p:childTnLst>
-                  <p:par>
-                    <p:cTn id="3" fill="hold">
-                      <p:stCondLst>
-                        <p:cond delay="indefinite"/>
-                      </p:stCondLst>
-                      <p:childTnLst>
-                        <p:par>
-                          <p:cTn id="4" fill="hold">
-                            <p:stCondLst>
-                              <p:cond delay="0"/>
-                            </p:stCondLst>
-                            <p:childTnLst>
-                              <p:par>
-                                <p:cTn id="5" presetID="14" presetClass="entr" presetSubtype="10" fill="hold" nodeType="clickEffect">
-                                  <p:stCondLst>
-                                    <p:cond delay="0"/>
-                                  </p:stCondLst>
-                                  <p:childTnLst>
-                                    <p:set>
-                                      <p:cBhvr>
-                                        <p:cTn id="6" dur="1" fill="hold">
-                                          <p:stCondLst>
-                                            <p:cond delay="0"/>
-                                          </p:stCondLst>
-                                        </p:cTn>
-                                        <p:tgtEl>
-                                          <p:spTgt spid="4"/>
-                                        </p:tgtEl>
-                                        <p:attrNameLst>
-                                          <p:attrName>style.visibility</p:attrName>
-                                        </p:attrNameLst>
-                                      </p:cBhvr>
-                                      <p:to>
-                                        <p:strVal val="visible"/>
-                                      </p:to>
-                                    </p:set>
-                                    <p:animEffect transition="in" filter="randombar(horizontal)">
-                                      <p:cBhvr>
-                                        <p:cTn id="7" dur="500"/>
-                                        <p:tgtEl>
-                                          <p:spTgt spid="4"/>
-                                        </p:tgtEl>
-                                      </p:cBhvr>
-                                    </p:animEffect>
-                                  </p:childTnLst>
-                                </p:cTn>
-                              </p:par>
-                            </p:childTnLst>
-                          </p:cTn>
-                        </p:par>
-                      </p:childTnLst>
-                    </p:cTn>
-                  </p:par>
-                  <p:par>
-                    <p:cTn id="8" fill="hold">
-                      <p:stCondLst>
-                        <p:cond delay="indefinite"/>
-                      </p:stCondLst>
-                      <p:childTnLst>
-                        <p:par>
-                          <p:cTn id="9" fill="hold">
-                            <p:stCondLst>
-                              <p:cond delay="0"/>
-                            </p:stCondLst>
-                            <p:childTnLst>
-                              <p:par>
-                                <p:cTn id="10" presetID="14" presetClass="entr" presetSubtype="10" fill="hold" nodeType="clickEffect">
-                                  <p:stCondLst>
-                                    <p:cond delay="0"/>
-                                  </p:stCondLst>
-                                  <p:childTnLst>
-                                    <p:set>
-                                      <p:cBhvr>
-                                        <p:cTn id="11" dur="1" fill="hold">
-                                          <p:stCondLst>
-                                            <p:cond delay="0"/>
-                                          </p:stCondLst>
-                                        </p:cTn>
-                                        <p:tgtEl>
-                                          <p:spTgt spid="8"/>
-                                        </p:tgtEl>
-                                        <p:attrNameLst>
-                                          <p:attrName>style.visibility</p:attrName>
-                                        </p:attrNameLst>
-                                      </p:cBhvr>
-                                      <p:to>
-                                        <p:strVal val="visible"/>
-                                      </p:to>
-                                    </p:set>
-                                    <p:animEffect transition="in" filter="randombar(horizontal)">
-                                      <p:cBhvr>
-                                        <p:cTn id="12" dur="500"/>
-                                        <p:tgtEl>
-                                          <p:spTgt spid="8"/>
-                                        </p:tgtEl>
-                                      </p:cBhvr>
-                                    </p:animEffect>
-                                  </p:childTnLst>
-                                </p:cTn>
-                              </p:par>
-                              <p:par>
-                                <p:cTn id="13" presetID="14" presetClass="entr" presetSubtype="10" fill="hold" nodeType="withEffect">
-                                  <p:stCondLst>
-                                    <p:cond delay="0"/>
-                                  </p:stCondLst>
-                                  <p:childTnLst>
-                                    <p:set>
-                                      <p:cBhvr>
-                                        <p:cTn id="14" dur="1" fill="hold">
-                                          <p:stCondLst>
-                                            <p:cond delay="0"/>
-                                          </p:stCondLst>
-                                        </p:cTn>
-                                        <p:tgtEl>
-                                          <p:spTgt spid="5"/>
-                                        </p:tgtEl>
-                                        <p:attrNameLst>
-                                          <p:attrName>style.visibility</p:attrName>
-                                        </p:attrNameLst>
-                                      </p:cBhvr>
-                                      <p:to>
-                                        <p:strVal val="visible"/>
-                                      </p:to>
-                                    </p:set>
-                                    <p:animEffect transition="in" filter="randombar(horizontal)">
-                                      <p:cBhvr>
-                                        <p:cTn id="15" dur="500"/>
-                                        <p:tgtEl>
-                                          <p:spTgt spid="5"/>
-                                        </p:tgtEl>
-                                      </p:cBhvr>
-                                    </p:animEffect>
-                                  </p:childTnLst>
-                                </p:cTn>
-                              </p:par>
-                            </p:childTnLst>
-                          </p:cTn>
-                        </p:par>
-                      </p:childTnLst>
-                    </p:cTn>
-                  </p:par>
-                  <p:par>
-                    <p:cTn id="16" fill="hold">
-                      <p:stCondLst>
-                        <p:cond delay="indefinite"/>
-                      </p:stCondLst>
-                      <p:childTnLst>
-                        <p:par>
-                          <p:cTn id="17" fill="hold">
-                            <p:stCondLst>
-                              <p:cond delay="0"/>
-                            </p:stCondLst>
-                            <p:childTnLst>
-                              <p:par>
-                                <p:cTn id="18" presetID="14" presetClass="entr" presetSubtype="10" fill="hold" nodeType="clickEffect">
-                                  <p:stCondLst>
-                                    <p:cond delay="0"/>
-                                  </p:stCondLst>
-                                  <p:childTnLst>
-                                    <p:set>
-                                      <p:cBhvr>
-                                        <p:cTn id="19" dur="1" fill="hold">
-                                          <p:stCondLst>
-                                            <p:cond delay="0"/>
-                                          </p:stCondLst>
-                                        </p:cTn>
-                                        <p:tgtEl>
-                                          <p:spTgt spid="16"/>
-                                        </p:tgtEl>
-                                        <p:attrNameLst>
-                                          <p:attrName>style.visibility</p:attrName>
-                                        </p:attrNameLst>
-                                      </p:cBhvr>
-                                      <p:to>
-                                        <p:strVal val="visible"/>
-                                      </p:to>
-                                    </p:set>
-                                    <p:animEffect transition="in" filter="randombar(horizontal)">
-                                      <p:cBhvr>
-                                        <p:cTn id="20" dur="500"/>
-                                        <p:tgtEl>
-                                          <p:spTgt spid="16"/>
-                                        </p:tgtEl>
-                                      </p:cBhvr>
-                                    </p:animEffect>
-                                  </p:childTnLst>
-                                </p:cTn>
-                              </p:par>
-                              <p:par>
-                                <p:cTn id="21" presetID="14" presetClass="entr" presetSubtype="10" fill="hold" nodeType="withEffect">
-                                  <p:stCondLst>
-                                    <p:cond delay="0"/>
-                                  </p:stCondLst>
-                                  <p:childTnLst>
-                                    <p:set>
-                                      <p:cBhvr>
-                                        <p:cTn id="22" dur="1" fill="hold">
-                                          <p:stCondLst>
-                                            <p:cond delay="0"/>
-                                          </p:stCondLst>
-                                        </p:cTn>
-                                        <p:tgtEl>
-                                          <p:spTgt spid="6"/>
-                                        </p:tgtEl>
-                                        <p:attrNameLst>
-                                          <p:attrName>style.visibility</p:attrName>
-                                        </p:attrNameLst>
-                                      </p:cBhvr>
-                                      <p:to>
-                                        <p:strVal val="visible"/>
-                                      </p:to>
-                                    </p:set>
-                                    <p:animEffect transition="in" filter="randombar(horizontal)">
-                                      <p:cBhvr>
-                                        <p:cTn id="23" dur="500"/>
-                                        <p:tgtEl>
-                                          <p:spTgt spid="6"/>
-                                        </p:tgtEl>
-                                      </p:cBhvr>
-                                    </p:animEffect>
-                                  </p:childTnLst>
-                                </p:cTn>
-                              </p:par>
-                            </p:childTnLst>
-                          </p:cTn>
-                        </p:par>
-                      </p:childTnLst>
-                    </p:cTn>
-                  </p:par>
-                  <p:par>
-                    <p:cTn id="24" fill="hold">
-                      <p:stCondLst>
-                        <p:cond delay="indefinite"/>
-                      </p:stCondLst>
-                      <p:childTnLst>
-                        <p:par>
-                          <p:cTn id="25" fill="hold">
-                            <p:stCondLst>
-                              <p:cond delay="0"/>
-                            </p:stCondLst>
-                            <p:childTnLst>
-                              <p:par>
-                                <p:cTn id="26" presetID="14" presetClass="entr" presetSubtype="10" fill="hold" nodeType="clickEffect">
-                                  <p:stCondLst>
-                                    <p:cond delay="0"/>
-                                  </p:stCondLst>
-                                  <p:childTnLst>
-                                    <p:set>
-                                      <p:cBhvr>
-                                        <p:cTn id="27" dur="1" fill="hold">
-                                          <p:stCondLst>
-                                            <p:cond delay="0"/>
-                                          </p:stCondLst>
-                                        </p:cTn>
-                                        <p:tgtEl>
-                                          <p:spTgt spid="18"/>
-                                        </p:tgtEl>
-                                        <p:attrNameLst>
-                                          <p:attrName>style.visibility</p:attrName>
-                                        </p:attrNameLst>
-                                      </p:cBhvr>
-                                      <p:to>
-                                        <p:strVal val="visible"/>
-                                      </p:to>
-                                    </p:set>
-                                    <p:animEffect transition="in" filter="randombar(horizontal)">
-                                      <p:cBhvr>
-                                        <p:cTn id="28" dur="500"/>
-                                        <p:tgtEl>
-                                          <p:spTgt spid="18"/>
-                                        </p:tgtEl>
-                                      </p:cBhvr>
-                                    </p:animEffect>
-                                  </p:childTnLst>
-                                </p:cTn>
-                              </p:par>
-                              <p:par>
-                                <p:cTn id="29" presetID="14" presetClass="entr" presetSubtype="10" fill="hold" nodeType="withEffect">
-                                  <p:stCondLst>
-                                    <p:cond delay="0"/>
-                                  </p:stCondLst>
-                                  <p:childTnLst>
-                                    <p:set>
-                                      <p:cBhvr>
-                                        <p:cTn id="30" dur="1" fill="hold">
-                                          <p:stCondLst>
-                                            <p:cond delay="0"/>
-                                          </p:stCondLst>
-                                        </p:cTn>
-                                        <p:tgtEl>
-                                          <p:spTgt spid="9"/>
-                                        </p:tgtEl>
-                                        <p:attrNameLst>
-                                          <p:attrName>style.visibility</p:attrName>
-                                        </p:attrNameLst>
-                                      </p:cBhvr>
-                                      <p:to>
-                                        <p:strVal val="visible"/>
-                                      </p:to>
-                                    </p:set>
-                                    <p:animEffect transition="in" filter="randombar(horizontal)">
-                                      <p:cBhvr>
-                                        <p:cTn id="31" dur="500"/>
-                                        <p:tgtEl>
-                                          <p:spTgt spid="9"/>
-                                        </p:tgtEl>
-                                      </p:cBhvr>
-                                    </p:animEffect>
-                                  </p:childTnLst>
-                                </p:cTn>
-                              </p:par>
-                            </p:childTnLst>
-                          </p:cTn>
-                        </p:par>
-                      </p:childTnLst>
-                    </p:cTn>
-                  </p:par>
-                  <p:par>
-                    <p:cTn id="32" fill="hold">
-                      <p:stCondLst>
-                        <p:cond delay="indefinite"/>
-                      </p:stCondLst>
-                      <p:childTnLst>
-                        <p:par>
-                          <p:cTn id="33" fill="hold">
-                            <p:stCondLst>
-                              <p:cond delay="0"/>
-                            </p:stCondLst>
-                            <p:childTnLst>
-                              <p:par>
-                                <p:cTn id="34" presetID="14" presetClass="entr" presetSubtype="10" fill="hold" nodeType="clickEffect">
-                                  <p:stCondLst>
-                                    <p:cond delay="0"/>
-                                  </p:stCondLst>
-                                  <p:childTnLst>
-                                    <p:set>
-                                      <p:cBhvr>
-                                        <p:cTn id="35" dur="1" fill="hold">
-                                          <p:stCondLst>
-                                            <p:cond delay="0"/>
-                                          </p:stCondLst>
-                                        </p:cTn>
-                                        <p:tgtEl>
-                                          <p:spTgt spid="20"/>
-                                        </p:tgtEl>
-                                        <p:attrNameLst>
-                                          <p:attrName>style.visibility</p:attrName>
-                                        </p:attrNameLst>
-                                      </p:cBhvr>
-                                      <p:to>
-                                        <p:strVal val="visible"/>
-                                      </p:to>
-                                    </p:set>
-                                    <p:animEffect transition="in" filter="randombar(horizontal)">
-                                      <p:cBhvr>
-                                        <p:cTn id="36" dur="500"/>
-                                        <p:tgtEl>
-                                          <p:spTgt spid="20"/>
-                                        </p:tgtEl>
-                                      </p:cBhvr>
-                                    </p:animEffect>
-                                  </p:childTnLst>
-                                </p:cTn>
-                              </p:par>
-                              <p:par>
-                                <p:cTn id="37" presetID="14" presetClass="entr" presetSubtype="10" fill="hold" nodeType="withEffect">
-                                  <p:stCondLst>
-                                    <p:cond delay="0"/>
-                                  </p:stCondLst>
-                                  <p:childTnLst>
-                                    <p:set>
-                                      <p:cBhvr>
-                                        <p:cTn id="38" dur="1" fill="hold">
-                                          <p:stCondLst>
-                                            <p:cond delay="0"/>
-                                          </p:stCondLst>
-                                        </p:cTn>
-                                        <p:tgtEl>
-                                          <p:spTgt spid="10"/>
-                                        </p:tgtEl>
-                                        <p:attrNameLst>
-                                          <p:attrName>style.visibility</p:attrName>
-                                        </p:attrNameLst>
-                                      </p:cBhvr>
-                                      <p:to>
-                                        <p:strVal val="visible"/>
-                                      </p:to>
-                                    </p:set>
-                                    <p:animEffect transition="in" filter="randombar(horizontal)">
-                                      <p:cBhvr>
-                                        <p:cTn id="39" dur="500"/>
-                                        <p:tgtEl>
-                                          <p:spTgt spid="10"/>
-                                        </p:tgtEl>
-                                      </p:cBhvr>
-                                    </p:animEffect>
-                                  </p:childTnLst>
-                                </p:cTn>
-                              </p:par>
-                            </p:childTnLst>
-                          </p:cTn>
-                        </p:par>
-                      </p:childTnLst>
-                    </p:cTn>
-                  </p:par>
-                </p:childTnLst>
-              </p:cTn>
-              <p:prevCondLst>
-                <p:cond evt="onPrev" delay="0">
-                  <p:tgtEl>
-                    <p:sldTgt/>
-                  </p:tgtEl>
-                </p:cond>
-              </p:prevCondLst>
-              <p:nextCondLst>
-                <p:cond evt="onNext" delay="0">
-                  <p:tgtEl>
-                    <p:sldTgt/>
-                  </p:tgtEl>
-                </p:cond>
-              </p:nextCondLst>
-            </p:seq>
-          </p:childTnLst>
-        </p:cTn>
       </p:par>
     </p:tnLst>
   </p:timing>

</xml_diff>

<commit_message>
- String Comparison. - Update main slide.
</commit_message>
<xml_diff>
--- a/ smart-buy/Slides/Smart Buy.pptx
+++ b/ smart-buy/Slides/Smart Buy.pptx
@@ -6408,7 +6408,7 @@
         <a:p>
           <a:r>
             <a:rPr lang="en-US" dirty="0" smtClean="0"/>
-            <a:t>Manage cart</a:t>
+            <a:t>Estimate total price</a:t>
           </a:r>
           <a:endParaRPr lang="en-GB" dirty="0"/>
         </a:p>
@@ -6655,7 +6655,7 @@
     <dgm:pt modelId="{36FAAB07-1BD4-42B4-8036-62B0F623ED4C}" type="pres">
       <dgm:prSet presAssocID="{C8464284-228C-4A68-B873-0718032E1E61}" presName="pictRect" presStyleLbl="node1" presStyleIdx="1" presStyleCnt="7"/>
       <dgm:spPr>
-        <a:blipFill dpi="0" rotWithShape="1">
+        <a:blipFill>
           <a:blip xmlns:r="http://schemas.openxmlformats.org/officeDocument/2006/relationships" r:embed="rId2">
             <a:extLst>
               <a:ext uri="{28A0092B-C50C-407E-A947-70E740481C1C}">
@@ -6665,10 +6665,17 @@
           </a:blip>
           <a:srcRect/>
           <a:stretch>
-            <a:fillRect l="15550" r="15550"/>
+            <a:fillRect t="-23000" b="-23000"/>
           </a:stretch>
         </a:blipFill>
       </dgm:spPr>
+      <dgm:t>
+        <a:bodyPr/>
+        <a:lstStyle/>
+        <a:p>
+          <a:endParaRPr lang="en-GB"/>
+        </a:p>
+      </dgm:t>
     </dgm:pt>
     <dgm:pt modelId="{AB026361-32AF-4200-8E3C-B6BC87A0F3C1}" type="pres">
       <dgm:prSet presAssocID="{C8464284-228C-4A68-B873-0718032E1E61}" presName="textRect" presStyleLbl="revTx" presStyleIdx="1" presStyleCnt="7">
@@ -7239,20 +7246,20 @@
     <dgm:pt modelId="{3F152DA9-3FDF-4873-A49F-8049C0B4BEF7}" type="pres">
       <dgm:prSet presAssocID="{A15BA59D-14C6-4BA8-81C9-8CF4D9AABFDF}" presName="pictRect" presStyleLbl="node1" presStyleIdx="0" presStyleCnt="2"/>
       <dgm:spPr>
-        <a:blipFill>
-          <a:blip xmlns:r="http://schemas.openxmlformats.org/officeDocument/2006/relationships" r:embed="rId1">
-            <a:extLst>
-              <a:ext uri="{28A0092B-C50C-407E-A947-70E740481C1C}">
-                <a14:useLocalDpi xmlns:a14="http://schemas.microsoft.com/office/drawing/2010/main" val="0"/>
-              </a:ext>
-            </a:extLst>
-          </a:blip>
-          <a:srcRect/>
+        <a:blipFill rotWithShape="1">
+          <a:blip xmlns:r="http://schemas.openxmlformats.org/officeDocument/2006/relationships" r:embed="rId1"/>
           <a:stretch>
-            <a:fillRect t="-23000" b="-23000"/>
+            <a:fillRect/>
           </a:stretch>
         </a:blipFill>
       </dgm:spPr>
+      <dgm:t>
+        <a:bodyPr/>
+        <a:lstStyle/>
+        <a:p>
+          <a:endParaRPr lang="en-GB"/>
+        </a:p>
+      </dgm:t>
     </dgm:pt>
     <dgm:pt modelId="{3243D8B0-218F-4FC3-9EBC-CE3A4657CDCE}" type="pres">
       <dgm:prSet presAssocID="{A15BA59D-14C6-4BA8-81C9-8CF4D9AABFDF}" presName="textRect" presStyleLbl="revTx" presStyleIdx="0" presStyleCnt="2">
@@ -7285,9 +7292,24 @@
       <dgm:spPr/>
     </dgm:pt>
     <dgm:pt modelId="{85A45D3A-EBA4-4FC5-8EF5-EBCCFCE559F3}" type="pres">
-      <dgm:prSet presAssocID="{B1CB2D87-EA0C-46F2-9244-AE6A967A6F84}" presName="pictRect" presStyleLbl="node1" presStyleIdx="1" presStyleCnt="2"/>
+      <dgm:prSet presAssocID="{B1CB2D87-EA0C-46F2-9244-AE6A967A6F84}" presName="pictRect" presStyleLbl="node1" presStyleIdx="1" presStyleCnt="2">
+        <dgm:style>
+          <a:lnRef idx="2">
+            <a:schemeClr val="dk1"/>
+          </a:lnRef>
+          <a:fillRef idx="1">
+            <a:schemeClr val="lt1"/>
+          </a:fillRef>
+          <a:effectRef idx="0">
+            <a:schemeClr val="dk1"/>
+          </a:effectRef>
+          <a:fontRef idx="minor">
+            <a:schemeClr val="dk1"/>
+          </a:fontRef>
+        </dgm:style>
+      </dgm:prSet>
       <dgm:spPr>
-        <a:blipFill>
+        <a:blipFill dpi="0" rotWithShape="1">
           <a:blip xmlns:r="http://schemas.openxmlformats.org/officeDocument/2006/relationships" r:embed="rId2">
             <a:extLst>
               <a:ext uri="{28A0092B-C50C-407E-A947-70E740481C1C}">
@@ -7297,10 +7319,17 @@
           </a:blip>
           <a:srcRect/>
           <a:stretch>
-            <a:fillRect t="-24000" b="-24000"/>
+            <a:fillRect l="16017" r="16017"/>
           </a:stretch>
         </a:blipFill>
       </dgm:spPr>
+      <dgm:t>
+        <a:bodyPr/>
+        <a:lstStyle/>
+        <a:p>
+          <a:endParaRPr lang="en-GB"/>
+        </a:p>
+      </dgm:t>
     </dgm:pt>
     <dgm:pt modelId="{F76790B2-0C34-4DDC-AC4C-558B90BE42D0}" type="pres">
       <dgm:prSet presAssocID="{B1CB2D87-EA0C-46F2-9244-AE6A967A6F84}" presName="textRect" presStyleLbl="revTx" presStyleIdx="1" presStyleCnt="2">
@@ -9682,7 +9711,7 @@
         <a:prstGeom prst="roundRect">
           <a:avLst/>
         </a:prstGeom>
-        <a:blipFill dpi="0" rotWithShape="1">
+        <a:blipFill>
           <a:blip xmlns:r="http://schemas.openxmlformats.org/officeDocument/2006/relationships" r:embed="rId2">
             <a:extLst>
               <a:ext uri="{28A0092B-C50C-407E-A947-70E740481C1C}">
@@ -9692,7 +9721,7 @@
           </a:blip>
           <a:srcRect/>
           <a:stretch>
-            <a:fillRect l="15550" r="15550"/>
+            <a:fillRect t="-23000" b="-23000"/>
           </a:stretch>
         </a:blipFill>
         <a:ln>
@@ -9792,7 +9821,7 @@
           </a:pPr>
           <a:r>
             <a:rPr lang="en-US" sz="2200" kern="1200" dirty="0" smtClean="0"/>
-            <a:t>Manage cart</a:t>
+            <a:t>Estimate total price</a:t>
           </a:r>
           <a:endParaRPr lang="en-GB" sz="2200" kern="1200" dirty="0"/>
         </a:p>
@@ -10871,17 +10900,10 @@
         <a:prstGeom prst="roundRect">
           <a:avLst/>
         </a:prstGeom>
-        <a:blipFill>
-          <a:blip xmlns:r="http://schemas.openxmlformats.org/officeDocument/2006/relationships" r:embed="rId1">
-            <a:extLst>
-              <a:ext uri="{28A0092B-C50C-407E-A947-70E740481C1C}">
-                <a14:useLocalDpi xmlns:a14="http://schemas.microsoft.com/office/drawing/2010/main" val="0"/>
-              </a:ext>
-            </a:extLst>
-          </a:blip>
-          <a:srcRect/>
+        <a:blipFill rotWithShape="1">
+          <a:blip xmlns:r="http://schemas.openxmlformats.org/officeDocument/2006/relationships" r:embed="rId1"/>
           <a:stretch>
-            <a:fillRect t="-23000" b="-23000"/>
+            <a:fillRect/>
           </a:stretch>
         </a:blipFill>
         <a:ln w="19050" cap="rnd" cmpd="sng" algn="ctr">
@@ -10981,7 +11003,7 @@
         <a:prstGeom prst="roundRect">
           <a:avLst/>
         </a:prstGeom>
-        <a:blipFill>
+        <a:blipFill dpi="0" rotWithShape="1">
           <a:blip xmlns:r="http://schemas.openxmlformats.org/officeDocument/2006/relationships" r:embed="rId2">
             <a:extLst>
               <a:ext uri="{28A0092B-C50C-407E-A947-70E740481C1C}">
@@ -10991,17 +11013,12 @@
           </a:blip>
           <a:srcRect/>
           <a:stretch>
-            <a:fillRect t="-24000" b="-24000"/>
+            <a:fillRect l="16017" r="16017"/>
           </a:stretch>
         </a:blipFill>
         <a:ln w="19050" cap="rnd" cmpd="sng" algn="ctr">
           <a:solidFill>
-            <a:schemeClr val="lt1">
-              <a:hueOff val="0"/>
-              <a:satOff val="0"/>
-              <a:lumOff val="0"/>
-              <a:alphaOff val="0"/>
-            </a:schemeClr>
+            <a:schemeClr val="dk1"/>
           </a:solidFill>
           <a:prstDash val="solid"/>
         </a:ln>
@@ -11009,16 +11026,16 @@
       </dsp:spPr>
       <dsp:style>
         <a:lnRef idx="2">
-          <a:scrgbClr r="0" g="0" b="0"/>
+          <a:schemeClr val="dk1"/>
         </a:lnRef>
         <a:fillRef idx="1">
-          <a:scrgbClr r="0" g="0" b="0"/>
+          <a:schemeClr val="lt1"/>
         </a:fillRef>
         <a:effectRef idx="0">
-          <a:scrgbClr r="0" g="0" b="0"/>
+          <a:schemeClr val="dk1"/>
         </a:effectRef>
         <a:fontRef idx="minor">
-          <a:schemeClr val="lt1"/>
+          <a:schemeClr val="dk1"/>
         </a:fontRef>
       </dsp:style>
     </dsp:sp>
@@ -20672,7 +20689,7 @@
           <a:p>
             <a:fld id="{03828354-E0C5-4131-9B49-1997E3EE3A7D}" type="datetimeFigureOut">
               <a:rPr lang="en-US" smtClean="0"/>
-              <a:t>4/21/2014</a:t>
+              <a:t>4/29/2014</a:t>
             </a:fld>
             <a:endParaRPr lang="en-US"/>
           </a:p>
@@ -20923,7 +20940,7 @@
           <a:p>
             <a:fld id="{03828354-E0C5-4131-9B49-1997E3EE3A7D}" type="datetimeFigureOut">
               <a:rPr lang="en-US" smtClean="0"/>
-              <a:t>4/21/2014</a:t>
+              <a:t>4/29/2014</a:t>
             </a:fld>
             <a:endParaRPr lang="en-US"/>
           </a:p>
@@ -21237,7 +21254,7 @@
           <a:p>
             <a:fld id="{03828354-E0C5-4131-9B49-1997E3EE3A7D}" type="datetimeFigureOut">
               <a:rPr lang="en-US" smtClean="0"/>
-              <a:t>4/21/2014</a:t>
+              <a:t>4/29/2014</a:t>
             </a:fld>
             <a:endParaRPr lang="en-US"/>
           </a:p>
@@ -21578,7 +21595,7 @@
           <a:p>
             <a:fld id="{03828354-E0C5-4131-9B49-1997E3EE3A7D}" type="datetimeFigureOut">
               <a:rPr lang="en-US" smtClean="0"/>
-              <a:t>4/21/2014</a:t>
+              <a:t>4/29/2014</a:t>
             </a:fld>
             <a:endParaRPr lang="en-US"/>
           </a:p>
@@ -21892,7 +21909,7 @@
           <a:p>
             <a:fld id="{03828354-E0C5-4131-9B49-1997E3EE3A7D}" type="datetimeFigureOut">
               <a:rPr lang="en-US" smtClean="0"/>
-              <a:t>4/21/2014</a:t>
+              <a:t>4/29/2014</a:t>
             </a:fld>
             <a:endParaRPr lang="en-US"/>
           </a:p>
@@ -22285,7 +22302,7 @@
           <a:p>
             <a:fld id="{03828354-E0C5-4131-9B49-1997E3EE3A7D}" type="datetimeFigureOut">
               <a:rPr lang="en-US" smtClean="0"/>
-              <a:t>4/21/2014</a:t>
+              <a:t>4/29/2014</a:t>
             </a:fld>
             <a:endParaRPr lang="en-US"/>
           </a:p>
@@ -22455,7 +22472,7 @@
           <a:p>
             <a:fld id="{03828354-E0C5-4131-9B49-1997E3EE3A7D}" type="datetimeFigureOut">
               <a:rPr lang="en-US" smtClean="0"/>
-              <a:t>4/21/2014</a:t>
+              <a:t>4/29/2014</a:t>
             </a:fld>
             <a:endParaRPr lang="en-US"/>
           </a:p>
@@ -22635,7 +22652,7 @@
           <a:p>
             <a:fld id="{03828354-E0C5-4131-9B49-1997E3EE3A7D}" type="datetimeFigureOut">
               <a:rPr lang="en-US" smtClean="0"/>
-              <a:t>4/21/2014</a:t>
+              <a:t>4/29/2014</a:t>
             </a:fld>
             <a:endParaRPr lang="en-US"/>
           </a:p>
@@ -22845,7 +22862,7 @@
           <a:p>
             <a:fld id="{03828354-E0C5-4131-9B49-1997E3EE3A7D}" type="datetimeFigureOut">
               <a:rPr lang="en-US" smtClean="0"/>
-              <a:t>4/21/2014</a:t>
+              <a:t>4/29/2014</a:t>
             </a:fld>
             <a:endParaRPr lang="en-US"/>
           </a:p>
@@ -23092,7 +23109,7 @@
           <a:p>
             <a:fld id="{03828354-E0C5-4131-9B49-1997E3EE3A7D}" type="datetimeFigureOut">
               <a:rPr lang="en-US" smtClean="0"/>
-              <a:t>4/21/2014</a:t>
+              <a:t>4/29/2014</a:t>
             </a:fld>
             <a:endParaRPr lang="en-US"/>
           </a:p>
@@ -23324,7 +23341,7 @@
           <a:p>
             <a:fld id="{03828354-E0C5-4131-9B49-1997E3EE3A7D}" type="datetimeFigureOut">
               <a:rPr lang="en-US" smtClean="0"/>
-              <a:t>4/21/2014</a:t>
+              <a:t>4/29/2014</a:t>
             </a:fld>
             <a:endParaRPr lang="en-US"/>
           </a:p>
@@ -23698,7 +23715,7 @@
           <a:p>
             <a:fld id="{03828354-E0C5-4131-9B49-1997E3EE3A7D}" type="datetimeFigureOut">
               <a:rPr lang="en-US" smtClean="0"/>
-              <a:t>4/21/2014</a:t>
+              <a:t>4/29/2014</a:t>
             </a:fld>
             <a:endParaRPr lang="en-US"/>
           </a:p>
@@ -23821,7 +23838,7 @@
           <a:p>
             <a:fld id="{03828354-E0C5-4131-9B49-1997E3EE3A7D}" type="datetimeFigureOut">
               <a:rPr lang="en-US" smtClean="0"/>
-              <a:t>4/21/2014</a:t>
+              <a:t>4/29/2014</a:t>
             </a:fld>
             <a:endParaRPr lang="en-US"/>
           </a:p>
@@ -23916,7 +23933,7 @@
           <a:p>
             <a:fld id="{03828354-E0C5-4131-9B49-1997E3EE3A7D}" type="datetimeFigureOut">
               <a:rPr lang="en-US" smtClean="0"/>
-              <a:t>4/21/2014</a:t>
+              <a:t>4/29/2014</a:t>
             </a:fld>
             <a:endParaRPr lang="en-US"/>
           </a:p>
@@ -24171,7 +24188,7 @@
           <a:p>
             <a:fld id="{03828354-E0C5-4131-9B49-1997E3EE3A7D}" type="datetimeFigureOut">
               <a:rPr lang="en-US" smtClean="0"/>
-              <a:t>4/21/2014</a:t>
+              <a:t>4/29/2014</a:t>
             </a:fld>
             <a:endParaRPr lang="en-US"/>
           </a:p>
@@ -24434,7 +24451,7 @@
           <a:p>
             <a:fld id="{03828354-E0C5-4131-9B49-1997E3EE3A7D}" type="datetimeFigureOut">
               <a:rPr lang="en-US" smtClean="0"/>
-              <a:t>4/21/2014</a:t>
+              <a:t>4/29/2014</a:t>
             </a:fld>
             <a:endParaRPr lang="en-US"/>
           </a:p>
@@ -25177,7 +25194,7 @@
           <a:p>
             <a:fld id="{03828354-E0C5-4131-9B49-1997E3EE3A7D}" type="datetimeFigureOut">
               <a:rPr lang="en-US" smtClean="0"/>
-              <a:t>4/21/2014</a:t>
+              <a:t>4/29/2014</a:t>
             </a:fld>
             <a:endParaRPr lang="en-US"/>
           </a:p>
@@ -26253,7 +26270,7 @@
             <p:ph idx="1"/>
             <p:extLst>
               <p:ext uri="{D42A27DB-BD31-4B8C-83A1-F6EECF244321}">
-                <p14:modId xmlns:p14="http://schemas.microsoft.com/office/powerpoint/2010/main" val="1990236922"/>
+                <p14:modId xmlns:p14="http://schemas.microsoft.com/office/powerpoint/2010/main" val="1845994561"/>
               </p:ext>
             </p:extLst>
           </p:nvPr>
@@ -31376,7 +31393,7 @@
       </p:sp>
       <p:pic>
         <p:nvPicPr>
-          <p:cNvPr id="5" name="Picture 4"/>
+          <p:cNvPr id="6" name="Picture 5"/>
           <p:cNvPicPr>
             <a:picLocks noChangeAspect="1"/>
           </p:cNvPicPr>
@@ -31396,8 +31413,8 @@
         </p:blipFill>
         <p:spPr>
           <a:xfrm>
-            <a:off x="2236630" y="5357674"/>
-            <a:ext cx="1240665" cy="1240665"/>
+            <a:off x="8696167" y="4777130"/>
+            <a:ext cx="2200927" cy="1843452"/>
           </a:xfrm>
           <a:prstGeom prst="rect">
             <a:avLst/>
@@ -31406,7 +31423,7 @@
       </p:pic>
       <p:pic>
         <p:nvPicPr>
-          <p:cNvPr id="6" name="Picture 5"/>
+          <p:cNvPr id="3" name="Picture 2"/>
           <p:cNvPicPr>
             <a:picLocks noChangeAspect="1"/>
           </p:cNvPicPr>
@@ -31426,8 +31443,8 @@
         </p:blipFill>
         <p:spPr>
           <a:xfrm>
-            <a:off x="9055209" y="5356339"/>
-            <a:ext cx="1482844" cy="1242000"/>
+            <a:off x="73651" y="1512815"/>
+            <a:ext cx="2880171" cy="1908000"/>
           </a:xfrm>
           <a:prstGeom prst="rect">
             <a:avLst/>
@@ -31436,14 +31453,14 @@
       </p:pic>
       <p:pic>
         <p:nvPicPr>
-          <p:cNvPr id="3" name="Picture 2"/>
+          <p:cNvPr id="4" name="Picture 3"/>
           <p:cNvPicPr>
             <a:picLocks noChangeAspect="1"/>
           </p:cNvPicPr>
           <p:nvPr/>
         </p:nvPicPr>
         <p:blipFill>
-          <a:blip r:embed="rId4">
+          <a:blip r:embed="rId4" cstate="print">
             <a:extLst>
               <a:ext uri="{28A0092B-C50C-407E-A947-70E740481C1C}">
                 <a14:useLocalDpi xmlns:a14="http://schemas.microsoft.com/office/drawing/2010/main" val="0"/>
@@ -31456,8 +31473,8 @@
         </p:blipFill>
         <p:spPr>
           <a:xfrm>
-            <a:off x="73651" y="1912064"/>
-            <a:ext cx="2880171" cy="1908000"/>
+            <a:off x="3299876" y="1512815"/>
+            <a:ext cx="3411363" cy="1908000"/>
           </a:xfrm>
           <a:prstGeom prst="rect">
             <a:avLst/>
@@ -31466,7 +31483,7 @@
       </p:pic>
       <p:pic>
         <p:nvPicPr>
-          <p:cNvPr id="4" name="Picture 3"/>
+          <p:cNvPr id="7" name="Picture 6"/>
           <p:cNvPicPr>
             <a:picLocks noChangeAspect="1"/>
           </p:cNvPicPr>
@@ -31486,24 +31503,67 @@
         </p:blipFill>
         <p:spPr>
           <a:xfrm>
-            <a:off x="3299876" y="1912064"/>
-            <a:ext cx="3411363" cy="1908000"/>
+            <a:off x="8337126" y="1495031"/>
+            <a:ext cx="2919010" cy="1907560"/>
           </a:xfrm>
           <a:prstGeom prst="rect">
             <a:avLst/>
           </a:prstGeom>
         </p:spPr>
       </p:pic>
+      <p:cxnSp>
+        <p:nvCxnSpPr>
+          <p:cNvPr id="13" name="Straight Arrow Connector 12"/>
+          <p:cNvCxnSpPr>
+            <a:stCxn id="7" idx="2"/>
+            <a:endCxn id="6" idx="0"/>
+          </p:cNvCxnSpPr>
+          <p:nvPr/>
+        </p:nvCxnSpPr>
+        <p:spPr>
+          <a:xfrm>
+            <a:off x="9796631" y="3402591"/>
+            <a:ext cx="0" cy="1374539"/>
+          </a:xfrm>
+          <a:prstGeom prst="straightConnector1">
+            <a:avLst/>
+          </a:prstGeom>
+          <a:ln w="38100">
+            <a:tailEnd type="arrow"/>
+          </a:ln>
+        </p:spPr>
+        <p:style>
+          <a:lnRef idx="1">
+            <a:schemeClr val="accent1"/>
+          </a:lnRef>
+          <a:fillRef idx="0">
+            <a:schemeClr val="accent1"/>
+          </a:fillRef>
+          <a:effectRef idx="0">
+            <a:schemeClr val="accent1"/>
+          </a:effectRef>
+          <a:fontRef idx="minor">
+            <a:schemeClr val="tx1"/>
+          </a:fontRef>
+        </p:style>
+      </p:cxnSp>
       <p:pic>
         <p:nvPicPr>
-          <p:cNvPr id="7" name="Picture 6"/>
+          <p:cNvPr id="8" name="Picture 7"/>
           <p:cNvPicPr>
             <a:picLocks noChangeAspect="1"/>
           </p:cNvPicPr>
           <p:nvPr/>
         </p:nvPicPr>
         <p:blipFill>
-          <a:blip r:embed="rId6" cstate="print">
+          <a:blip r:embed="rId6">
+            <a:duotone>
+              <a:prstClr val="black"/>
+              <a:schemeClr val="accent1">
+                <a:tint val="45000"/>
+                <a:satMod val="400000"/>
+              </a:schemeClr>
+            </a:duotone>
             <a:extLst>
               <a:ext uri="{28A0092B-C50C-407E-A947-70E740481C1C}">
                 <a14:useLocalDpi xmlns:a14="http://schemas.microsoft.com/office/drawing/2010/main" val="0"/>
@@ -31516,8 +31576,8 @@
         </p:blipFill>
         <p:spPr>
           <a:xfrm>
-            <a:off x="8337126" y="1894280"/>
-            <a:ext cx="2919010" cy="1907560"/>
+            <a:off x="1513736" y="4802542"/>
+            <a:ext cx="3625738" cy="1792629"/>
           </a:xfrm>
           <a:prstGeom prst="rect">
             <a:avLst/>
@@ -31526,7 +31586,7 @@
       </p:pic>
       <p:cxnSp>
         <p:nvCxnSpPr>
-          <p:cNvPr id="9" name="Straight Arrow Connector 8"/>
+          <p:cNvPr id="12" name="Straight Arrow Connector 11"/>
           <p:cNvCxnSpPr>
             <a:stCxn id="3" idx="2"/>
           </p:cNvCxnSpPr>
@@ -31534,8 +31594,8 @@
         </p:nvCxnSpPr>
         <p:spPr>
           <a:xfrm>
-            <a:off x="1513737" y="3820064"/>
-            <a:ext cx="868855" cy="1536275"/>
+            <a:off x="1513737" y="3420815"/>
+            <a:ext cx="740066" cy="1381727"/>
           </a:xfrm>
           <a:prstGeom prst="straightConnector1">
             <a:avLst/>
@@ -31561,7 +31621,7 @@
       </p:cxnSp>
       <p:cxnSp>
         <p:nvCxnSpPr>
-          <p:cNvPr id="11" name="Straight Arrow Connector 10"/>
+          <p:cNvPr id="15" name="Straight Arrow Connector 14"/>
           <p:cNvCxnSpPr>
             <a:stCxn id="4" idx="2"/>
           </p:cNvCxnSpPr>
@@ -31569,44 +31629,8 @@
         </p:nvCxnSpPr>
         <p:spPr>
           <a:xfrm flipH="1">
-            <a:off x="3477295" y="3820064"/>
-            <a:ext cx="1528263" cy="1537610"/>
-          </a:xfrm>
-          <a:prstGeom prst="straightConnector1">
-            <a:avLst/>
-          </a:prstGeom>
-          <a:ln w="38100">
-            <a:tailEnd type="arrow"/>
-          </a:ln>
-        </p:spPr>
-        <p:style>
-          <a:lnRef idx="1">
-            <a:schemeClr val="accent1"/>
-          </a:lnRef>
-          <a:fillRef idx="0">
-            <a:schemeClr val="accent1"/>
-          </a:fillRef>
-          <a:effectRef idx="0">
-            <a:schemeClr val="accent1"/>
-          </a:effectRef>
-          <a:fontRef idx="minor">
-            <a:schemeClr val="tx1"/>
-          </a:fontRef>
-        </p:style>
-      </p:cxnSp>
-      <p:cxnSp>
-        <p:nvCxnSpPr>
-          <p:cNvPr id="13" name="Straight Arrow Connector 12"/>
-          <p:cNvCxnSpPr>
-            <a:stCxn id="7" idx="2"/>
-            <a:endCxn id="6" idx="0"/>
-          </p:cNvCxnSpPr>
-          <p:nvPr/>
-        </p:nvCxnSpPr>
-        <p:spPr>
-          <a:xfrm>
-            <a:off x="9796631" y="3801840"/>
-            <a:ext cx="0" cy="1554499"/>
+            <a:off x="3554569" y="3420815"/>
+            <a:ext cx="1450989" cy="1381727"/>
           </a:xfrm>
           <a:prstGeom prst="straightConnector1">
             <a:avLst/>
@@ -31747,7 +31771,7 @@
                                           </p:stCondLst>
                                         </p:cTn>
                                         <p:tgtEl>
-                                          <p:spTgt spid="9"/>
+                                          <p:spTgt spid="12"/>
                                         </p:tgtEl>
                                         <p:attrNameLst>
                                           <p:attrName>style.visibility</p:attrName>
@@ -31761,7 +31785,7 @@
                                       <p:cBhvr>
                                         <p:cTn id="13" dur="500"/>
                                         <p:tgtEl>
-                                          <p:spTgt spid="9"/>
+                                          <p:spTgt spid="12"/>
                                         </p:tgtEl>
                                       </p:cBhvr>
                                     </p:animEffect>
@@ -31782,7 +31806,7 @@
                                           </p:stCondLst>
                                         </p:cTn>
                                         <p:tgtEl>
-                                          <p:spTgt spid="11"/>
+                                          <p:spTgt spid="15"/>
                                         </p:tgtEl>
                                         <p:attrNameLst>
                                           <p:attrName>style.visibility</p:attrName>
@@ -31796,7 +31820,7 @@
                                       <p:cBhvr>
                                         <p:cTn id="16" dur="500"/>
                                         <p:tgtEl>
-                                          <p:spTgt spid="11"/>
+                                          <p:spTgt spid="15"/>
                                         </p:tgtEl>
                                       </p:cBhvr>
                                     </p:animEffect>
@@ -31817,7 +31841,7 @@
                                           </p:stCondLst>
                                         </p:cTn>
                                         <p:tgtEl>
-                                          <p:spTgt spid="5"/>
+                                          <p:spTgt spid="8"/>
                                         </p:tgtEl>
                                         <p:attrNameLst>
                                           <p:attrName>style.visibility</p:attrName>
@@ -31831,7 +31855,7 @@
                                       <p:cBhvr>
                                         <p:cTn id="19" dur="500"/>
                                         <p:tgtEl>
-                                          <p:spTgt spid="5"/>
+                                          <p:spTgt spid="8"/>
                                         </p:tgtEl>
                                       </p:cBhvr>
                                     </p:animEffect>
@@ -36653,7 +36677,7 @@
       </p:sp>
       <p:pic>
         <p:nvPicPr>
-          <p:cNvPr id="4" name="Content Placeholder 3"/>
+          <p:cNvPr id="5" name="Content Placeholder 4"/>
           <p:cNvPicPr>
             <a:picLocks noGrp="1" noChangeAspect="1"/>
           </p:cNvPicPr>
@@ -36675,8 +36699,8 @@
         </p:blipFill>
         <p:spPr>
           <a:xfrm>
-            <a:off x="524746" y="885580"/>
-            <a:ext cx="8233758" cy="5862949"/>
+            <a:off x="1114297" y="1233309"/>
+            <a:ext cx="8081217" cy="5229818"/>
           </a:xfrm>
         </p:spPr>
       </p:pic>
@@ -36847,11 +36871,7 @@
           <a:p>
             <a:r>
               <a:rPr lang="en-US" dirty="0" smtClean="0"/>
-              <a:t>Import Excel </a:t>
-            </a:r>
-            <a:r>
-              <a:rPr lang="en-US" dirty="0" smtClean="0"/>
-              <a:t>Flow</a:t>
+              <a:t>Import Excel Flow</a:t>
             </a:r>
             <a:endParaRPr lang="en-US" dirty="0"/>
           </a:p>
@@ -40614,11 +40634,7 @@
           <a:p>
             <a:r>
               <a:rPr lang="en-US" dirty="0" smtClean="0"/>
-              <a:t>Future </a:t>
-            </a:r>
-            <a:r>
-              <a:rPr lang="en-US" dirty="0" smtClean="0"/>
-              <a:t>Plans</a:t>
+              <a:t>Future Plans</a:t>
             </a:r>
             <a:endParaRPr lang="en-GB" dirty="0"/>
           </a:p>
@@ -40634,7 +40650,7 @@
             <p:ph idx="1"/>
             <p:extLst>
               <p:ext uri="{D42A27DB-BD31-4B8C-83A1-F6EECF244321}">
-                <p14:modId xmlns:p14="http://schemas.microsoft.com/office/powerpoint/2010/main" val="153801580"/>
+                <p14:modId xmlns:p14="http://schemas.microsoft.com/office/powerpoint/2010/main" val="3240397238"/>
               </p:ext>
             </p:extLst>
           </p:nvPr>

</xml_diff>